<commit_message>
Add Git part 1 commit guidelines
</commit_message>
<xml_diff>
--- a/git/1_basics/git_basic.pptx
+++ b/git/1_basics/git_basic.pptx
@@ -5,7 +5,7 @@
     <p:sldMasterId id="2147483648" r:id="rId1"/>
   </p:sldMasterIdLst>
   <p:notesMasterIdLst>
-    <p:notesMasterId r:id="rId30"/>
+    <p:notesMasterId r:id="rId33"/>
   </p:notesMasterIdLst>
   <p:sldIdLst>
     <p:sldId id="256" r:id="rId2"/>
@@ -23,19 +23,22 @@
     <p:sldId id="368" r:id="rId14"/>
     <p:sldId id="369" r:id="rId15"/>
     <p:sldId id="370" r:id="rId16"/>
-    <p:sldId id="357" r:id="rId17"/>
-    <p:sldId id="359" r:id="rId18"/>
-    <p:sldId id="372" r:id="rId19"/>
-    <p:sldId id="373" r:id="rId20"/>
-    <p:sldId id="374" r:id="rId21"/>
-    <p:sldId id="375" r:id="rId22"/>
-    <p:sldId id="376" r:id="rId23"/>
-    <p:sldId id="371" r:id="rId24"/>
-    <p:sldId id="258" r:id="rId25"/>
-    <p:sldId id="292" r:id="rId26"/>
-    <p:sldId id="266" r:id="rId27"/>
-    <p:sldId id="263" r:id="rId28"/>
-    <p:sldId id="332" r:id="rId29"/>
+    <p:sldId id="377" r:id="rId17"/>
+    <p:sldId id="378" r:id="rId18"/>
+    <p:sldId id="379" r:id="rId19"/>
+    <p:sldId id="357" r:id="rId20"/>
+    <p:sldId id="359" r:id="rId21"/>
+    <p:sldId id="372" r:id="rId22"/>
+    <p:sldId id="373" r:id="rId23"/>
+    <p:sldId id="374" r:id="rId24"/>
+    <p:sldId id="375" r:id="rId25"/>
+    <p:sldId id="376" r:id="rId26"/>
+    <p:sldId id="371" r:id="rId27"/>
+    <p:sldId id="258" r:id="rId28"/>
+    <p:sldId id="292" r:id="rId29"/>
+    <p:sldId id="266" r:id="rId30"/>
+    <p:sldId id="263" r:id="rId31"/>
+    <p:sldId id="332" r:id="rId32"/>
   </p:sldIdLst>
   <p:sldSz cx="12192000" cy="6858000"/>
   <p:notesSz cx="6858000" cy="9144000"/>
@@ -800,6 +803,330 @@
         <p:cNvPr id="1" name="">
           <a:extLst>
             <a:ext uri="{FF2B5EF4-FFF2-40B4-BE49-F238E27FC236}">
+              <a16:creationId xmlns:a16="http://schemas.microsoft.com/office/drawing/2014/main" id="{8D742114-A585-DB72-51BC-BFF0CB9CACCF}"/>
+            </a:ext>
+          </a:extLst>
+        </p:cNvPr>
+        <p:cNvGrpSpPr/>
+        <p:nvPr/>
+      </p:nvGrpSpPr>
+      <p:grpSpPr>
+        <a:xfrm>
+          <a:off x="0" y="0"/>
+          <a:ext cx="0" cy="0"/>
+          <a:chOff x="0" y="0"/>
+          <a:chExt cx="0" cy="0"/>
+        </a:xfrm>
+      </p:grpSpPr>
+      <p:sp>
+        <p:nvSpPr>
+          <p:cNvPr id="2" name="Slide Image Placeholder 1">
+            <a:extLst>
+              <a:ext uri="{FF2B5EF4-FFF2-40B4-BE49-F238E27FC236}">
+                <a16:creationId xmlns:a16="http://schemas.microsoft.com/office/drawing/2014/main" id="{F15CF9B9-5072-F1E8-F709-423FDF1FBBA3}"/>
+              </a:ext>
+            </a:extLst>
+          </p:cNvPr>
+          <p:cNvSpPr>
+            <a:spLocks noGrp="1" noRot="1" noChangeAspect="1"/>
+          </p:cNvSpPr>
+          <p:nvPr>
+            <p:ph type="sldImg"/>
+          </p:nvPr>
+        </p:nvSpPr>
+        <p:spPr/>
+      </p:sp>
+      <p:sp>
+        <p:nvSpPr>
+          <p:cNvPr id="3" name="Notes Placeholder 2">
+            <a:extLst>
+              <a:ext uri="{FF2B5EF4-FFF2-40B4-BE49-F238E27FC236}">
+                <a16:creationId xmlns:a16="http://schemas.microsoft.com/office/drawing/2014/main" id="{A4E01B9F-4791-39AF-4FC7-7E7A9F172FBF}"/>
+              </a:ext>
+            </a:extLst>
+          </p:cNvPr>
+          <p:cNvSpPr>
+            <a:spLocks noGrp="1"/>
+          </p:cNvSpPr>
+          <p:nvPr>
+            <p:ph type="body" idx="1"/>
+          </p:nvPr>
+        </p:nvSpPr>
+        <p:spPr/>
+        <p:txBody>
+          <a:bodyPr/>
+          <a:lstStyle/>
+          <a:p>
+            <a:endParaRPr lang="nl-NL" dirty="0"/>
+          </a:p>
+        </p:txBody>
+      </p:sp>
+      <p:sp>
+        <p:nvSpPr>
+          <p:cNvPr id="4" name="Slide Number Placeholder 3">
+            <a:extLst>
+              <a:ext uri="{FF2B5EF4-FFF2-40B4-BE49-F238E27FC236}">
+                <a16:creationId xmlns:a16="http://schemas.microsoft.com/office/drawing/2014/main" id="{5EB3C22D-0264-2EA9-4A96-1B162A42DD74}"/>
+              </a:ext>
+            </a:extLst>
+          </p:cNvPr>
+          <p:cNvSpPr>
+            <a:spLocks noGrp="1"/>
+          </p:cNvSpPr>
+          <p:nvPr>
+            <p:ph type="sldNum" sz="quarter" idx="5"/>
+          </p:nvPr>
+        </p:nvSpPr>
+        <p:spPr/>
+        <p:txBody>
+          <a:bodyPr/>
+          <a:lstStyle/>
+          <a:p>
+            <a:fld id="{9583DEA5-E342-4DB2-B087-D0B9C490B19E}" type="slidenum">
+              <a:rPr lang="nl-NL" smtClean="0"/>
+              <a:t>16</a:t>
+            </a:fld>
+            <a:endParaRPr lang="nl-NL"/>
+          </a:p>
+        </p:txBody>
+      </p:sp>
+    </p:spTree>
+    <p:extLst>
+      <p:ext uri="{BB962C8B-B14F-4D97-AF65-F5344CB8AC3E}">
+        <p14:creationId xmlns:p14="http://schemas.microsoft.com/office/powerpoint/2010/main" val="3849852800"/>
+      </p:ext>
+    </p:extLst>
+  </p:cSld>
+  <p:clrMapOvr>
+    <a:masterClrMapping/>
+  </p:clrMapOvr>
+</p:notes>
+</file>
+
+<file path=ppt/notesSlides/notesSlide13.xml><?xml version="1.0" encoding="utf-8"?>
+<p:notes xmlns:a="http://schemas.openxmlformats.org/drawingml/2006/main" xmlns:r="http://schemas.openxmlformats.org/officeDocument/2006/relationships" xmlns:p="http://schemas.openxmlformats.org/presentationml/2006/main">
+  <p:cSld>
+    <p:spTree>
+      <p:nvGrpSpPr>
+        <p:cNvPr id="1" name="">
+          <a:extLst>
+            <a:ext uri="{FF2B5EF4-FFF2-40B4-BE49-F238E27FC236}">
+              <a16:creationId xmlns:a16="http://schemas.microsoft.com/office/drawing/2014/main" id="{BE7C32C6-9167-1C3B-FE98-2434B8F61035}"/>
+            </a:ext>
+          </a:extLst>
+        </p:cNvPr>
+        <p:cNvGrpSpPr/>
+        <p:nvPr/>
+      </p:nvGrpSpPr>
+      <p:grpSpPr>
+        <a:xfrm>
+          <a:off x="0" y="0"/>
+          <a:ext cx="0" cy="0"/>
+          <a:chOff x="0" y="0"/>
+          <a:chExt cx="0" cy="0"/>
+        </a:xfrm>
+      </p:grpSpPr>
+      <p:sp>
+        <p:nvSpPr>
+          <p:cNvPr id="2" name="Slide Image Placeholder 1">
+            <a:extLst>
+              <a:ext uri="{FF2B5EF4-FFF2-40B4-BE49-F238E27FC236}">
+                <a16:creationId xmlns:a16="http://schemas.microsoft.com/office/drawing/2014/main" id="{A5C27A3A-22BD-7387-6E4D-C589BC8FD5E8}"/>
+              </a:ext>
+            </a:extLst>
+          </p:cNvPr>
+          <p:cNvSpPr>
+            <a:spLocks noGrp="1" noRot="1" noChangeAspect="1"/>
+          </p:cNvSpPr>
+          <p:nvPr>
+            <p:ph type="sldImg"/>
+          </p:nvPr>
+        </p:nvSpPr>
+        <p:spPr/>
+      </p:sp>
+      <p:sp>
+        <p:nvSpPr>
+          <p:cNvPr id="3" name="Notes Placeholder 2">
+            <a:extLst>
+              <a:ext uri="{FF2B5EF4-FFF2-40B4-BE49-F238E27FC236}">
+                <a16:creationId xmlns:a16="http://schemas.microsoft.com/office/drawing/2014/main" id="{99D4650E-6EDC-036C-F6CC-6A27B912502B}"/>
+              </a:ext>
+            </a:extLst>
+          </p:cNvPr>
+          <p:cNvSpPr>
+            <a:spLocks noGrp="1"/>
+          </p:cNvSpPr>
+          <p:nvPr>
+            <p:ph type="body" idx="1"/>
+          </p:nvPr>
+        </p:nvSpPr>
+        <p:spPr/>
+        <p:txBody>
+          <a:bodyPr/>
+          <a:lstStyle/>
+          <a:p>
+            <a:endParaRPr lang="nl-NL" dirty="0"/>
+          </a:p>
+        </p:txBody>
+      </p:sp>
+      <p:sp>
+        <p:nvSpPr>
+          <p:cNvPr id="4" name="Slide Number Placeholder 3">
+            <a:extLst>
+              <a:ext uri="{FF2B5EF4-FFF2-40B4-BE49-F238E27FC236}">
+                <a16:creationId xmlns:a16="http://schemas.microsoft.com/office/drawing/2014/main" id="{5697A75C-087B-9859-CC99-E8460D11C422}"/>
+              </a:ext>
+            </a:extLst>
+          </p:cNvPr>
+          <p:cNvSpPr>
+            <a:spLocks noGrp="1"/>
+          </p:cNvSpPr>
+          <p:nvPr>
+            <p:ph type="sldNum" sz="quarter" idx="5"/>
+          </p:nvPr>
+        </p:nvSpPr>
+        <p:spPr/>
+        <p:txBody>
+          <a:bodyPr/>
+          <a:lstStyle/>
+          <a:p>
+            <a:fld id="{9583DEA5-E342-4DB2-B087-D0B9C490B19E}" type="slidenum">
+              <a:rPr lang="nl-NL" smtClean="0"/>
+              <a:t>17</a:t>
+            </a:fld>
+            <a:endParaRPr lang="nl-NL"/>
+          </a:p>
+        </p:txBody>
+      </p:sp>
+    </p:spTree>
+    <p:extLst>
+      <p:ext uri="{BB962C8B-B14F-4D97-AF65-F5344CB8AC3E}">
+        <p14:creationId xmlns:p14="http://schemas.microsoft.com/office/powerpoint/2010/main" val="3070081646"/>
+      </p:ext>
+    </p:extLst>
+  </p:cSld>
+  <p:clrMapOvr>
+    <a:masterClrMapping/>
+  </p:clrMapOvr>
+</p:notes>
+</file>
+
+<file path=ppt/notesSlides/notesSlide14.xml><?xml version="1.0" encoding="utf-8"?>
+<p:notes xmlns:a="http://schemas.openxmlformats.org/drawingml/2006/main" xmlns:r="http://schemas.openxmlformats.org/officeDocument/2006/relationships" xmlns:p="http://schemas.openxmlformats.org/presentationml/2006/main">
+  <p:cSld>
+    <p:spTree>
+      <p:nvGrpSpPr>
+        <p:cNvPr id="1" name="">
+          <a:extLst>
+            <a:ext uri="{FF2B5EF4-FFF2-40B4-BE49-F238E27FC236}">
+              <a16:creationId xmlns:a16="http://schemas.microsoft.com/office/drawing/2014/main" id="{FD96686E-96C7-9213-C3F5-DB15686E6BB6}"/>
+            </a:ext>
+          </a:extLst>
+        </p:cNvPr>
+        <p:cNvGrpSpPr/>
+        <p:nvPr/>
+      </p:nvGrpSpPr>
+      <p:grpSpPr>
+        <a:xfrm>
+          <a:off x="0" y="0"/>
+          <a:ext cx="0" cy="0"/>
+          <a:chOff x="0" y="0"/>
+          <a:chExt cx="0" cy="0"/>
+        </a:xfrm>
+      </p:grpSpPr>
+      <p:sp>
+        <p:nvSpPr>
+          <p:cNvPr id="2" name="Slide Image Placeholder 1">
+            <a:extLst>
+              <a:ext uri="{FF2B5EF4-FFF2-40B4-BE49-F238E27FC236}">
+                <a16:creationId xmlns:a16="http://schemas.microsoft.com/office/drawing/2014/main" id="{68C25D0B-20C1-08BA-70FB-20E3C3523B3D}"/>
+              </a:ext>
+            </a:extLst>
+          </p:cNvPr>
+          <p:cNvSpPr>
+            <a:spLocks noGrp="1" noRot="1" noChangeAspect="1"/>
+          </p:cNvSpPr>
+          <p:nvPr>
+            <p:ph type="sldImg"/>
+          </p:nvPr>
+        </p:nvSpPr>
+        <p:spPr/>
+      </p:sp>
+      <p:sp>
+        <p:nvSpPr>
+          <p:cNvPr id="3" name="Notes Placeholder 2">
+            <a:extLst>
+              <a:ext uri="{FF2B5EF4-FFF2-40B4-BE49-F238E27FC236}">
+                <a16:creationId xmlns:a16="http://schemas.microsoft.com/office/drawing/2014/main" id="{7C8AA036-DBE5-310D-57CE-5EA5BDD38AB7}"/>
+              </a:ext>
+            </a:extLst>
+          </p:cNvPr>
+          <p:cNvSpPr>
+            <a:spLocks noGrp="1"/>
+          </p:cNvSpPr>
+          <p:nvPr>
+            <p:ph type="body" idx="1"/>
+          </p:nvPr>
+        </p:nvSpPr>
+        <p:spPr/>
+        <p:txBody>
+          <a:bodyPr/>
+          <a:lstStyle/>
+          <a:p>
+            <a:endParaRPr lang="nl-NL" dirty="0"/>
+          </a:p>
+        </p:txBody>
+      </p:sp>
+      <p:sp>
+        <p:nvSpPr>
+          <p:cNvPr id="4" name="Slide Number Placeholder 3">
+            <a:extLst>
+              <a:ext uri="{FF2B5EF4-FFF2-40B4-BE49-F238E27FC236}">
+                <a16:creationId xmlns:a16="http://schemas.microsoft.com/office/drawing/2014/main" id="{1DEC5B85-101B-2858-27A1-D721FF94E60A}"/>
+              </a:ext>
+            </a:extLst>
+          </p:cNvPr>
+          <p:cNvSpPr>
+            <a:spLocks noGrp="1"/>
+          </p:cNvSpPr>
+          <p:nvPr>
+            <p:ph type="sldNum" sz="quarter" idx="5"/>
+          </p:nvPr>
+        </p:nvSpPr>
+        <p:spPr/>
+        <p:txBody>
+          <a:bodyPr/>
+          <a:lstStyle/>
+          <a:p>
+            <a:fld id="{9583DEA5-E342-4DB2-B087-D0B9C490B19E}" type="slidenum">
+              <a:rPr lang="nl-NL" smtClean="0"/>
+              <a:t>18</a:t>
+            </a:fld>
+            <a:endParaRPr lang="nl-NL"/>
+          </a:p>
+        </p:txBody>
+      </p:sp>
+    </p:spTree>
+    <p:extLst>
+      <p:ext uri="{BB962C8B-B14F-4D97-AF65-F5344CB8AC3E}">
+        <p14:creationId xmlns:p14="http://schemas.microsoft.com/office/powerpoint/2010/main" val="2669879187"/>
+      </p:ext>
+    </p:extLst>
+  </p:cSld>
+  <p:clrMapOvr>
+    <a:masterClrMapping/>
+  </p:clrMapOvr>
+</p:notes>
+</file>
+
+<file path=ppt/notesSlides/notesSlide15.xml><?xml version="1.0" encoding="utf-8"?>
+<p:notes xmlns:a="http://schemas.openxmlformats.org/drawingml/2006/main" xmlns:r="http://schemas.openxmlformats.org/officeDocument/2006/relationships" xmlns:p="http://schemas.openxmlformats.org/presentationml/2006/main">
+  <p:cSld>
+    <p:spTree>
+      <p:nvGrpSpPr>
+        <p:cNvPr id="1" name="">
+          <a:extLst>
+            <a:ext uri="{FF2B5EF4-FFF2-40B4-BE49-F238E27FC236}">
               <a16:creationId xmlns:a16="http://schemas.microsoft.com/office/drawing/2014/main" id="{B29862C4-7B14-01F4-8EC1-95489C89F1AD}"/>
             </a:ext>
           </a:extLst>
@@ -881,7 +1208,7 @@
           <a:p>
             <a:fld id="{9583DEA5-E342-4DB2-B087-D0B9C490B19E}" type="slidenum">
               <a:rPr lang="nl-NL" smtClean="0"/>
-              <a:t>17</a:t>
+              <a:t>20</a:t>
             </a:fld>
             <a:endParaRPr lang="nl-NL"/>
           </a:p>
@@ -900,7 +1227,7 @@
 </p:notes>
 </file>
 
-<file path=ppt/notesSlides/notesSlide13.xml><?xml version="1.0" encoding="utf-8"?>
+<file path=ppt/notesSlides/notesSlide16.xml><?xml version="1.0" encoding="utf-8"?>
 <p:notes xmlns:a="http://schemas.openxmlformats.org/drawingml/2006/main" xmlns:r="http://schemas.openxmlformats.org/officeDocument/2006/relationships" xmlns:p="http://schemas.openxmlformats.org/presentationml/2006/main">
   <p:cSld>
     <p:spTree>
@@ -989,7 +1316,7 @@
           <a:p>
             <a:fld id="{9583DEA5-E342-4DB2-B087-D0B9C490B19E}" type="slidenum">
               <a:rPr lang="nl-NL" smtClean="0"/>
-              <a:t>18</a:t>
+              <a:t>21</a:t>
             </a:fld>
             <a:endParaRPr lang="nl-NL"/>
           </a:p>
@@ -1008,7 +1335,7 @@
 </p:notes>
 </file>
 
-<file path=ppt/notesSlides/notesSlide14.xml><?xml version="1.0" encoding="utf-8"?>
+<file path=ppt/notesSlides/notesSlide17.xml><?xml version="1.0" encoding="utf-8"?>
 <p:notes xmlns:a="http://schemas.openxmlformats.org/drawingml/2006/main" xmlns:r="http://schemas.openxmlformats.org/officeDocument/2006/relationships" xmlns:p="http://schemas.openxmlformats.org/presentationml/2006/main">
   <p:cSld>
     <p:spTree>
@@ -1108,7 +1435,7 @@
           <a:p>
             <a:fld id="{9583DEA5-E342-4DB2-B087-D0B9C490B19E}" type="slidenum">
               <a:rPr lang="nl-NL" smtClean="0"/>
-              <a:t>19</a:t>
+              <a:t>22</a:t>
             </a:fld>
             <a:endParaRPr lang="nl-NL"/>
           </a:p>
@@ -1127,7 +1454,7 @@
 </p:notes>
 </file>
 
-<file path=ppt/notesSlides/notesSlide15.xml><?xml version="1.0" encoding="utf-8"?>
+<file path=ppt/notesSlides/notesSlide18.xml><?xml version="1.0" encoding="utf-8"?>
 <p:notes xmlns:a="http://schemas.openxmlformats.org/drawingml/2006/main" xmlns:r="http://schemas.openxmlformats.org/officeDocument/2006/relationships" xmlns:p="http://schemas.openxmlformats.org/presentationml/2006/main">
   <p:cSld>
     <p:spTree>
@@ -1216,7 +1543,7 @@
           <a:p>
             <a:fld id="{9583DEA5-E342-4DB2-B087-D0B9C490B19E}" type="slidenum">
               <a:rPr lang="nl-NL" smtClean="0"/>
-              <a:t>20</a:t>
+              <a:t>23</a:t>
             </a:fld>
             <a:endParaRPr lang="nl-NL"/>
           </a:p>
@@ -1235,7 +1562,7 @@
 </p:notes>
 </file>
 
-<file path=ppt/notesSlides/notesSlide16.xml><?xml version="1.0" encoding="utf-8"?>
+<file path=ppt/notesSlides/notesSlide19.xml><?xml version="1.0" encoding="utf-8"?>
 <p:notes xmlns:a="http://schemas.openxmlformats.org/drawingml/2006/main" xmlns:r="http://schemas.openxmlformats.org/officeDocument/2006/relationships" xmlns:p="http://schemas.openxmlformats.org/presentationml/2006/main">
   <p:cSld>
     <p:spTree>
@@ -1324,7 +1651,7 @@
           <a:p>
             <a:fld id="{9583DEA5-E342-4DB2-B087-D0B9C490B19E}" type="slidenum">
               <a:rPr lang="nl-NL" smtClean="0"/>
-              <a:t>21</a:t>
+              <a:t>24</a:t>
             </a:fld>
             <a:endParaRPr lang="nl-NL"/>
           </a:p>
@@ -1334,130 +1661,6 @@
     <p:extLst>
       <p:ext uri="{BB962C8B-B14F-4D97-AF65-F5344CB8AC3E}">
         <p14:creationId xmlns:p14="http://schemas.microsoft.com/office/powerpoint/2010/main" val="3177019543"/>
-      </p:ext>
-    </p:extLst>
-  </p:cSld>
-  <p:clrMapOvr>
-    <a:masterClrMapping/>
-  </p:clrMapOvr>
-</p:notes>
-</file>
-
-<file path=ppt/notesSlides/notesSlide17.xml><?xml version="1.0" encoding="utf-8"?>
-<p:notes xmlns:a="http://schemas.openxmlformats.org/drawingml/2006/main" xmlns:r="http://schemas.openxmlformats.org/officeDocument/2006/relationships" xmlns:p="http://schemas.openxmlformats.org/presentationml/2006/main">
-  <p:cSld>
-    <p:spTree>
-      <p:nvGrpSpPr>
-        <p:cNvPr id="1" name="">
-          <a:extLst>
-            <a:ext uri="{FF2B5EF4-FFF2-40B4-BE49-F238E27FC236}">
-              <a16:creationId xmlns:a16="http://schemas.microsoft.com/office/drawing/2014/main" id="{B29EE7F1-46F9-EC89-9133-7FE31830AF07}"/>
-            </a:ext>
-          </a:extLst>
-        </p:cNvPr>
-        <p:cNvGrpSpPr/>
-        <p:nvPr/>
-      </p:nvGrpSpPr>
-      <p:grpSpPr>
-        <a:xfrm>
-          <a:off x="0" y="0"/>
-          <a:ext cx="0" cy="0"/>
-          <a:chOff x="0" y="0"/>
-          <a:chExt cx="0" cy="0"/>
-        </a:xfrm>
-      </p:grpSpPr>
-      <p:sp>
-        <p:nvSpPr>
-          <p:cNvPr id="2" name="Slide Image Placeholder 1">
-            <a:extLst>
-              <a:ext uri="{FF2B5EF4-FFF2-40B4-BE49-F238E27FC236}">
-                <a16:creationId xmlns:a16="http://schemas.microsoft.com/office/drawing/2014/main" id="{953588D6-0E45-A98F-2FE3-D1DFC8D50799}"/>
-              </a:ext>
-            </a:extLst>
-          </p:cNvPr>
-          <p:cNvSpPr>
-            <a:spLocks noGrp="1" noRot="1" noChangeAspect="1"/>
-          </p:cNvSpPr>
-          <p:nvPr>
-            <p:ph type="sldImg"/>
-          </p:nvPr>
-        </p:nvSpPr>
-        <p:spPr/>
-      </p:sp>
-      <p:sp>
-        <p:nvSpPr>
-          <p:cNvPr id="3" name="Notes Placeholder 2">
-            <a:extLst>
-              <a:ext uri="{FF2B5EF4-FFF2-40B4-BE49-F238E27FC236}">
-                <a16:creationId xmlns:a16="http://schemas.microsoft.com/office/drawing/2014/main" id="{FF9C0861-1EE0-F8BA-B871-F1600A90CF06}"/>
-              </a:ext>
-            </a:extLst>
-          </p:cNvPr>
-          <p:cNvSpPr>
-            <a:spLocks noGrp="1"/>
-          </p:cNvSpPr>
-          <p:nvPr>
-            <p:ph type="body" idx="1"/>
-          </p:nvPr>
-        </p:nvSpPr>
-        <p:spPr/>
-        <p:txBody>
-          <a:bodyPr/>
-          <a:lstStyle/>
-          <a:p>
-            <a:r>
-              <a:rPr lang="nl-NL" dirty="0"/>
-              <a:t>Demo: </a:t>
-            </a:r>
-            <a:r>
-              <a:rPr lang="nl-NL" dirty="0" err="1"/>
-              <a:t>develop</a:t>
-            </a:r>
-            <a:r>
-              <a:rPr lang="nl-NL" dirty="0"/>
-              <a:t> </a:t>
-            </a:r>
-            <a:r>
-              <a:rPr lang="nl-NL" dirty="0" err="1"/>
-              <a:t>branch</a:t>
-            </a:r>
-            <a:endParaRPr lang="nl-NL" dirty="0"/>
-          </a:p>
-        </p:txBody>
-      </p:sp>
-      <p:sp>
-        <p:nvSpPr>
-          <p:cNvPr id="4" name="Slide Number Placeholder 3">
-            <a:extLst>
-              <a:ext uri="{FF2B5EF4-FFF2-40B4-BE49-F238E27FC236}">
-                <a16:creationId xmlns:a16="http://schemas.microsoft.com/office/drawing/2014/main" id="{2DB943E4-273D-AF09-A3E3-30CCCD6FEB19}"/>
-              </a:ext>
-            </a:extLst>
-          </p:cNvPr>
-          <p:cNvSpPr>
-            <a:spLocks noGrp="1"/>
-          </p:cNvSpPr>
-          <p:nvPr>
-            <p:ph type="sldNum" sz="quarter" idx="5"/>
-          </p:nvPr>
-        </p:nvSpPr>
-        <p:spPr/>
-        <p:txBody>
-          <a:bodyPr/>
-          <a:lstStyle/>
-          <a:p>
-            <a:fld id="{9583DEA5-E342-4DB2-B087-D0B9C490B19E}" type="slidenum">
-              <a:rPr lang="nl-NL" smtClean="0"/>
-              <a:t>22</a:t>
-            </a:fld>
-            <a:endParaRPr lang="nl-NL"/>
-          </a:p>
-        </p:txBody>
-      </p:sp>
-    </p:spTree>
-    <p:extLst>
-      <p:ext uri="{BB962C8B-B14F-4D97-AF65-F5344CB8AC3E}">
-        <p14:creationId xmlns:p14="http://schemas.microsoft.com/office/powerpoint/2010/main" val="234275198"/>
       </p:ext>
     </p:extLst>
   </p:cSld>
@@ -1542,6 +1745,130 @@
     <p:extLst>
       <p:ext uri="{BB962C8B-B14F-4D97-AF65-F5344CB8AC3E}">
         <p14:creationId xmlns:p14="http://schemas.microsoft.com/office/powerpoint/2010/main" val="2093983083"/>
+      </p:ext>
+    </p:extLst>
+  </p:cSld>
+  <p:clrMapOvr>
+    <a:masterClrMapping/>
+  </p:clrMapOvr>
+</p:notes>
+</file>
+
+<file path=ppt/notesSlides/notesSlide20.xml><?xml version="1.0" encoding="utf-8"?>
+<p:notes xmlns:a="http://schemas.openxmlformats.org/drawingml/2006/main" xmlns:r="http://schemas.openxmlformats.org/officeDocument/2006/relationships" xmlns:p="http://schemas.openxmlformats.org/presentationml/2006/main">
+  <p:cSld>
+    <p:spTree>
+      <p:nvGrpSpPr>
+        <p:cNvPr id="1" name="">
+          <a:extLst>
+            <a:ext uri="{FF2B5EF4-FFF2-40B4-BE49-F238E27FC236}">
+              <a16:creationId xmlns:a16="http://schemas.microsoft.com/office/drawing/2014/main" id="{B29EE7F1-46F9-EC89-9133-7FE31830AF07}"/>
+            </a:ext>
+          </a:extLst>
+        </p:cNvPr>
+        <p:cNvGrpSpPr/>
+        <p:nvPr/>
+      </p:nvGrpSpPr>
+      <p:grpSpPr>
+        <a:xfrm>
+          <a:off x="0" y="0"/>
+          <a:ext cx="0" cy="0"/>
+          <a:chOff x="0" y="0"/>
+          <a:chExt cx="0" cy="0"/>
+        </a:xfrm>
+      </p:grpSpPr>
+      <p:sp>
+        <p:nvSpPr>
+          <p:cNvPr id="2" name="Slide Image Placeholder 1">
+            <a:extLst>
+              <a:ext uri="{FF2B5EF4-FFF2-40B4-BE49-F238E27FC236}">
+                <a16:creationId xmlns:a16="http://schemas.microsoft.com/office/drawing/2014/main" id="{953588D6-0E45-A98F-2FE3-D1DFC8D50799}"/>
+              </a:ext>
+            </a:extLst>
+          </p:cNvPr>
+          <p:cNvSpPr>
+            <a:spLocks noGrp="1" noRot="1" noChangeAspect="1"/>
+          </p:cNvSpPr>
+          <p:nvPr>
+            <p:ph type="sldImg"/>
+          </p:nvPr>
+        </p:nvSpPr>
+        <p:spPr/>
+      </p:sp>
+      <p:sp>
+        <p:nvSpPr>
+          <p:cNvPr id="3" name="Notes Placeholder 2">
+            <a:extLst>
+              <a:ext uri="{FF2B5EF4-FFF2-40B4-BE49-F238E27FC236}">
+                <a16:creationId xmlns:a16="http://schemas.microsoft.com/office/drawing/2014/main" id="{FF9C0861-1EE0-F8BA-B871-F1600A90CF06}"/>
+              </a:ext>
+            </a:extLst>
+          </p:cNvPr>
+          <p:cNvSpPr>
+            <a:spLocks noGrp="1"/>
+          </p:cNvSpPr>
+          <p:nvPr>
+            <p:ph type="body" idx="1"/>
+          </p:nvPr>
+        </p:nvSpPr>
+        <p:spPr/>
+        <p:txBody>
+          <a:bodyPr/>
+          <a:lstStyle/>
+          <a:p>
+            <a:r>
+              <a:rPr lang="nl-NL" dirty="0"/>
+              <a:t>Demo: </a:t>
+            </a:r>
+            <a:r>
+              <a:rPr lang="nl-NL" dirty="0" err="1"/>
+              <a:t>develop</a:t>
+            </a:r>
+            <a:r>
+              <a:rPr lang="nl-NL" dirty="0"/>
+              <a:t> </a:t>
+            </a:r>
+            <a:r>
+              <a:rPr lang="nl-NL" dirty="0" err="1"/>
+              <a:t>branch</a:t>
+            </a:r>
+            <a:endParaRPr lang="nl-NL" dirty="0"/>
+          </a:p>
+        </p:txBody>
+      </p:sp>
+      <p:sp>
+        <p:nvSpPr>
+          <p:cNvPr id="4" name="Slide Number Placeholder 3">
+            <a:extLst>
+              <a:ext uri="{FF2B5EF4-FFF2-40B4-BE49-F238E27FC236}">
+                <a16:creationId xmlns:a16="http://schemas.microsoft.com/office/drawing/2014/main" id="{2DB943E4-273D-AF09-A3E3-30CCCD6FEB19}"/>
+              </a:ext>
+            </a:extLst>
+          </p:cNvPr>
+          <p:cNvSpPr>
+            <a:spLocks noGrp="1"/>
+          </p:cNvSpPr>
+          <p:nvPr>
+            <p:ph type="sldNum" sz="quarter" idx="5"/>
+          </p:nvPr>
+        </p:nvSpPr>
+        <p:spPr/>
+        <p:txBody>
+          <a:bodyPr/>
+          <a:lstStyle/>
+          <a:p>
+            <a:fld id="{9583DEA5-E342-4DB2-B087-D0B9C490B19E}" type="slidenum">
+              <a:rPr lang="nl-NL" smtClean="0"/>
+              <a:t>25</a:t>
+            </a:fld>
+            <a:endParaRPr lang="nl-NL"/>
+          </a:p>
+        </p:txBody>
+      </p:sp>
+    </p:spTree>
+    <p:extLst>
+      <p:ext uri="{BB962C8B-B14F-4D97-AF65-F5344CB8AC3E}">
+        <p14:creationId xmlns:p14="http://schemas.microsoft.com/office/powerpoint/2010/main" val="234275198"/>
       </p:ext>
     </p:extLst>
   </p:cSld>
@@ -9625,6 +9952,1596 @@
         <p:cNvPr id="1" name="">
           <a:extLst>
             <a:ext uri="{FF2B5EF4-FFF2-40B4-BE49-F238E27FC236}">
+              <a16:creationId xmlns:a16="http://schemas.microsoft.com/office/drawing/2014/main" id="{B465D9F1-1FDA-48B7-A1E6-E9503E60C88A}"/>
+            </a:ext>
+          </a:extLst>
+        </p:cNvPr>
+        <p:cNvGrpSpPr/>
+        <p:nvPr/>
+      </p:nvGrpSpPr>
+      <p:grpSpPr>
+        <a:xfrm>
+          <a:off x="0" y="0"/>
+          <a:ext cx="0" cy="0"/>
+          <a:chOff x="0" y="0"/>
+          <a:chExt cx="0" cy="0"/>
+        </a:xfrm>
+      </p:grpSpPr>
+      <p:sp>
+        <p:nvSpPr>
+          <p:cNvPr id="2" name="Title 1">
+            <a:extLst>
+              <a:ext uri="{FF2B5EF4-FFF2-40B4-BE49-F238E27FC236}">
+                <a16:creationId xmlns:a16="http://schemas.microsoft.com/office/drawing/2014/main" id="{B569F555-0599-B9C5-EBE4-899050E25E85}"/>
+              </a:ext>
+            </a:extLst>
+          </p:cNvPr>
+          <p:cNvSpPr>
+            <a:spLocks noGrp="1"/>
+          </p:cNvSpPr>
+          <p:nvPr>
+            <p:ph type="title"/>
+          </p:nvPr>
+        </p:nvSpPr>
+        <p:spPr>
+          <a:xfrm>
+            <a:off x="838200" y="365126"/>
+            <a:ext cx="10515600" cy="718608"/>
+          </a:xfrm>
+        </p:spPr>
+        <p:txBody>
+          <a:bodyPr>
+            <a:normAutofit/>
+          </a:bodyPr>
+          <a:lstStyle/>
+          <a:p>
+            <a:r>
+              <a:rPr lang="nl-NL" sz="3600" dirty="0"/>
+              <a:t>Een </a:t>
+            </a:r>
+            <a:r>
+              <a:rPr lang="nl-NL" sz="3600" dirty="0" err="1"/>
+              <a:t>commit</a:t>
+            </a:r>
+            <a:r>
+              <a:rPr lang="nl-NL" sz="3600" dirty="0"/>
+              <a:t> maken</a:t>
+            </a:r>
+            <a:endParaRPr lang="nl-NL" sz="3600" noProof="0" dirty="0"/>
+          </a:p>
+        </p:txBody>
+      </p:sp>
+      <p:sp>
+        <p:nvSpPr>
+          <p:cNvPr id="14" name="Rectangle 13">
+            <a:extLst>
+              <a:ext uri="{FF2B5EF4-FFF2-40B4-BE49-F238E27FC236}">
+                <a16:creationId xmlns:a16="http://schemas.microsoft.com/office/drawing/2014/main" id="{7AE1E95E-431E-A7D3-E6E6-6866BF669D97}"/>
+              </a:ext>
+            </a:extLst>
+          </p:cNvPr>
+          <p:cNvSpPr/>
+          <p:nvPr/>
+        </p:nvSpPr>
+        <p:spPr>
+          <a:xfrm>
+            <a:off x="949569" y="2813539"/>
+            <a:ext cx="2405576" cy="1681089"/>
+          </a:xfrm>
+          <a:prstGeom prst="rect">
+            <a:avLst/>
+          </a:prstGeom>
+        </p:spPr>
+        <p:style>
+          <a:lnRef idx="2">
+            <a:schemeClr val="dk1"/>
+          </a:lnRef>
+          <a:fillRef idx="1">
+            <a:schemeClr val="lt1"/>
+          </a:fillRef>
+          <a:effectRef idx="0">
+            <a:schemeClr val="dk1"/>
+          </a:effectRef>
+          <a:fontRef idx="minor">
+            <a:schemeClr val="dk1"/>
+          </a:fontRef>
+        </p:style>
+        <p:txBody>
+          <a:bodyPr lIns="144000" tIns="144000" rIns="144000" bIns="144000" rtlCol="0" anchor="t"/>
+          <a:lstStyle/>
+          <a:p>
+            <a:pPr algn="ctr">
+              <a:spcAft>
+                <a:spcPts val="600"/>
+              </a:spcAft>
+            </a:pPr>
+            <a:r>
+              <a:rPr lang="en-US" b="1" dirty="0" err="1">
+                <a:latin typeface="Courier New" panose="02070309020205020404" pitchFamily="49" charset="0"/>
+                <a:cs typeface="Courier New" panose="02070309020205020404" pitchFamily="49" charset="0"/>
+              </a:rPr>
+              <a:t>work_dir</a:t>
+            </a:r>
+            <a:endParaRPr lang="en-US" dirty="0">
+              <a:latin typeface="Courier New" panose="02070309020205020404" pitchFamily="49" charset="0"/>
+              <a:cs typeface="Courier New" panose="02070309020205020404" pitchFamily="49" charset="0"/>
+            </a:endParaRPr>
+          </a:p>
+          <a:p>
+            <a:pPr lvl="1">
+              <a:spcAft>
+                <a:spcPts val="600"/>
+              </a:spcAft>
+            </a:pPr>
+            <a:r>
+              <a:rPr lang="en-US" dirty="0">
+                <a:latin typeface="Courier New" panose="02070309020205020404" pitchFamily="49" charset="0"/>
+                <a:cs typeface="Courier New" panose="02070309020205020404" pitchFamily="49" charset="0"/>
+              </a:rPr>
+              <a:t>main.py</a:t>
+            </a:r>
+          </a:p>
+          <a:p>
+            <a:pPr lvl="1">
+              <a:spcAft>
+                <a:spcPts val="600"/>
+              </a:spcAft>
+            </a:pPr>
+            <a:r>
+              <a:rPr lang="en-US" dirty="0">
+                <a:latin typeface="Courier New" panose="02070309020205020404" pitchFamily="49" charset="0"/>
+                <a:cs typeface="Courier New" panose="02070309020205020404" pitchFamily="49" charset="0"/>
+              </a:rPr>
+              <a:t>utils.py</a:t>
+            </a:r>
+          </a:p>
+          <a:p>
+            <a:pPr lvl="1">
+              <a:spcAft>
+                <a:spcPts val="600"/>
+              </a:spcAft>
+            </a:pPr>
+            <a:r>
+              <a:rPr lang="en-US" dirty="0">
+                <a:latin typeface="Courier New" panose="02070309020205020404" pitchFamily="49" charset="0"/>
+                <a:cs typeface="Courier New" panose="02070309020205020404" pitchFamily="49" charset="0"/>
+              </a:rPr>
+              <a:t>test.log</a:t>
+            </a:r>
+          </a:p>
+          <a:p>
+            <a:pPr algn="ctr">
+              <a:spcAft>
+                <a:spcPts val="600"/>
+              </a:spcAft>
+            </a:pPr>
+            <a:r>
+              <a:rPr lang="en-US" dirty="0">
+                <a:latin typeface="Courier New" panose="02070309020205020404" pitchFamily="49" charset="0"/>
+                <a:cs typeface="Courier New" panose="02070309020205020404" pitchFamily="49" charset="0"/>
+              </a:rPr>
+              <a:t> </a:t>
+            </a:r>
+            <a:endParaRPr lang="en-NL" dirty="0">
+              <a:latin typeface="Courier New" panose="02070309020205020404" pitchFamily="49" charset="0"/>
+              <a:cs typeface="Courier New" panose="02070309020205020404" pitchFamily="49" charset="0"/>
+            </a:endParaRPr>
+          </a:p>
+        </p:txBody>
+      </p:sp>
+      <p:sp>
+        <p:nvSpPr>
+          <p:cNvPr id="15" name="Rectangle 14">
+            <a:extLst>
+              <a:ext uri="{FF2B5EF4-FFF2-40B4-BE49-F238E27FC236}">
+                <a16:creationId xmlns:a16="http://schemas.microsoft.com/office/drawing/2014/main" id="{47B45964-E690-E667-8990-AFB7552470F8}"/>
+              </a:ext>
+            </a:extLst>
+          </p:cNvPr>
+          <p:cNvSpPr/>
+          <p:nvPr/>
+        </p:nvSpPr>
+        <p:spPr>
+          <a:xfrm>
+            <a:off x="4893213" y="2813538"/>
+            <a:ext cx="2405576" cy="1681089"/>
+          </a:xfrm>
+          <a:prstGeom prst="rect">
+            <a:avLst/>
+          </a:prstGeom>
+        </p:spPr>
+        <p:style>
+          <a:lnRef idx="2">
+            <a:schemeClr val="dk1"/>
+          </a:lnRef>
+          <a:fillRef idx="1">
+            <a:schemeClr val="lt1"/>
+          </a:fillRef>
+          <a:effectRef idx="0">
+            <a:schemeClr val="dk1"/>
+          </a:effectRef>
+          <a:fontRef idx="minor">
+            <a:schemeClr val="dk1"/>
+          </a:fontRef>
+        </p:style>
+        <p:txBody>
+          <a:bodyPr lIns="144000" tIns="144000" rIns="144000" bIns="144000" rtlCol="0" anchor="t"/>
+          <a:lstStyle/>
+          <a:p>
+            <a:pPr algn="ctr">
+              <a:spcAft>
+                <a:spcPts val="600"/>
+              </a:spcAft>
+            </a:pPr>
+            <a:r>
+              <a:rPr lang="en-US" b="1" dirty="0">
+                <a:latin typeface="Courier New" panose="02070309020205020404" pitchFamily="49" charset="0"/>
+                <a:cs typeface="Courier New" panose="02070309020205020404" pitchFamily="49" charset="0"/>
+              </a:rPr>
+              <a:t>./git/index</a:t>
+            </a:r>
+            <a:endParaRPr lang="en-US" dirty="0">
+              <a:latin typeface="Courier New" panose="02070309020205020404" pitchFamily="49" charset="0"/>
+              <a:cs typeface="Courier New" panose="02070309020205020404" pitchFamily="49" charset="0"/>
+            </a:endParaRPr>
+          </a:p>
+          <a:p>
+            <a:pPr lvl="1">
+              <a:spcAft>
+                <a:spcPts val="600"/>
+              </a:spcAft>
+            </a:pPr>
+            <a:r>
+              <a:rPr lang="en-US" dirty="0">
+                <a:latin typeface="Courier New" panose="02070309020205020404" pitchFamily="49" charset="0"/>
+                <a:cs typeface="Courier New" panose="02070309020205020404" pitchFamily="49" charset="0"/>
+              </a:rPr>
+              <a:t>main.py</a:t>
+            </a:r>
+          </a:p>
+          <a:p>
+            <a:pPr lvl="1">
+              <a:spcAft>
+                <a:spcPts val="600"/>
+              </a:spcAft>
+            </a:pPr>
+            <a:r>
+              <a:rPr lang="en-US" dirty="0">
+                <a:latin typeface="Courier New" panose="02070309020205020404" pitchFamily="49" charset="0"/>
+                <a:cs typeface="Courier New" panose="02070309020205020404" pitchFamily="49" charset="0"/>
+              </a:rPr>
+              <a:t>utils.py</a:t>
+            </a:r>
+          </a:p>
+          <a:p>
+            <a:pPr lvl="1">
+              <a:spcAft>
+                <a:spcPts val="600"/>
+              </a:spcAft>
+            </a:pPr>
+            <a:r>
+              <a:rPr lang="en-US" strike="sngStrike" dirty="0">
+                <a:latin typeface="Courier New" panose="02070309020205020404" pitchFamily="49" charset="0"/>
+                <a:cs typeface="Courier New" panose="02070309020205020404" pitchFamily="49" charset="0"/>
+              </a:rPr>
+              <a:t>test.log</a:t>
+            </a:r>
+            <a:r>
+              <a:rPr lang="en-US" dirty="0">
+                <a:latin typeface="Courier New" panose="02070309020205020404" pitchFamily="49" charset="0"/>
+                <a:cs typeface="Courier New" panose="02070309020205020404" pitchFamily="49" charset="0"/>
+              </a:rPr>
+              <a:t> </a:t>
+            </a:r>
+            <a:endParaRPr lang="en-NL" dirty="0">
+              <a:latin typeface="Courier New" panose="02070309020205020404" pitchFamily="49" charset="0"/>
+              <a:cs typeface="Courier New" panose="02070309020205020404" pitchFamily="49" charset="0"/>
+            </a:endParaRPr>
+          </a:p>
+        </p:txBody>
+      </p:sp>
+      <p:sp>
+        <p:nvSpPr>
+          <p:cNvPr id="21" name="Rectangle 20">
+            <a:extLst>
+              <a:ext uri="{FF2B5EF4-FFF2-40B4-BE49-F238E27FC236}">
+                <a16:creationId xmlns:a16="http://schemas.microsoft.com/office/drawing/2014/main" id="{B1F39801-2873-19A3-FFFD-953AE96EA07C}"/>
+              </a:ext>
+            </a:extLst>
+          </p:cNvPr>
+          <p:cNvSpPr/>
+          <p:nvPr/>
+        </p:nvSpPr>
+        <p:spPr>
+          <a:xfrm>
+            <a:off x="2861604" y="1564973"/>
+            <a:ext cx="2525150" cy="718609"/>
+          </a:xfrm>
+          <a:prstGeom prst="rect">
+            <a:avLst/>
+          </a:prstGeom>
+          <a:solidFill>
+            <a:schemeClr val="accent4">
+              <a:lumMod val="20000"/>
+              <a:lumOff val="80000"/>
+            </a:schemeClr>
+          </a:solidFill>
+        </p:spPr>
+        <p:style>
+          <a:lnRef idx="1">
+            <a:schemeClr val="accent4"/>
+          </a:lnRef>
+          <a:fillRef idx="2">
+            <a:schemeClr val="accent4"/>
+          </a:fillRef>
+          <a:effectRef idx="1">
+            <a:schemeClr val="accent4"/>
+          </a:effectRef>
+          <a:fontRef idx="minor">
+            <a:schemeClr val="dk1"/>
+          </a:fontRef>
+        </p:style>
+        <p:txBody>
+          <a:bodyPr lIns="252000" tIns="108000" rIns="252000" bIns="108000" rtlCol="0" anchor="ctr"/>
+          <a:lstStyle/>
+          <a:p>
+            <a:r>
+              <a:rPr lang="en-US" sz="1400" dirty="0">
+                <a:latin typeface="Courier New" panose="02070309020205020404" pitchFamily="49" charset="0"/>
+                <a:cs typeface="Courier New" panose="02070309020205020404" pitchFamily="49" charset="0"/>
+              </a:rPr>
+              <a:t>git add *</a:t>
+            </a:r>
+          </a:p>
+          <a:p>
+            <a:r>
+              <a:rPr lang="en-US" sz="1400" dirty="0">
+                <a:latin typeface="Courier New" panose="02070309020205020404" pitchFamily="49" charset="0"/>
+                <a:cs typeface="Courier New" panose="02070309020205020404" pitchFamily="49" charset="0"/>
+              </a:rPr>
+              <a:t>git add &lt;file&gt;</a:t>
+            </a:r>
+            <a:endParaRPr lang="en-NL" sz="1400" dirty="0">
+              <a:latin typeface="Courier New" panose="02070309020205020404" pitchFamily="49" charset="0"/>
+              <a:cs typeface="Courier New" panose="02070309020205020404" pitchFamily="49" charset="0"/>
+            </a:endParaRPr>
+          </a:p>
+        </p:txBody>
+      </p:sp>
+      <p:cxnSp>
+        <p:nvCxnSpPr>
+          <p:cNvPr id="25" name="Straight Connector 24">
+            <a:extLst>
+              <a:ext uri="{FF2B5EF4-FFF2-40B4-BE49-F238E27FC236}">
+                <a16:creationId xmlns:a16="http://schemas.microsoft.com/office/drawing/2014/main" id="{5AE2692A-0A56-ECA2-D827-F52B05DBC38F}"/>
+              </a:ext>
+            </a:extLst>
+          </p:cNvPr>
+          <p:cNvCxnSpPr>
+            <a:cxnSpLocks/>
+            <a:stCxn id="21" idx="2"/>
+          </p:cNvCxnSpPr>
+          <p:nvPr/>
+        </p:nvCxnSpPr>
+        <p:spPr>
+          <a:xfrm>
+            <a:off x="4124179" y="2283582"/>
+            <a:ext cx="0" cy="1145418"/>
+          </a:xfrm>
+          <a:prstGeom prst="line">
+            <a:avLst/>
+          </a:prstGeom>
+        </p:spPr>
+        <p:style>
+          <a:lnRef idx="2">
+            <a:schemeClr val="accent4"/>
+          </a:lnRef>
+          <a:fillRef idx="0">
+            <a:schemeClr val="accent4"/>
+          </a:fillRef>
+          <a:effectRef idx="1">
+            <a:schemeClr val="accent4"/>
+          </a:effectRef>
+          <a:fontRef idx="minor">
+            <a:schemeClr val="tx1"/>
+          </a:fontRef>
+        </p:style>
+      </p:cxnSp>
+      <p:sp>
+        <p:nvSpPr>
+          <p:cNvPr id="26" name="Rectangle 25">
+            <a:extLst>
+              <a:ext uri="{FF2B5EF4-FFF2-40B4-BE49-F238E27FC236}">
+                <a16:creationId xmlns:a16="http://schemas.microsoft.com/office/drawing/2014/main" id="{3A21DD4B-4D32-DB06-A424-B36DB9E54999}"/>
+              </a:ext>
+            </a:extLst>
+          </p:cNvPr>
+          <p:cNvSpPr/>
+          <p:nvPr/>
+        </p:nvSpPr>
+        <p:spPr>
+          <a:xfrm>
+            <a:off x="2433711" y="5024583"/>
+            <a:ext cx="3376247" cy="718609"/>
+          </a:xfrm>
+          <a:prstGeom prst="rect">
+            <a:avLst/>
+          </a:prstGeom>
+          <a:solidFill>
+            <a:schemeClr val="accent4">
+              <a:lumMod val="20000"/>
+              <a:lumOff val="80000"/>
+            </a:schemeClr>
+          </a:solidFill>
+        </p:spPr>
+        <p:style>
+          <a:lnRef idx="1">
+            <a:schemeClr val="accent4"/>
+          </a:lnRef>
+          <a:fillRef idx="2">
+            <a:schemeClr val="accent4"/>
+          </a:fillRef>
+          <a:effectRef idx="1">
+            <a:schemeClr val="accent4"/>
+          </a:effectRef>
+          <a:fontRef idx="minor">
+            <a:schemeClr val="dk1"/>
+          </a:fontRef>
+        </p:style>
+        <p:txBody>
+          <a:bodyPr lIns="252000" tIns="108000" rIns="252000" bIns="108000" rtlCol="0" anchor="ctr"/>
+          <a:lstStyle/>
+          <a:p>
+            <a:r>
+              <a:rPr lang="en-US" sz="1400" dirty="0">
+                <a:latin typeface="Courier New" panose="02070309020205020404" pitchFamily="49" charset="0"/>
+                <a:cs typeface="Courier New" panose="02070309020205020404" pitchFamily="49" charset="0"/>
+              </a:rPr>
+              <a:t>git reset &lt;file&gt;</a:t>
+            </a:r>
+          </a:p>
+          <a:p>
+            <a:r>
+              <a:rPr lang="en-US" sz="1400" dirty="0">
+                <a:latin typeface="Courier New" panose="02070309020205020404" pitchFamily="49" charset="0"/>
+                <a:cs typeface="Courier New" panose="02070309020205020404" pitchFamily="49" charset="0"/>
+              </a:rPr>
+              <a:t>git restore --staged &lt;file&gt;</a:t>
+            </a:r>
+            <a:endParaRPr lang="en-NL" sz="1400" dirty="0">
+              <a:latin typeface="Courier New" panose="02070309020205020404" pitchFamily="49" charset="0"/>
+              <a:cs typeface="Courier New" panose="02070309020205020404" pitchFamily="49" charset="0"/>
+            </a:endParaRPr>
+          </a:p>
+        </p:txBody>
+      </p:sp>
+      <p:cxnSp>
+        <p:nvCxnSpPr>
+          <p:cNvPr id="28" name="Straight Connector 27">
+            <a:extLst>
+              <a:ext uri="{FF2B5EF4-FFF2-40B4-BE49-F238E27FC236}">
+                <a16:creationId xmlns:a16="http://schemas.microsoft.com/office/drawing/2014/main" id="{5E2EA392-B717-2257-64B0-433C6A381ECE}"/>
+              </a:ext>
+            </a:extLst>
+          </p:cNvPr>
+          <p:cNvCxnSpPr>
+            <a:cxnSpLocks/>
+            <a:stCxn id="26" idx="0"/>
+          </p:cNvCxnSpPr>
+          <p:nvPr/>
+        </p:nvCxnSpPr>
+        <p:spPr>
+          <a:xfrm flipV="1">
+            <a:off x="4121835" y="3945988"/>
+            <a:ext cx="0" cy="1078595"/>
+          </a:xfrm>
+          <a:prstGeom prst="line">
+            <a:avLst/>
+          </a:prstGeom>
+        </p:spPr>
+        <p:style>
+          <a:lnRef idx="2">
+            <a:schemeClr val="accent4"/>
+          </a:lnRef>
+          <a:fillRef idx="0">
+            <a:schemeClr val="accent4"/>
+          </a:fillRef>
+          <a:effectRef idx="1">
+            <a:schemeClr val="accent4"/>
+          </a:effectRef>
+          <a:fontRef idx="minor">
+            <a:schemeClr val="tx1"/>
+          </a:fontRef>
+        </p:style>
+      </p:cxnSp>
+      <p:cxnSp>
+        <p:nvCxnSpPr>
+          <p:cNvPr id="18" name="Straight Arrow Connector 17">
+            <a:extLst>
+              <a:ext uri="{FF2B5EF4-FFF2-40B4-BE49-F238E27FC236}">
+                <a16:creationId xmlns:a16="http://schemas.microsoft.com/office/drawing/2014/main" id="{98A650BF-FD8F-024B-8311-E0C4199A62C3}"/>
+              </a:ext>
+            </a:extLst>
+          </p:cNvPr>
+          <p:cNvCxnSpPr>
+            <a:cxnSpLocks/>
+          </p:cNvCxnSpPr>
+          <p:nvPr/>
+        </p:nvCxnSpPr>
+        <p:spPr>
+          <a:xfrm flipV="1">
+            <a:off x="3355145" y="3429000"/>
+            <a:ext cx="1538068" cy="1"/>
+          </a:xfrm>
+          <a:prstGeom prst="straightConnector1">
+            <a:avLst/>
+          </a:prstGeom>
+          <a:ln>
+            <a:tailEnd type="triangle"/>
+          </a:ln>
+        </p:spPr>
+        <p:style>
+          <a:lnRef idx="2">
+            <a:schemeClr val="dk1"/>
+          </a:lnRef>
+          <a:fillRef idx="0">
+            <a:schemeClr val="dk1"/>
+          </a:fillRef>
+          <a:effectRef idx="1">
+            <a:schemeClr val="dk1"/>
+          </a:effectRef>
+          <a:fontRef idx="minor">
+            <a:schemeClr val="tx1"/>
+          </a:fontRef>
+        </p:style>
+      </p:cxnSp>
+      <p:cxnSp>
+        <p:nvCxnSpPr>
+          <p:cNvPr id="23" name="Straight Arrow Connector 22">
+            <a:extLst>
+              <a:ext uri="{FF2B5EF4-FFF2-40B4-BE49-F238E27FC236}">
+                <a16:creationId xmlns:a16="http://schemas.microsoft.com/office/drawing/2014/main" id="{8A1F4710-EAAC-43BC-070E-2F3A47EACCF7}"/>
+              </a:ext>
+            </a:extLst>
+          </p:cNvPr>
+          <p:cNvCxnSpPr/>
+          <p:nvPr/>
+        </p:nvCxnSpPr>
+        <p:spPr>
+          <a:xfrm flipH="1">
+            <a:off x="3355145" y="3945988"/>
+            <a:ext cx="1538068" cy="0"/>
+          </a:xfrm>
+          <a:prstGeom prst="straightConnector1">
+            <a:avLst/>
+          </a:prstGeom>
+          <a:ln>
+            <a:tailEnd type="triangle"/>
+          </a:ln>
+        </p:spPr>
+        <p:style>
+          <a:lnRef idx="2">
+            <a:schemeClr val="dk1"/>
+          </a:lnRef>
+          <a:fillRef idx="0">
+            <a:schemeClr val="dk1"/>
+          </a:fillRef>
+          <a:effectRef idx="1">
+            <a:schemeClr val="dk1"/>
+          </a:effectRef>
+          <a:fontRef idx="minor">
+            <a:schemeClr val="tx1"/>
+          </a:fontRef>
+        </p:style>
+      </p:cxnSp>
+    </p:spTree>
+    <p:extLst>
+      <p:ext uri="{BB962C8B-B14F-4D97-AF65-F5344CB8AC3E}">
+        <p14:creationId xmlns:p14="http://schemas.microsoft.com/office/powerpoint/2010/main" val="356345646"/>
+      </p:ext>
+    </p:extLst>
+  </p:cSld>
+  <p:clrMapOvr>
+    <a:masterClrMapping/>
+  </p:clrMapOvr>
+</p:sld>
+</file>
+
+<file path=ppt/slides/slide17.xml><?xml version="1.0" encoding="utf-8"?>
+<p:sld xmlns:a="http://schemas.openxmlformats.org/drawingml/2006/main" xmlns:r="http://schemas.openxmlformats.org/officeDocument/2006/relationships" xmlns:p="http://schemas.openxmlformats.org/presentationml/2006/main">
+  <p:cSld>
+    <p:spTree>
+      <p:nvGrpSpPr>
+        <p:cNvPr id="1" name="">
+          <a:extLst>
+            <a:ext uri="{FF2B5EF4-FFF2-40B4-BE49-F238E27FC236}">
+              <a16:creationId xmlns:a16="http://schemas.microsoft.com/office/drawing/2014/main" id="{46A8D198-BE87-BF5D-FD7E-DC06ABF76340}"/>
+            </a:ext>
+          </a:extLst>
+        </p:cNvPr>
+        <p:cNvGrpSpPr/>
+        <p:nvPr/>
+      </p:nvGrpSpPr>
+      <p:grpSpPr>
+        <a:xfrm>
+          <a:off x="0" y="0"/>
+          <a:ext cx="0" cy="0"/>
+          <a:chOff x="0" y="0"/>
+          <a:chExt cx="0" cy="0"/>
+        </a:xfrm>
+      </p:grpSpPr>
+      <p:sp>
+        <p:nvSpPr>
+          <p:cNvPr id="2" name="Title 1">
+            <a:extLst>
+              <a:ext uri="{FF2B5EF4-FFF2-40B4-BE49-F238E27FC236}">
+                <a16:creationId xmlns:a16="http://schemas.microsoft.com/office/drawing/2014/main" id="{255AA892-345D-17EE-0485-4D1E3720EEE3}"/>
+              </a:ext>
+            </a:extLst>
+          </p:cNvPr>
+          <p:cNvSpPr>
+            <a:spLocks noGrp="1"/>
+          </p:cNvSpPr>
+          <p:nvPr>
+            <p:ph type="title"/>
+          </p:nvPr>
+        </p:nvSpPr>
+        <p:spPr>
+          <a:xfrm>
+            <a:off x="838200" y="365126"/>
+            <a:ext cx="10515600" cy="718608"/>
+          </a:xfrm>
+        </p:spPr>
+        <p:txBody>
+          <a:bodyPr>
+            <a:normAutofit/>
+          </a:bodyPr>
+          <a:lstStyle/>
+          <a:p>
+            <a:r>
+              <a:rPr lang="nl-NL" sz="3600" dirty="0"/>
+              <a:t>Een </a:t>
+            </a:r>
+            <a:r>
+              <a:rPr lang="nl-NL" sz="3600" dirty="0" err="1"/>
+              <a:t>commit</a:t>
+            </a:r>
+            <a:r>
+              <a:rPr lang="nl-NL" sz="3600" dirty="0"/>
+              <a:t> maken</a:t>
+            </a:r>
+            <a:endParaRPr lang="nl-NL" sz="3600" noProof="0" dirty="0"/>
+          </a:p>
+        </p:txBody>
+      </p:sp>
+      <p:sp>
+        <p:nvSpPr>
+          <p:cNvPr id="14" name="Rectangle 13">
+            <a:extLst>
+              <a:ext uri="{FF2B5EF4-FFF2-40B4-BE49-F238E27FC236}">
+                <a16:creationId xmlns:a16="http://schemas.microsoft.com/office/drawing/2014/main" id="{C65E6CBE-2E40-EC22-A722-574ABF1670F1}"/>
+              </a:ext>
+            </a:extLst>
+          </p:cNvPr>
+          <p:cNvSpPr/>
+          <p:nvPr/>
+        </p:nvSpPr>
+        <p:spPr>
+          <a:xfrm>
+            <a:off x="949569" y="2813539"/>
+            <a:ext cx="2405576" cy="1681089"/>
+          </a:xfrm>
+          <a:prstGeom prst="rect">
+            <a:avLst/>
+          </a:prstGeom>
+        </p:spPr>
+        <p:style>
+          <a:lnRef idx="2">
+            <a:schemeClr val="dk1"/>
+          </a:lnRef>
+          <a:fillRef idx="1">
+            <a:schemeClr val="lt1"/>
+          </a:fillRef>
+          <a:effectRef idx="0">
+            <a:schemeClr val="dk1"/>
+          </a:effectRef>
+          <a:fontRef idx="minor">
+            <a:schemeClr val="dk1"/>
+          </a:fontRef>
+        </p:style>
+        <p:txBody>
+          <a:bodyPr lIns="144000" tIns="144000" rIns="144000" bIns="144000" rtlCol="0" anchor="t"/>
+          <a:lstStyle/>
+          <a:p>
+            <a:pPr algn="ctr">
+              <a:spcAft>
+                <a:spcPts val="600"/>
+              </a:spcAft>
+            </a:pPr>
+            <a:r>
+              <a:rPr lang="en-US" b="1" dirty="0" err="1">
+                <a:latin typeface="Courier New" panose="02070309020205020404" pitchFamily="49" charset="0"/>
+                <a:cs typeface="Courier New" panose="02070309020205020404" pitchFamily="49" charset="0"/>
+              </a:rPr>
+              <a:t>work_dir</a:t>
+            </a:r>
+            <a:endParaRPr lang="en-US" dirty="0">
+              <a:latin typeface="Courier New" panose="02070309020205020404" pitchFamily="49" charset="0"/>
+              <a:cs typeface="Courier New" panose="02070309020205020404" pitchFamily="49" charset="0"/>
+            </a:endParaRPr>
+          </a:p>
+          <a:p>
+            <a:pPr lvl="1">
+              <a:spcAft>
+                <a:spcPts val="600"/>
+              </a:spcAft>
+            </a:pPr>
+            <a:r>
+              <a:rPr lang="en-US" dirty="0">
+                <a:latin typeface="Courier New" panose="02070309020205020404" pitchFamily="49" charset="0"/>
+                <a:cs typeface="Courier New" panose="02070309020205020404" pitchFamily="49" charset="0"/>
+              </a:rPr>
+              <a:t>main.py</a:t>
+            </a:r>
+          </a:p>
+          <a:p>
+            <a:pPr lvl="1">
+              <a:spcAft>
+                <a:spcPts val="600"/>
+              </a:spcAft>
+            </a:pPr>
+            <a:r>
+              <a:rPr lang="en-US" dirty="0">
+                <a:latin typeface="Courier New" panose="02070309020205020404" pitchFamily="49" charset="0"/>
+                <a:cs typeface="Courier New" panose="02070309020205020404" pitchFamily="49" charset="0"/>
+              </a:rPr>
+              <a:t>utils.py</a:t>
+            </a:r>
+          </a:p>
+          <a:p>
+            <a:pPr lvl="1">
+              <a:spcAft>
+                <a:spcPts val="600"/>
+              </a:spcAft>
+            </a:pPr>
+            <a:r>
+              <a:rPr lang="en-US" dirty="0">
+                <a:latin typeface="Courier New" panose="02070309020205020404" pitchFamily="49" charset="0"/>
+                <a:cs typeface="Courier New" panose="02070309020205020404" pitchFamily="49" charset="0"/>
+              </a:rPr>
+              <a:t>test.log </a:t>
+            </a:r>
+            <a:endParaRPr lang="en-NL" dirty="0">
+              <a:latin typeface="Courier New" panose="02070309020205020404" pitchFamily="49" charset="0"/>
+              <a:cs typeface="Courier New" panose="02070309020205020404" pitchFamily="49" charset="0"/>
+            </a:endParaRPr>
+          </a:p>
+        </p:txBody>
+      </p:sp>
+      <p:sp>
+        <p:nvSpPr>
+          <p:cNvPr id="15" name="Rectangle 14">
+            <a:extLst>
+              <a:ext uri="{FF2B5EF4-FFF2-40B4-BE49-F238E27FC236}">
+                <a16:creationId xmlns:a16="http://schemas.microsoft.com/office/drawing/2014/main" id="{8EFDBB8B-BA9A-E9AE-F112-76251F838E4F}"/>
+              </a:ext>
+            </a:extLst>
+          </p:cNvPr>
+          <p:cNvSpPr/>
+          <p:nvPr/>
+        </p:nvSpPr>
+        <p:spPr>
+          <a:xfrm>
+            <a:off x="4893213" y="2813538"/>
+            <a:ext cx="2405576" cy="1681089"/>
+          </a:xfrm>
+          <a:prstGeom prst="rect">
+            <a:avLst/>
+          </a:prstGeom>
+        </p:spPr>
+        <p:style>
+          <a:lnRef idx="2">
+            <a:schemeClr val="dk1"/>
+          </a:lnRef>
+          <a:fillRef idx="1">
+            <a:schemeClr val="lt1"/>
+          </a:fillRef>
+          <a:effectRef idx="0">
+            <a:schemeClr val="dk1"/>
+          </a:effectRef>
+          <a:fontRef idx="minor">
+            <a:schemeClr val="dk1"/>
+          </a:fontRef>
+        </p:style>
+        <p:txBody>
+          <a:bodyPr lIns="144000" tIns="144000" rIns="144000" bIns="144000" rtlCol="0" anchor="t"/>
+          <a:lstStyle/>
+          <a:p>
+            <a:pPr algn="ctr">
+              <a:spcAft>
+                <a:spcPts val="600"/>
+              </a:spcAft>
+            </a:pPr>
+            <a:r>
+              <a:rPr lang="en-US" b="1" dirty="0">
+                <a:latin typeface="Courier New" panose="02070309020205020404" pitchFamily="49" charset="0"/>
+                <a:cs typeface="Courier New" panose="02070309020205020404" pitchFamily="49" charset="0"/>
+              </a:rPr>
+              <a:t>./git/index</a:t>
+            </a:r>
+            <a:endParaRPr lang="en-US" dirty="0">
+              <a:latin typeface="Courier New" panose="02070309020205020404" pitchFamily="49" charset="0"/>
+              <a:cs typeface="Courier New" panose="02070309020205020404" pitchFamily="49" charset="0"/>
+            </a:endParaRPr>
+          </a:p>
+          <a:p>
+            <a:pPr lvl="1">
+              <a:spcAft>
+                <a:spcPts val="600"/>
+              </a:spcAft>
+            </a:pPr>
+            <a:r>
+              <a:rPr lang="en-US" dirty="0">
+                <a:latin typeface="Courier New" panose="02070309020205020404" pitchFamily="49" charset="0"/>
+                <a:cs typeface="Courier New" panose="02070309020205020404" pitchFamily="49" charset="0"/>
+              </a:rPr>
+              <a:t>main.py</a:t>
+            </a:r>
+          </a:p>
+          <a:p>
+            <a:pPr lvl="1">
+              <a:spcAft>
+                <a:spcPts val="600"/>
+              </a:spcAft>
+            </a:pPr>
+            <a:r>
+              <a:rPr lang="en-US" dirty="0">
+                <a:latin typeface="Courier New" panose="02070309020205020404" pitchFamily="49" charset="0"/>
+                <a:cs typeface="Courier New" panose="02070309020205020404" pitchFamily="49" charset="0"/>
+              </a:rPr>
+              <a:t>utils.py</a:t>
+            </a:r>
+          </a:p>
+          <a:p>
+            <a:pPr lvl="1">
+              <a:spcAft>
+                <a:spcPts val="600"/>
+              </a:spcAft>
+            </a:pPr>
+            <a:r>
+              <a:rPr lang="en-US" strike="sngStrike" dirty="0">
+                <a:latin typeface="Courier New" panose="02070309020205020404" pitchFamily="49" charset="0"/>
+                <a:cs typeface="Courier New" panose="02070309020205020404" pitchFamily="49" charset="0"/>
+              </a:rPr>
+              <a:t>test.log</a:t>
+            </a:r>
+            <a:r>
+              <a:rPr lang="en-US" dirty="0">
+                <a:latin typeface="Courier New" panose="02070309020205020404" pitchFamily="49" charset="0"/>
+                <a:cs typeface="Courier New" panose="02070309020205020404" pitchFamily="49" charset="0"/>
+              </a:rPr>
+              <a:t> </a:t>
+            </a:r>
+            <a:endParaRPr lang="en-NL" dirty="0">
+              <a:latin typeface="Courier New" panose="02070309020205020404" pitchFamily="49" charset="0"/>
+              <a:cs typeface="Courier New" panose="02070309020205020404" pitchFamily="49" charset="0"/>
+            </a:endParaRPr>
+          </a:p>
+        </p:txBody>
+      </p:sp>
+      <p:sp>
+        <p:nvSpPr>
+          <p:cNvPr id="16" name="Rectangle 15">
+            <a:extLst>
+              <a:ext uri="{FF2B5EF4-FFF2-40B4-BE49-F238E27FC236}">
+                <a16:creationId xmlns:a16="http://schemas.microsoft.com/office/drawing/2014/main" id="{B35F0CD3-05E8-40AC-8CD0-3396619FEEAB}"/>
+              </a:ext>
+            </a:extLst>
+          </p:cNvPr>
+          <p:cNvSpPr/>
+          <p:nvPr/>
+        </p:nvSpPr>
+        <p:spPr>
+          <a:xfrm>
+            <a:off x="8836857" y="2813538"/>
+            <a:ext cx="2405576" cy="1681089"/>
+          </a:xfrm>
+          <a:prstGeom prst="rect">
+            <a:avLst/>
+          </a:prstGeom>
+        </p:spPr>
+        <p:style>
+          <a:lnRef idx="2">
+            <a:schemeClr val="dk1"/>
+          </a:lnRef>
+          <a:fillRef idx="1">
+            <a:schemeClr val="lt1"/>
+          </a:fillRef>
+          <a:effectRef idx="0">
+            <a:schemeClr val="dk1"/>
+          </a:effectRef>
+          <a:fontRef idx="minor">
+            <a:schemeClr val="dk1"/>
+          </a:fontRef>
+        </p:style>
+        <p:txBody>
+          <a:bodyPr lIns="144000" tIns="144000" rIns="144000" bIns="144000" rtlCol="0" anchor="t"/>
+          <a:lstStyle/>
+          <a:p>
+            <a:pPr algn="ctr">
+              <a:spcAft>
+                <a:spcPts val="600"/>
+              </a:spcAft>
+            </a:pPr>
+            <a:r>
+              <a:rPr lang="en-US" b="1" dirty="0">
+                <a:latin typeface="Courier New" panose="02070309020205020404" pitchFamily="49" charset="0"/>
+                <a:cs typeface="Courier New" panose="02070309020205020404" pitchFamily="49" charset="0"/>
+              </a:rPr>
+              <a:t>./git/objects</a:t>
+            </a:r>
+            <a:endParaRPr lang="en-US" dirty="0">
+              <a:latin typeface="Courier New" panose="02070309020205020404" pitchFamily="49" charset="0"/>
+              <a:cs typeface="Courier New" panose="02070309020205020404" pitchFamily="49" charset="0"/>
+            </a:endParaRPr>
+          </a:p>
+          <a:p>
+            <a:pPr lvl="1">
+              <a:spcAft>
+                <a:spcPts val="600"/>
+              </a:spcAft>
+            </a:pPr>
+            <a:r>
+              <a:rPr lang="en-US" dirty="0">
+                <a:latin typeface="Courier New" panose="02070309020205020404" pitchFamily="49" charset="0"/>
+                <a:cs typeface="Courier New" panose="02070309020205020404" pitchFamily="49" charset="0"/>
+              </a:rPr>
+              <a:t>main.py</a:t>
+            </a:r>
+          </a:p>
+          <a:p>
+            <a:pPr lvl="1">
+              <a:spcAft>
+                <a:spcPts val="600"/>
+              </a:spcAft>
+            </a:pPr>
+            <a:r>
+              <a:rPr lang="en-US" dirty="0">
+                <a:latin typeface="Courier New" panose="02070309020205020404" pitchFamily="49" charset="0"/>
+                <a:cs typeface="Courier New" panose="02070309020205020404" pitchFamily="49" charset="0"/>
+              </a:rPr>
+              <a:t>utils.py</a:t>
+            </a:r>
+          </a:p>
+          <a:p>
+            <a:pPr algn="ctr"/>
+            <a:r>
+              <a:rPr lang="en-US" dirty="0">
+                <a:latin typeface="Courier New" panose="02070309020205020404" pitchFamily="49" charset="0"/>
+                <a:cs typeface="Courier New" panose="02070309020205020404" pitchFamily="49" charset="0"/>
+              </a:rPr>
+              <a:t> </a:t>
+            </a:r>
+            <a:endParaRPr lang="en-NL" dirty="0">
+              <a:latin typeface="Courier New" panose="02070309020205020404" pitchFamily="49" charset="0"/>
+              <a:cs typeface="Courier New" panose="02070309020205020404" pitchFamily="49" charset="0"/>
+            </a:endParaRPr>
+          </a:p>
+        </p:txBody>
+      </p:sp>
+      <p:cxnSp>
+        <p:nvCxnSpPr>
+          <p:cNvPr id="18" name="Straight Arrow Connector 17">
+            <a:extLst>
+              <a:ext uri="{FF2B5EF4-FFF2-40B4-BE49-F238E27FC236}">
+                <a16:creationId xmlns:a16="http://schemas.microsoft.com/office/drawing/2014/main" id="{59CB2FAE-CF9F-7AC6-38FA-E188D30D933F}"/>
+              </a:ext>
+            </a:extLst>
+          </p:cNvPr>
+          <p:cNvCxnSpPr>
+            <a:cxnSpLocks/>
+          </p:cNvCxnSpPr>
+          <p:nvPr/>
+        </p:nvCxnSpPr>
+        <p:spPr>
+          <a:xfrm flipV="1">
+            <a:off x="3355145" y="3429000"/>
+            <a:ext cx="1538068" cy="1"/>
+          </a:xfrm>
+          <a:prstGeom prst="straightConnector1">
+            <a:avLst/>
+          </a:prstGeom>
+          <a:ln>
+            <a:tailEnd type="triangle"/>
+          </a:ln>
+        </p:spPr>
+        <p:style>
+          <a:lnRef idx="2">
+            <a:schemeClr val="dk1"/>
+          </a:lnRef>
+          <a:fillRef idx="0">
+            <a:schemeClr val="dk1"/>
+          </a:fillRef>
+          <a:effectRef idx="1">
+            <a:schemeClr val="dk1"/>
+          </a:effectRef>
+          <a:fontRef idx="minor">
+            <a:schemeClr val="tx1"/>
+          </a:fontRef>
+        </p:style>
+      </p:cxnSp>
+      <p:sp>
+        <p:nvSpPr>
+          <p:cNvPr id="21" name="Rectangle 20">
+            <a:extLst>
+              <a:ext uri="{FF2B5EF4-FFF2-40B4-BE49-F238E27FC236}">
+                <a16:creationId xmlns:a16="http://schemas.microsoft.com/office/drawing/2014/main" id="{32BCB2A6-E631-CEDD-4E74-8996FFAEF84E}"/>
+              </a:ext>
+            </a:extLst>
+          </p:cNvPr>
+          <p:cNvSpPr/>
+          <p:nvPr/>
+        </p:nvSpPr>
+        <p:spPr>
+          <a:xfrm>
+            <a:off x="6786490" y="1564973"/>
+            <a:ext cx="2525150" cy="718609"/>
+          </a:xfrm>
+          <a:prstGeom prst="rect">
+            <a:avLst/>
+          </a:prstGeom>
+          <a:solidFill>
+            <a:schemeClr val="accent4">
+              <a:lumMod val="20000"/>
+              <a:lumOff val="80000"/>
+            </a:schemeClr>
+          </a:solidFill>
+        </p:spPr>
+        <p:style>
+          <a:lnRef idx="1">
+            <a:schemeClr val="accent4"/>
+          </a:lnRef>
+          <a:fillRef idx="2">
+            <a:schemeClr val="accent4"/>
+          </a:fillRef>
+          <a:effectRef idx="1">
+            <a:schemeClr val="accent4"/>
+          </a:effectRef>
+          <a:fontRef idx="minor">
+            <a:schemeClr val="dk1"/>
+          </a:fontRef>
+        </p:style>
+        <p:txBody>
+          <a:bodyPr lIns="252000" tIns="108000" rIns="252000" bIns="108000" rtlCol="0" anchor="ctr"/>
+          <a:lstStyle/>
+          <a:p>
+            <a:r>
+              <a:rPr lang="en-US" sz="1400" dirty="0">
+                <a:latin typeface="Courier New" panose="02070309020205020404" pitchFamily="49" charset="0"/>
+                <a:cs typeface="Courier New" panose="02070309020205020404" pitchFamily="49" charset="0"/>
+              </a:rPr>
+              <a:t>git commit –m "..."</a:t>
+            </a:r>
+          </a:p>
+        </p:txBody>
+      </p:sp>
+      <p:cxnSp>
+        <p:nvCxnSpPr>
+          <p:cNvPr id="23" name="Straight Arrow Connector 22">
+            <a:extLst>
+              <a:ext uri="{FF2B5EF4-FFF2-40B4-BE49-F238E27FC236}">
+                <a16:creationId xmlns:a16="http://schemas.microsoft.com/office/drawing/2014/main" id="{913E909F-F431-D4F9-3702-349E42B7EA97}"/>
+              </a:ext>
+            </a:extLst>
+          </p:cNvPr>
+          <p:cNvCxnSpPr/>
+          <p:nvPr/>
+        </p:nvCxnSpPr>
+        <p:spPr>
+          <a:xfrm flipH="1">
+            <a:off x="3355145" y="3945988"/>
+            <a:ext cx="1538068" cy="0"/>
+          </a:xfrm>
+          <a:prstGeom prst="straightConnector1">
+            <a:avLst/>
+          </a:prstGeom>
+          <a:ln>
+            <a:tailEnd type="triangle"/>
+          </a:ln>
+        </p:spPr>
+        <p:style>
+          <a:lnRef idx="2">
+            <a:schemeClr val="dk1"/>
+          </a:lnRef>
+          <a:fillRef idx="0">
+            <a:schemeClr val="dk1"/>
+          </a:fillRef>
+          <a:effectRef idx="1">
+            <a:schemeClr val="dk1"/>
+          </a:effectRef>
+          <a:fontRef idx="minor">
+            <a:schemeClr val="tx1"/>
+          </a:fontRef>
+        </p:style>
+      </p:cxnSp>
+      <p:cxnSp>
+        <p:nvCxnSpPr>
+          <p:cNvPr id="25" name="Straight Connector 24">
+            <a:extLst>
+              <a:ext uri="{FF2B5EF4-FFF2-40B4-BE49-F238E27FC236}">
+                <a16:creationId xmlns:a16="http://schemas.microsoft.com/office/drawing/2014/main" id="{129891EE-1D53-5D5E-9FA5-47D2F05F2771}"/>
+              </a:ext>
+            </a:extLst>
+          </p:cNvPr>
+          <p:cNvCxnSpPr>
+            <a:cxnSpLocks/>
+            <a:stCxn id="21" idx="2"/>
+          </p:cNvCxnSpPr>
+          <p:nvPr/>
+        </p:nvCxnSpPr>
+        <p:spPr>
+          <a:xfrm>
+            <a:off x="8049065" y="2283582"/>
+            <a:ext cx="0" cy="1370501"/>
+          </a:xfrm>
+          <a:prstGeom prst="line">
+            <a:avLst/>
+          </a:prstGeom>
+        </p:spPr>
+        <p:style>
+          <a:lnRef idx="2">
+            <a:schemeClr val="accent4"/>
+          </a:lnRef>
+          <a:fillRef idx="0">
+            <a:schemeClr val="accent4"/>
+          </a:fillRef>
+          <a:effectRef idx="1">
+            <a:schemeClr val="accent4"/>
+          </a:effectRef>
+          <a:fontRef idx="minor">
+            <a:schemeClr val="tx1"/>
+          </a:fontRef>
+        </p:style>
+      </p:cxnSp>
+      <p:cxnSp>
+        <p:nvCxnSpPr>
+          <p:cNvPr id="20" name="Straight Arrow Connector 19">
+            <a:extLst>
+              <a:ext uri="{FF2B5EF4-FFF2-40B4-BE49-F238E27FC236}">
+                <a16:creationId xmlns:a16="http://schemas.microsoft.com/office/drawing/2014/main" id="{D8DA821E-F570-3D98-375E-8482A22D500F}"/>
+              </a:ext>
+            </a:extLst>
+          </p:cNvPr>
+          <p:cNvCxnSpPr>
+            <a:stCxn id="15" idx="3"/>
+            <a:endCxn id="16" idx="1"/>
+          </p:cNvCxnSpPr>
+          <p:nvPr/>
+        </p:nvCxnSpPr>
+        <p:spPr>
+          <a:xfrm>
+            <a:off x="7298789" y="3654083"/>
+            <a:ext cx="1538068" cy="0"/>
+          </a:xfrm>
+          <a:prstGeom prst="straightConnector1">
+            <a:avLst/>
+          </a:prstGeom>
+          <a:ln>
+            <a:tailEnd type="triangle"/>
+          </a:ln>
+        </p:spPr>
+        <p:style>
+          <a:lnRef idx="2">
+            <a:schemeClr val="dk1"/>
+          </a:lnRef>
+          <a:fillRef idx="0">
+            <a:schemeClr val="dk1"/>
+          </a:fillRef>
+          <a:effectRef idx="1">
+            <a:schemeClr val="dk1"/>
+          </a:effectRef>
+          <a:fontRef idx="minor">
+            <a:schemeClr val="tx1"/>
+          </a:fontRef>
+        </p:style>
+      </p:cxnSp>
+    </p:spTree>
+    <p:extLst>
+      <p:ext uri="{BB962C8B-B14F-4D97-AF65-F5344CB8AC3E}">
+        <p14:creationId xmlns:p14="http://schemas.microsoft.com/office/powerpoint/2010/main" val="2702244032"/>
+      </p:ext>
+    </p:extLst>
+  </p:cSld>
+  <p:clrMapOvr>
+    <a:masterClrMapping/>
+  </p:clrMapOvr>
+</p:sld>
+</file>
+
+<file path=ppt/slides/slide18.xml><?xml version="1.0" encoding="utf-8"?>
+<p:sld xmlns:a="http://schemas.openxmlformats.org/drawingml/2006/main" xmlns:r="http://schemas.openxmlformats.org/officeDocument/2006/relationships" xmlns:p="http://schemas.openxmlformats.org/presentationml/2006/main">
+  <p:cSld>
+    <p:spTree>
+      <p:nvGrpSpPr>
+        <p:cNvPr id="1" name="">
+          <a:extLst>
+            <a:ext uri="{FF2B5EF4-FFF2-40B4-BE49-F238E27FC236}">
+              <a16:creationId xmlns:a16="http://schemas.microsoft.com/office/drawing/2014/main" id="{D22C4855-B453-50DD-76F3-D3207F5D21B8}"/>
+            </a:ext>
+          </a:extLst>
+        </p:cNvPr>
+        <p:cNvGrpSpPr/>
+        <p:nvPr/>
+      </p:nvGrpSpPr>
+      <p:grpSpPr>
+        <a:xfrm>
+          <a:off x="0" y="0"/>
+          <a:ext cx="0" cy="0"/>
+          <a:chOff x="0" y="0"/>
+          <a:chExt cx="0" cy="0"/>
+        </a:xfrm>
+      </p:grpSpPr>
+      <p:sp>
+        <p:nvSpPr>
+          <p:cNvPr id="2" name="Title 1">
+            <a:extLst>
+              <a:ext uri="{FF2B5EF4-FFF2-40B4-BE49-F238E27FC236}">
+                <a16:creationId xmlns:a16="http://schemas.microsoft.com/office/drawing/2014/main" id="{7BAC8F3C-59C9-0604-5FEB-E95D26D891AC}"/>
+              </a:ext>
+            </a:extLst>
+          </p:cNvPr>
+          <p:cNvSpPr>
+            <a:spLocks noGrp="1"/>
+          </p:cNvSpPr>
+          <p:nvPr>
+            <p:ph type="title"/>
+          </p:nvPr>
+        </p:nvSpPr>
+        <p:spPr>
+          <a:xfrm>
+            <a:off x="838200" y="365126"/>
+            <a:ext cx="10515600" cy="718608"/>
+          </a:xfrm>
+        </p:spPr>
+        <p:txBody>
+          <a:bodyPr>
+            <a:normAutofit/>
+          </a:bodyPr>
+          <a:lstStyle/>
+          <a:p>
+            <a:r>
+              <a:rPr lang="nl-NL" sz="3600" dirty="0"/>
+              <a:t>Een goede </a:t>
+            </a:r>
+            <a:r>
+              <a:rPr lang="nl-NL" sz="3600" dirty="0" err="1"/>
+              <a:t>commit</a:t>
+            </a:r>
+            <a:r>
+              <a:rPr lang="nl-NL" sz="3600" dirty="0"/>
+              <a:t>…</a:t>
+            </a:r>
+            <a:endParaRPr lang="nl-NL" sz="3600" noProof="0" dirty="0"/>
+          </a:p>
+        </p:txBody>
+      </p:sp>
+      <p:sp>
+        <p:nvSpPr>
+          <p:cNvPr id="3" name="Content Placeholder 2">
+            <a:extLst>
+              <a:ext uri="{FF2B5EF4-FFF2-40B4-BE49-F238E27FC236}">
+                <a16:creationId xmlns:a16="http://schemas.microsoft.com/office/drawing/2014/main" id="{27734D49-871A-6199-EA83-2BCC023BB2FC}"/>
+              </a:ext>
+            </a:extLst>
+          </p:cNvPr>
+          <p:cNvSpPr>
+            <a:spLocks noGrp="1"/>
+          </p:cNvSpPr>
+          <p:nvPr>
+            <p:ph idx="1"/>
+          </p:nvPr>
+        </p:nvSpPr>
+        <p:spPr>
+          <a:xfrm>
+            <a:off x="838200" y="1456267"/>
+            <a:ext cx="6223782" cy="4720696"/>
+          </a:xfrm>
+        </p:spPr>
+        <p:txBody>
+          <a:bodyPr>
+            <a:normAutofit/>
+          </a:bodyPr>
+          <a:lstStyle/>
+          <a:p>
+            <a:pPr marL="0" indent="0">
+              <a:buNone/>
+            </a:pPr>
+            <a:r>
+              <a:rPr lang="nl-NL" sz="1800" b="1" noProof="0" dirty="0">
+                <a:cs typeface="Courier New" panose="02070309020205020404" pitchFamily="49" charset="0"/>
+              </a:rPr>
+              <a:t>Bevat een afgebakend stuk werk</a:t>
+            </a:r>
+          </a:p>
+          <a:p>
+            <a:pPr>
+              <a:buFontTx/>
+              <a:buChar char="-"/>
+            </a:pPr>
+            <a:r>
+              <a:rPr lang="nl-NL" sz="1800" dirty="0">
+                <a:cs typeface="Courier New" panose="02070309020205020404" pitchFamily="49" charset="0"/>
+              </a:rPr>
+              <a:t>Maak kleine </a:t>
+            </a:r>
+            <a:r>
+              <a:rPr lang="nl-NL" sz="1800" dirty="0" err="1">
+                <a:cs typeface="Courier New" panose="02070309020205020404" pitchFamily="49" charset="0"/>
+              </a:rPr>
+              <a:t>commits</a:t>
+            </a:r>
+            <a:r>
+              <a:rPr lang="nl-NL" sz="1800" dirty="0">
+                <a:cs typeface="Courier New" panose="02070309020205020404" pitchFamily="49" charset="0"/>
+              </a:rPr>
+              <a:t> met een duidelijke focus.</a:t>
+            </a:r>
+          </a:p>
+          <a:p>
+            <a:pPr>
+              <a:buFontTx/>
+              <a:buChar char="-"/>
+            </a:pPr>
+            <a:r>
+              <a:rPr lang="nl-NL" sz="1800" dirty="0" err="1">
+                <a:cs typeface="Courier New" panose="02070309020205020404" pitchFamily="49" charset="0"/>
+              </a:rPr>
+              <a:t>Refactor</a:t>
+            </a:r>
+            <a:r>
+              <a:rPr lang="nl-NL" sz="1800" dirty="0">
+                <a:cs typeface="Courier New" panose="02070309020205020404" pitchFamily="49" charset="0"/>
+              </a:rPr>
+              <a:t> van één class of enkele </a:t>
+            </a:r>
+            <a:r>
+              <a:rPr lang="nl-NL" sz="1800" dirty="0" err="1">
+                <a:cs typeface="Courier New" panose="02070309020205020404" pitchFamily="49" charset="0"/>
+              </a:rPr>
+              <a:t>bugfix</a:t>
+            </a:r>
+            <a:r>
+              <a:rPr lang="nl-NL" sz="1800" dirty="0">
+                <a:cs typeface="Courier New" panose="02070309020205020404" pitchFamily="49" charset="0"/>
+              </a:rPr>
+              <a:t>.</a:t>
+            </a:r>
+          </a:p>
+          <a:p>
+            <a:pPr>
+              <a:buFontTx/>
+              <a:buChar char="-"/>
+            </a:pPr>
+            <a:r>
+              <a:rPr lang="nl-NL" sz="1800" dirty="0">
+                <a:cs typeface="Courier New" panose="02070309020205020404" pitchFamily="49" charset="0"/>
+              </a:rPr>
+              <a:t>Kleine stappen makkelijker te overzien en terug te draaien. </a:t>
+            </a:r>
+          </a:p>
+          <a:p>
+            <a:pPr marL="0" indent="0">
+              <a:buNone/>
+            </a:pPr>
+            <a:endParaRPr lang="nl-NL" sz="1800" b="1" noProof="0" dirty="0">
+              <a:cs typeface="Courier New" panose="02070309020205020404" pitchFamily="49" charset="0"/>
+            </a:endParaRPr>
+          </a:p>
+          <a:p>
+            <a:pPr marL="0" indent="0">
+              <a:buNone/>
+            </a:pPr>
+            <a:r>
+              <a:rPr lang="nl-NL" sz="1800" b="1" dirty="0">
+                <a:cs typeface="Courier New" panose="02070309020205020404" pitchFamily="49" charset="0"/>
+              </a:rPr>
+              <a:t>Heeft een duidelijke omschrijving</a:t>
+            </a:r>
+          </a:p>
+          <a:p>
+            <a:pPr>
+              <a:buFontTx/>
+              <a:buChar char="-"/>
+            </a:pPr>
+            <a:r>
+              <a:rPr lang="nl-NL" sz="1800" noProof="0" dirty="0">
+                <a:cs typeface="Courier New" panose="02070309020205020404" pitchFamily="49" charset="0"/>
+              </a:rPr>
+              <a:t>Omschrijving moet de lading dekken (vgl. </a:t>
+            </a:r>
+            <a:r>
+              <a:rPr lang="nl-NL" sz="1800" noProof="0" dirty="0" err="1">
+                <a:cs typeface="Courier New" panose="02070309020205020404" pitchFamily="49" charset="0"/>
+              </a:rPr>
+              <a:t>docstring</a:t>
+            </a:r>
+            <a:r>
+              <a:rPr lang="nl-NL" sz="1800" noProof="0" dirty="0">
+                <a:cs typeface="Courier New" panose="02070309020205020404" pitchFamily="49" charset="0"/>
+              </a:rPr>
+              <a:t>).</a:t>
+            </a:r>
+          </a:p>
+          <a:p>
+            <a:pPr>
+              <a:buFontTx/>
+              <a:buChar char="-"/>
+            </a:pPr>
+            <a:r>
+              <a:rPr lang="nl-NL" sz="1800" noProof="0" dirty="0">
+                <a:cs typeface="Courier New" panose="02070309020205020404" pitchFamily="49" charset="0"/>
+              </a:rPr>
+              <a:t>Makkelijker als </a:t>
+            </a:r>
+            <a:r>
+              <a:rPr lang="nl-NL" sz="1800" noProof="0" dirty="0" err="1">
+                <a:cs typeface="Courier New" panose="02070309020205020404" pitchFamily="49" charset="0"/>
+              </a:rPr>
+              <a:t>commit</a:t>
+            </a:r>
+            <a:r>
+              <a:rPr lang="nl-NL" sz="1800" noProof="0" dirty="0">
+                <a:cs typeface="Courier New" panose="02070309020205020404" pitchFamily="49" charset="0"/>
+              </a:rPr>
+              <a:t> één duidelijke focus heeft.</a:t>
+            </a:r>
+          </a:p>
+          <a:p>
+            <a:pPr>
+              <a:buFontTx/>
+              <a:buChar char="-"/>
+            </a:pPr>
+            <a:r>
+              <a:rPr lang="nl-NL" sz="1800" dirty="0">
+                <a:cs typeface="Courier New" panose="02070309020205020404" pitchFamily="49" charset="0"/>
+              </a:rPr>
+              <a:t>Begin met een werkwoord; "</a:t>
+            </a:r>
+            <a:r>
+              <a:rPr lang="nl-NL" sz="1800" dirty="0" err="1">
+                <a:cs typeface="Courier New" panose="02070309020205020404" pitchFamily="49" charset="0"/>
+              </a:rPr>
+              <a:t>Add</a:t>
+            </a:r>
+            <a:r>
+              <a:rPr lang="nl-NL" sz="1800" dirty="0">
+                <a:cs typeface="Courier New" panose="02070309020205020404" pitchFamily="49" charset="0"/>
+              </a:rPr>
+              <a:t> </a:t>
+            </a:r>
+            <a:r>
+              <a:rPr lang="nl-NL" sz="1800" dirty="0" err="1">
+                <a:cs typeface="Courier New" panose="02070309020205020404" pitchFamily="49" charset="0"/>
+              </a:rPr>
+              <a:t>docstrings</a:t>
+            </a:r>
+            <a:r>
+              <a:rPr lang="nl-NL" sz="1800" dirty="0">
+                <a:cs typeface="Courier New" panose="02070309020205020404" pitchFamily="49" charset="0"/>
+              </a:rPr>
+              <a:t> </a:t>
+            </a:r>
+            <a:r>
+              <a:rPr lang="nl-NL" sz="1800" dirty="0" err="1">
+                <a:cs typeface="Courier New" panose="02070309020205020404" pitchFamily="49" charset="0"/>
+              </a:rPr>
+              <a:t>to</a:t>
+            </a:r>
+            <a:r>
+              <a:rPr lang="nl-NL" sz="1800" dirty="0">
+                <a:cs typeface="Courier New" panose="02070309020205020404" pitchFamily="49" charset="0"/>
+              </a:rPr>
+              <a:t> </a:t>
+            </a:r>
+            <a:r>
+              <a:rPr lang="nl-NL" sz="1800" dirty="0" err="1">
+                <a:cs typeface="Courier New" panose="02070309020205020404" pitchFamily="49" charset="0"/>
+              </a:rPr>
+              <a:t>MyClass</a:t>
+            </a:r>
+            <a:r>
+              <a:rPr lang="nl-NL" sz="1800" dirty="0">
+                <a:cs typeface="Courier New" panose="02070309020205020404" pitchFamily="49" charset="0"/>
+              </a:rPr>
+              <a:t>".</a:t>
+            </a:r>
+            <a:endParaRPr lang="nl-NL" sz="1800" noProof="0" dirty="0">
+              <a:cs typeface="Courier New" panose="02070309020205020404" pitchFamily="49" charset="0"/>
+            </a:endParaRPr>
+          </a:p>
+          <a:p>
+            <a:pPr marL="0" indent="0">
+              <a:buNone/>
+            </a:pPr>
+            <a:endParaRPr lang="nl-NL" sz="1800" noProof="0" dirty="0">
+              <a:cs typeface="Courier New" panose="02070309020205020404" pitchFamily="49" charset="0"/>
+            </a:endParaRPr>
+          </a:p>
+          <a:p>
+            <a:pPr marL="0" indent="0">
+              <a:buNone/>
+            </a:pPr>
+            <a:endParaRPr lang="nl-NL" sz="1800" b="1" dirty="0">
+              <a:cs typeface="Courier New" panose="02070309020205020404" pitchFamily="49" charset="0"/>
+            </a:endParaRPr>
+          </a:p>
+          <a:p>
+            <a:pPr marL="0" indent="0">
+              <a:buNone/>
+            </a:pPr>
+            <a:endParaRPr lang="nl-NL" sz="1800" b="1" noProof="0" dirty="0">
+              <a:cs typeface="Courier New" panose="02070309020205020404" pitchFamily="49" charset="0"/>
+            </a:endParaRPr>
+          </a:p>
+        </p:txBody>
+      </p:sp>
+      <p:pic>
+        <p:nvPicPr>
+          <p:cNvPr id="5" name="Picture 4" descr="A screenshot of a computer program&#10;&#10;Description automatically generated">
+            <a:extLst>
+              <a:ext uri="{FF2B5EF4-FFF2-40B4-BE49-F238E27FC236}">
+                <a16:creationId xmlns:a16="http://schemas.microsoft.com/office/drawing/2014/main" id="{C8AD7044-CD48-5888-7401-3F00C7AE0080}"/>
+              </a:ext>
+            </a:extLst>
+          </p:cNvPr>
+          <p:cNvPicPr>
+            <a:picLocks noChangeAspect="1"/>
+          </p:cNvPicPr>
+          <p:nvPr/>
+        </p:nvPicPr>
+        <p:blipFill>
+          <a:blip r:embed="rId3">
+            <a:extLst>
+              <a:ext uri="{28A0092B-C50C-407E-A947-70E740481C1C}">
+                <a14:useLocalDpi xmlns:a14="http://schemas.microsoft.com/office/drawing/2010/main" val="0"/>
+              </a:ext>
+            </a:extLst>
+          </a:blip>
+          <a:stretch>
+            <a:fillRect/>
+          </a:stretch>
+        </p:blipFill>
+        <p:spPr>
+          <a:xfrm>
+            <a:off x="7613761" y="1518054"/>
+            <a:ext cx="3740039" cy="3821892"/>
+          </a:xfrm>
+          <a:prstGeom prst="rect">
+            <a:avLst/>
+          </a:prstGeom>
+        </p:spPr>
+      </p:pic>
+    </p:spTree>
+    <p:extLst>
+      <p:ext uri="{BB962C8B-B14F-4D97-AF65-F5344CB8AC3E}">
+        <p14:creationId xmlns:p14="http://schemas.microsoft.com/office/powerpoint/2010/main" val="795842294"/>
+      </p:ext>
+    </p:extLst>
+  </p:cSld>
+  <p:clrMapOvr>
+    <a:masterClrMapping/>
+  </p:clrMapOvr>
+</p:sld>
+</file>
+
+<file path=ppt/slides/slide19.xml><?xml version="1.0" encoding="utf-8"?>
+<p:sld xmlns:a="http://schemas.openxmlformats.org/drawingml/2006/main" xmlns:r="http://schemas.openxmlformats.org/officeDocument/2006/relationships" xmlns:p="http://schemas.openxmlformats.org/presentationml/2006/main">
+  <p:cSld>
+    <p:spTree>
+      <p:nvGrpSpPr>
+        <p:cNvPr id="1" name="">
+          <a:extLst>
+            <a:ext uri="{FF2B5EF4-FFF2-40B4-BE49-F238E27FC236}">
               <a16:creationId xmlns:a16="http://schemas.microsoft.com/office/drawing/2014/main" id="{53350AC3-44D2-125F-C901-74E8A6F61E54}"/>
             </a:ext>
           </a:extLst>
@@ -9706,7 +11623,298 @@
 </p:sld>
 </file>
 
-<file path=ppt/slides/slide17.xml><?xml version="1.0" encoding="utf-8"?>
+<file path=ppt/slides/slide2.xml><?xml version="1.0" encoding="utf-8"?>
+<p:sld xmlns:a="http://schemas.openxmlformats.org/drawingml/2006/main" xmlns:r="http://schemas.openxmlformats.org/officeDocument/2006/relationships" xmlns:p="http://schemas.openxmlformats.org/presentationml/2006/main">
+  <p:cSld>
+    <p:spTree>
+      <p:nvGrpSpPr>
+        <p:cNvPr id="1" name=""/>
+        <p:cNvGrpSpPr/>
+        <p:nvPr/>
+      </p:nvGrpSpPr>
+      <p:grpSpPr>
+        <a:xfrm>
+          <a:off x="0" y="0"/>
+          <a:ext cx="0" cy="0"/>
+          <a:chOff x="0" y="0"/>
+          <a:chExt cx="0" cy="0"/>
+        </a:xfrm>
+      </p:grpSpPr>
+      <p:sp>
+        <p:nvSpPr>
+          <p:cNvPr id="2" name="Title 1">
+            <a:extLst>
+              <a:ext uri="{FF2B5EF4-FFF2-40B4-BE49-F238E27FC236}">
+                <a16:creationId xmlns:a16="http://schemas.microsoft.com/office/drawing/2014/main" id="{39A1D606-8DD1-369C-5C09-471CDD551AD5}"/>
+              </a:ext>
+            </a:extLst>
+          </p:cNvPr>
+          <p:cNvSpPr>
+            <a:spLocks noGrp="1"/>
+          </p:cNvSpPr>
+          <p:nvPr>
+            <p:ph type="title"/>
+          </p:nvPr>
+        </p:nvSpPr>
+        <p:spPr>
+          <a:xfrm>
+            <a:off x="838200" y="365126"/>
+            <a:ext cx="10515600" cy="718608"/>
+          </a:xfrm>
+        </p:spPr>
+        <p:txBody>
+          <a:bodyPr>
+            <a:normAutofit/>
+          </a:bodyPr>
+          <a:lstStyle/>
+          <a:p>
+            <a:r>
+              <a:rPr lang="nl-NL" sz="3600" noProof="0" dirty="0"/>
+              <a:t>Agenda</a:t>
+            </a:r>
+          </a:p>
+        </p:txBody>
+      </p:sp>
+      <p:sp>
+        <p:nvSpPr>
+          <p:cNvPr id="3" name="Content Placeholder 2">
+            <a:extLst>
+              <a:ext uri="{FF2B5EF4-FFF2-40B4-BE49-F238E27FC236}">
+                <a16:creationId xmlns:a16="http://schemas.microsoft.com/office/drawing/2014/main" id="{F4C2D286-E049-0AAB-1360-B7157E11AD7E}"/>
+              </a:ext>
+            </a:extLst>
+          </p:cNvPr>
+          <p:cNvSpPr>
+            <a:spLocks noGrp="1"/>
+          </p:cNvSpPr>
+          <p:nvPr>
+            <p:ph idx="1"/>
+          </p:nvPr>
+        </p:nvSpPr>
+        <p:spPr>
+          <a:xfrm>
+            <a:off x="838200" y="1456267"/>
+            <a:ext cx="10515600" cy="4720696"/>
+          </a:xfrm>
+        </p:spPr>
+        <p:txBody>
+          <a:bodyPr>
+            <a:normAutofit/>
+          </a:bodyPr>
+          <a:lstStyle/>
+          <a:p>
+            <a:pPr>
+              <a:spcAft>
+                <a:spcPts val="600"/>
+              </a:spcAft>
+            </a:pPr>
+            <a:r>
+              <a:rPr lang="nl-NL" sz="2000" noProof="0" dirty="0"/>
+              <a:t>Introductie</a:t>
+            </a:r>
+            <a:endParaRPr lang="nl-NL" sz="2000" dirty="0"/>
+          </a:p>
+          <a:p>
+            <a:pPr lvl="1">
+              <a:spcAft>
+                <a:spcPts val="600"/>
+              </a:spcAft>
+            </a:pPr>
+            <a:r>
+              <a:rPr lang="nl-NL" sz="1600" noProof="0" dirty="0"/>
+              <a:t>Wat is git?</a:t>
+            </a:r>
+          </a:p>
+          <a:p>
+            <a:pPr lvl="1">
+              <a:spcAft>
+                <a:spcPts val="600"/>
+              </a:spcAft>
+            </a:pPr>
+            <a:r>
+              <a:rPr lang="nl-NL" sz="1600" noProof="0" dirty="0"/>
+              <a:t>Hoe werkt git?</a:t>
+            </a:r>
+          </a:p>
+          <a:p>
+            <a:pPr>
+              <a:spcAft>
+                <a:spcPts val="600"/>
+              </a:spcAft>
+            </a:pPr>
+            <a:r>
+              <a:rPr lang="nl-NL" sz="2000" dirty="0"/>
+              <a:t>Werken met versies</a:t>
+            </a:r>
+            <a:endParaRPr lang="nl-NL" sz="1600" dirty="0"/>
+          </a:p>
+          <a:p>
+            <a:pPr lvl="1">
+              <a:spcAft>
+                <a:spcPts val="600"/>
+              </a:spcAft>
+            </a:pPr>
+            <a:r>
+              <a:rPr lang="nl-NL" sz="1600" dirty="0"/>
+              <a:t>Repository opzetten</a:t>
+            </a:r>
+            <a:endParaRPr lang="nl-NL" sz="1600" noProof="0" dirty="0"/>
+          </a:p>
+          <a:p>
+            <a:pPr lvl="1">
+              <a:spcAft>
+                <a:spcPts val="600"/>
+              </a:spcAft>
+            </a:pPr>
+            <a:r>
+              <a:rPr lang="nl-NL" sz="1600" dirty="0"/>
+              <a:t>Een </a:t>
+            </a:r>
+            <a:r>
+              <a:rPr lang="nl-NL" sz="1600" dirty="0" err="1"/>
+              <a:t>commit</a:t>
+            </a:r>
+            <a:r>
+              <a:rPr lang="nl-NL" sz="1600" dirty="0"/>
+              <a:t> aanmaken.</a:t>
+            </a:r>
+          </a:p>
+          <a:p>
+            <a:pPr lvl="1">
+              <a:spcAft>
+                <a:spcPts val="600"/>
+              </a:spcAft>
+            </a:pPr>
+            <a:r>
+              <a:rPr lang="nl-NL" sz="1600" dirty="0"/>
+              <a:t>Wat gebeurt er in de </a:t>
+            </a:r>
+            <a:r>
+              <a:rPr lang="nl-NL" sz="1600" dirty="0" err="1"/>
+              <a:t>repository</a:t>
+            </a:r>
+            <a:r>
+              <a:rPr lang="nl-NL" sz="1600" dirty="0"/>
+              <a:t>?</a:t>
+            </a:r>
+          </a:p>
+          <a:p>
+            <a:pPr lvl="1">
+              <a:spcAft>
+                <a:spcPts val="600"/>
+              </a:spcAft>
+            </a:pPr>
+            <a:r>
+              <a:rPr lang="nl-NL" sz="1600" dirty="0"/>
+              <a:t>Fouten herstellen.</a:t>
+            </a:r>
+          </a:p>
+          <a:p>
+            <a:pPr>
+              <a:spcAft>
+                <a:spcPts val="600"/>
+              </a:spcAft>
+            </a:pPr>
+            <a:r>
+              <a:rPr lang="nl-NL" sz="2000" dirty="0"/>
+              <a:t>Aftakkingen aanmaken</a:t>
+            </a:r>
+          </a:p>
+          <a:p>
+            <a:pPr lvl="1">
+              <a:spcAft>
+                <a:spcPts val="600"/>
+              </a:spcAft>
+            </a:pPr>
+            <a:r>
+              <a:rPr lang="nl-NL" sz="1600" dirty="0" err="1"/>
+              <a:t>Branch</a:t>
+            </a:r>
+            <a:r>
+              <a:rPr lang="nl-NL" sz="1600" dirty="0"/>
+              <a:t> aanmaken.</a:t>
+            </a:r>
+          </a:p>
+          <a:p>
+            <a:pPr lvl="1">
+              <a:spcAft>
+                <a:spcPts val="600"/>
+              </a:spcAft>
+            </a:pPr>
+            <a:r>
+              <a:rPr lang="nl-NL" sz="1600" noProof="0" dirty="0" err="1"/>
+              <a:t>Merge</a:t>
+            </a:r>
+            <a:r>
+              <a:rPr lang="nl-NL" sz="1600" noProof="0" dirty="0"/>
+              <a:t> strategieën.</a:t>
+            </a:r>
+          </a:p>
+          <a:p>
+            <a:pPr lvl="1">
+              <a:spcAft>
+                <a:spcPts val="600"/>
+              </a:spcAft>
+            </a:pPr>
+            <a:r>
+              <a:rPr lang="nl-NL" sz="1600" noProof="0" dirty="0"/>
+              <a:t>Conflicten oplossen.</a:t>
+            </a:r>
+          </a:p>
+          <a:p>
+            <a:pPr lvl="1">
+              <a:spcAft>
+                <a:spcPts val="600"/>
+              </a:spcAft>
+            </a:pPr>
+            <a:endParaRPr lang="nl-NL" sz="1600" noProof="0" dirty="0"/>
+          </a:p>
+        </p:txBody>
+      </p:sp>
+      <p:pic>
+        <p:nvPicPr>
+          <p:cNvPr id="4" name="Picture 3">
+            <a:extLst>
+              <a:ext uri="{FF2B5EF4-FFF2-40B4-BE49-F238E27FC236}">
+                <a16:creationId xmlns:a16="http://schemas.microsoft.com/office/drawing/2014/main" id="{10F1785D-DBAB-C34E-4C20-A2078BA9DAEA}"/>
+              </a:ext>
+            </a:extLst>
+          </p:cNvPr>
+          <p:cNvPicPr>
+            <a:picLocks noChangeAspect="1"/>
+          </p:cNvPicPr>
+          <p:nvPr/>
+        </p:nvPicPr>
+        <p:blipFill>
+          <a:blip r:embed="rId2"/>
+          <a:stretch>
+            <a:fillRect/>
+          </a:stretch>
+        </p:blipFill>
+        <p:spPr>
+          <a:xfrm rot="1217736">
+            <a:off x="8321964" y="3685187"/>
+            <a:ext cx="2694468" cy="2415360"/>
+          </a:xfrm>
+          <a:prstGeom prst="rect">
+            <a:avLst/>
+          </a:prstGeom>
+        </p:spPr>
+      </p:pic>
+    </p:spTree>
+    <p:extLst>
+      <p:ext uri="{BB962C8B-B14F-4D97-AF65-F5344CB8AC3E}">
+        <p14:creationId xmlns:p14="http://schemas.microsoft.com/office/powerpoint/2010/main" val="1265611121"/>
+      </p:ext>
+    </p:extLst>
+  </p:cSld>
+  <p:clrMapOvr>
+    <a:masterClrMapping/>
+  </p:clrMapOvr>
+</p:sld>
+</file>
+
+<file path=ppt/slides/slide20.xml><?xml version="1.0" encoding="utf-8"?>
 <p:sld xmlns:a="http://schemas.openxmlformats.org/drawingml/2006/main" xmlns:r="http://schemas.openxmlformats.org/officeDocument/2006/relationships" xmlns:p="http://schemas.openxmlformats.org/presentationml/2006/main">
   <p:cSld>
     <p:spTree>
@@ -10026,7 +12234,7 @@
 </p:sld>
 </file>
 
-<file path=ppt/slides/slide18.xml><?xml version="1.0" encoding="utf-8"?>
+<file path=ppt/slides/slide21.xml><?xml version="1.0" encoding="utf-8"?>
 <p:sld xmlns:a="http://schemas.openxmlformats.org/drawingml/2006/main" xmlns:r="http://schemas.openxmlformats.org/officeDocument/2006/relationships" xmlns:p="http://schemas.openxmlformats.org/presentationml/2006/main">
   <p:cSld>
     <p:spTree>
@@ -10541,7 +12749,7 @@
 </p:sld>
 </file>
 
-<file path=ppt/slides/slide19.xml><?xml version="1.0" encoding="utf-8"?>
+<file path=ppt/slides/slide22.xml><?xml version="1.0" encoding="utf-8"?>
 <p:sld xmlns:a="http://schemas.openxmlformats.org/drawingml/2006/main" xmlns:r="http://schemas.openxmlformats.org/officeDocument/2006/relationships" xmlns:p="http://schemas.openxmlformats.org/presentationml/2006/main">
   <p:cSld>
     <p:spTree>
@@ -11161,298 +13369,7 @@
 </p:sld>
 </file>
 
-<file path=ppt/slides/slide2.xml><?xml version="1.0" encoding="utf-8"?>
-<p:sld xmlns:a="http://schemas.openxmlformats.org/drawingml/2006/main" xmlns:r="http://schemas.openxmlformats.org/officeDocument/2006/relationships" xmlns:p="http://schemas.openxmlformats.org/presentationml/2006/main">
-  <p:cSld>
-    <p:spTree>
-      <p:nvGrpSpPr>
-        <p:cNvPr id="1" name=""/>
-        <p:cNvGrpSpPr/>
-        <p:nvPr/>
-      </p:nvGrpSpPr>
-      <p:grpSpPr>
-        <a:xfrm>
-          <a:off x="0" y="0"/>
-          <a:ext cx="0" cy="0"/>
-          <a:chOff x="0" y="0"/>
-          <a:chExt cx="0" cy="0"/>
-        </a:xfrm>
-      </p:grpSpPr>
-      <p:sp>
-        <p:nvSpPr>
-          <p:cNvPr id="2" name="Title 1">
-            <a:extLst>
-              <a:ext uri="{FF2B5EF4-FFF2-40B4-BE49-F238E27FC236}">
-                <a16:creationId xmlns:a16="http://schemas.microsoft.com/office/drawing/2014/main" id="{39A1D606-8DD1-369C-5C09-471CDD551AD5}"/>
-              </a:ext>
-            </a:extLst>
-          </p:cNvPr>
-          <p:cNvSpPr>
-            <a:spLocks noGrp="1"/>
-          </p:cNvSpPr>
-          <p:nvPr>
-            <p:ph type="title"/>
-          </p:nvPr>
-        </p:nvSpPr>
-        <p:spPr>
-          <a:xfrm>
-            <a:off x="838200" y="365126"/>
-            <a:ext cx="10515600" cy="718608"/>
-          </a:xfrm>
-        </p:spPr>
-        <p:txBody>
-          <a:bodyPr>
-            <a:normAutofit/>
-          </a:bodyPr>
-          <a:lstStyle/>
-          <a:p>
-            <a:r>
-              <a:rPr lang="nl-NL" sz="3600" noProof="0" dirty="0"/>
-              <a:t>Agenda</a:t>
-            </a:r>
-          </a:p>
-        </p:txBody>
-      </p:sp>
-      <p:sp>
-        <p:nvSpPr>
-          <p:cNvPr id="3" name="Content Placeholder 2">
-            <a:extLst>
-              <a:ext uri="{FF2B5EF4-FFF2-40B4-BE49-F238E27FC236}">
-                <a16:creationId xmlns:a16="http://schemas.microsoft.com/office/drawing/2014/main" id="{F4C2D286-E049-0AAB-1360-B7157E11AD7E}"/>
-              </a:ext>
-            </a:extLst>
-          </p:cNvPr>
-          <p:cNvSpPr>
-            <a:spLocks noGrp="1"/>
-          </p:cNvSpPr>
-          <p:nvPr>
-            <p:ph idx="1"/>
-          </p:nvPr>
-        </p:nvSpPr>
-        <p:spPr>
-          <a:xfrm>
-            <a:off x="838200" y="1456267"/>
-            <a:ext cx="10515600" cy="4720696"/>
-          </a:xfrm>
-        </p:spPr>
-        <p:txBody>
-          <a:bodyPr>
-            <a:normAutofit/>
-          </a:bodyPr>
-          <a:lstStyle/>
-          <a:p>
-            <a:pPr>
-              <a:spcAft>
-                <a:spcPts val="600"/>
-              </a:spcAft>
-            </a:pPr>
-            <a:r>
-              <a:rPr lang="nl-NL" sz="2000" noProof="0" dirty="0"/>
-              <a:t>Introductie</a:t>
-            </a:r>
-            <a:endParaRPr lang="nl-NL" sz="2000" dirty="0"/>
-          </a:p>
-          <a:p>
-            <a:pPr lvl="1">
-              <a:spcAft>
-                <a:spcPts val="600"/>
-              </a:spcAft>
-            </a:pPr>
-            <a:r>
-              <a:rPr lang="nl-NL" sz="1600" noProof="0" dirty="0"/>
-              <a:t>Wat is git?</a:t>
-            </a:r>
-          </a:p>
-          <a:p>
-            <a:pPr lvl="1">
-              <a:spcAft>
-                <a:spcPts val="600"/>
-              </a:spcAft>
-            </a:pPr>
-            <a:r>
-              <a:rPr lang="nl-NL" sz="1600" noProof="0" dirty="0"/>
-              <a:t>Hoe werkt git?</a:t>
-            </a:r>
-          </a:p>
-          <a:p>
-            <a:pPr>
-              <a:spcAft>
-                <a:spcPts val="600"/>
-              </a:spcAft>
-            </a:pPr>
-            <a:r>
-              <a:rPr lang="nl-NL" sz="2000" dirty="0"/>
-              <a:t>Werken met versies</a:t>
-            </a:r>
-            <a:endParaRPr lang="nl-NL" sz="1600" dirty="0"/>
-          </a:p>
-          <a:p>
-            <a:pPr lvl="1">
-              <a:spcAft>
-                <a:spcPts val="600"/>
-              </a:spcAft>
-            </a:pPr>
-            <a:r>
-              <a:rPr lang="nl-NL" sz="1600" dirty="0"/>
-              <a:t>Repository opzetten</a:t>
-            </a:r>
-            <a:endParaRPr lang="nl-NL" sz="1600" noProof="0" dirty="0"/>
-          </a:p>
-          <a:p>
-            <a:pPr lvl="1">
-              <a:spcAft>
-                <a:spcPts val="600"/>
-              </a:spcAft>
-            </a:pPr>
-            <a:r>
-              <a:rPr lang="nl-NL" sz="1600" dirty="0"/>
-              <a:t>Een </a:t>
-            </a:r>
-            <a:r>
-              <a:rPr lang="nl-NL" sz="1600" dirty="0" err="1"/>
-              <a:t>commit</a:t>
-            </a:r>
-            <a:r>
-              <a:rPr lang="nl-NL" sz="1600" dirty="0"/>
-              <a:t> aanmaken.</a:t>
-            </a:r>
-          </a:p>
-          <a:p>
-            <a:pPr lvl="1">
-              <a:spcAft>
-                <a:spcPts val="600"/>
-              </a:spcAft>
-            </a:pPr>
-            <a:r>
-              <a:rPr lang="nl-NL" sz="1600" dirty="0"/>
-              <a:t>Wat gebeurt er in de </a:t>
-            </a:r>
-            <a:r>
-              <a:rPr lang="nl-NL" sz="1600" dirty="0" err="1"/>
-              <a:t>repository</a:t>
-            </a:r>
-            <a:r>
-              <a:rPr lang="nl-NL" sz="1600" dirty="0"/>
-              <a:t>?</a:t>
-            </a:r>
-          </a:p>
-          <a:p>
-            <a:pPr lvl="1">
-              <a:spcAft>
-                <a:spcPts val="600"/>
-              </a:spcAft>
-            </a:pPr>
-            <a:r>
-              <a:rPr lang="nl-NL" sz="1600" dirty="0"/>
-              <a:t>Fouten herstellen.</a:t>
-            </a:r>
-          </a:p>
-          <a:p>
-            <a:pPr>
-              <a:spcAft>
-                <a:spcPts val="600"/>
-              </a:spcAft>
-            </a:pPr>
-            <a:r>
-              <a:rPr lang="nl-NL" sz="2000" dirty="0"/>
-              <a:t>Aftakkingen aanmaken</a:t>
-            </a:r>
-          </a:p>
-          <a:p>
-            <a:pPr lvl="1">
-              <a:spcAft>
-                <a:spcPts val="600"/>
-              </a:spcAft>
-            </a:pPr>
-            <a:r>
-              <a:rPr lang="nl-NL" sz="1600" dirty="0" err="1"/>
-              <a:t>Branch</a:t>
-            </a:r>
-            <a:r>
-              <a:rPr lang="nl-NL" sz="1600" dirty="0"/>
-              <a:t> aanmaken.</a:t>
-            </a:r>
-          </a:p>
-          <a:p>
-            <a:pPr lvl="1">
-              <a:spcAft>
-                <a:spcPts val="600"/>
-              </a:spcAft>
-            </a:pPr>
-            <a:r>
-              <a:rPr lang="nl-NL" sz="1600" noProof="0" dirty="0" err="1"/>
-              <a:t>Merge</a:t>
-            </a:r>
-            <a:r>
-              <a:rPr lang="nl-NL" sz="1600" noProof="0" dirty="0"/>
-              <a:t> strategieën.</a:t>
-            </a:r>
-          </a:p>
-          <a:p>
-            <a:pPr lvl="1">
-              <a:spcAft>
-                <a:spcPts val="600"/>
-              </a:spcAft>
-            </a:pPr>
-            <a:r>
-              <a:rPr lang="nl-NL" sz="1600" noProof="0" dirty="0"/>
-              <a:t>Conflicten oplossen.</a:t>
-            </a:r>
-          </a:p>
-          <a:p>
-            <a:pPr lvl="1">
-              <a:spcAft>
-                <a:spcPts val="600"/>
-              </a:spcAft>
-            </a:pPr>
-            <a:endParaRPr lang="nl-NL" sz="1600" noProof="0" dirty="0"/>
-          </a:p>
-        </p:txBody>
-      </p:sp>
-      <p:pic>
-        <p:nvPicPr>
-          <p:cNvPr id="4" name="Picture 3">
-            <a:extLst>
-              <a:ext uri="{FF2B5EF4-FFF2-40B4-BE49-F238E27FC236}">
-                <a16:creationId xmlns:a16="http://schemas.microsoft.com/office/drawing/2014/main" id="{10F1785D-DBAB-C34E-4C20-A2078BA9DAEA}"/>
-              </a:ext>
-            </a:extLst>
-          </p:cNvPr>
-          <p:cNvPicPr>
-            <a:picLocks noChangeAspect="1"/>
-          </p:cNvPicPr>
-          <p:nvPr/>
-        </p:nvPicPr>
-        <p:blipFill>
-          <a:blip r:embed="rId2"/>
-          <a:stretch>
-            <a:fillRect/>
-          </a:stretch>
-        </p:blipFill>
-        <p:spPr>
-          <a:xfrm rot="1217736">
-            <a:off x="8321964" y="3685187"/>
-            <a:ext cx="2694468" cy="2415360"/>
-          </a:xfrm>
-          <a:prstGeom prst="rect">
-            <a:avLst/>
-          </a:prstGeom>
-        </p:spPr>
-      </p:pic>
-    </p:spTree>
-    <p:extLst>
-      <p:ext uri="{BB962C8B-B14F-4D97-AF65-F5344CB8AC3E}">
-        <p14:creationId xmlns:p14="http://schemas.microsoft.com/office/powerpoint/2010/main" val="1265611121"/>
-      </p:ext>
-    </p:extLst>
-  </p:cSld>
-  <p:clrMapOvr>
-    <a:masterClrMapping/>
-  </p:clrMapOvr>
-</p:sld>
-</file>
-
-<file path=ppt/slides/slide20.xml><?xml version="1.0" encoding="utf-8"?>
+<file path=ppt/slides/slide23.xml><?xml version="1.0" encoding="utf-8"?>
 <p:sld xmlns:a="http://schemas.openxmlformats.org/drawingml/2006/main" xmlns:r="http://schemas.openxmlformats.org/officeDocument/2006/relationships" xmlns:p="http://schemas.openxmlformats.org/presentationml/2006/main">
   <p:cSld>
     <p:spTree>
@@ -12005,7 +13922,7 @@
 </p:sld>
 </file>
 
-<file path=ppt/slides/slide21.xml><?xml version="1.0" encoding="utf-8"?>
+<file path=ppt/slides/slide24.xml><?xml version="1.0" encoding="utf-8"?>
 <p:sld xmlns:a="http://schemas.openxmlformats.org/drawingml/2006/main" xmlns:r="http://schemas.openxmlformats.org/officeDocument/2006/relationships" xmlns:p="http://schemas.openxmlformats.org/presentationml/2006/main">
   <p:cSld>
     <p:spTree>
@@ -12664,7 +14581,7 @@
 </p:sld>
 </file>
 
-<file path=ppt/slides/slide22.xml><?xml version="1.0" encoding="utf-8"?>
+<file path=ppt/slides/slide25.xml><?xml version="1.0" encoding="utf-8"?>
 <p:sld xmlns:a="http://schemas.openxmlformats.org/drawingml/2006/main" xmlns:r="http://schemas.openxmlformats.org/officeDocument/2006/relationships" xmlns:p="http://schemas.openxmlformats.org/presentationml/2006/main">
   <p:cSld>
     <p:spTree>
@@ -13300,7 +15217,7 @@
 </p:sld>
 </file>
 
-<file path=ppt/slides/slide23.xml><?xml version="1.0" encoding="utf-8"?>
+<file path=ppt/slides/slide26.xml><?xml version="1.0" encoding="utf-8"?>
 <p:sld xmlns:a="http://schemas.openxmlformats.org/drawingml/2006/main" xmlns:r="http://schemas.openxmlformats.org/officeDocument/2006/relationships" xmlns:p="http://schemas.openxmlformats.org/presentationml/2006/main">
   <p:cSld>
     <p:spTree>
@@ -13389,7 +15306,7 @@
 </p:sld>
 </file>
 
-<file path=ppt/slides/slide24.xml><?xml version="1.0" encoding="utf-8"?>
+<file path=ppt/slides/slide27.xml><?xml version="1.0" encoding="utf-8"?>
 <p:sld xmlns:a="http://schemas.openxmlformats.org/drawingml/2006/main" xmlns:r="http://schemas.openxmlformats.org/officeDocument/2006/relationships" xmlns:p="http://schemas.openxmlformats.org/presentationml/2006/main">
   <p:cSld>
     <p:spTree>
@@ -13836,7 +15753,7 @@
 </p:sld>
 </file>
 
-<file path=ppt/slides/slide25.xml><?xml version="1.0" encoding="utf-8"?>
+<file path=ppt/slides/slide28.xml><?xml version="1.0" encoding="utf-8"?>
 <p:sld xmlns:a="http://schemas.openxmlformats.org/drawingml/2006/main" xmlns:r="http://schemas.openxmlformats.org/officeDocument/2006/relationships" xmlns:p="http://schemas.openxmlformats.org/presentationml/2006/main">
   <p:cSld>
     <p:spTree>
@@ -14600,7 +16517,7 @@
 </p:sld>
 </file>
 
-<file path=ppt/slides/slide26.xml><?xml version="1.0" encoding="utf-8"?>
+<file path=ppt/slides/slide29.xml><?xml version="1.0" encoding="utf-8"?>
 <p:sld xmlns:a="http://schemas.openxmlformats.org/drawingml/2006/main" xmlns:r="http://schemas.openxmlformats.org/officeDocument/2006/relationships" xmlns:p="http://schemas.openxmlformats.org/presentationml/2006/main">
   <p:cSld>
     <p:spTree>
@@ -15088,7 +17005,90 @@
 </p:sld>
 </file>
 
-<file path=ppt/slides/slide27.xml><?xml version="1.0" encoding="utf-8"?>
+<file path=ppt/slides/slide3.xml><?xml version="1.0" encoding="utf-8"?>
+<p:sld xmlns:a="http://schemas.openxmlformats.org/drawingml/2006/main" xmlns:r="http://schemas.openxmlformats.org/officeDocument/2006/relationships" xmlns:p="http://schemas.openxmlformats.org/presentationml/2006/main">
+  <p:cSld>
+    <p:spTree>
+      <p:nvGrpSpPr>
+        <p:cNvPr id="1" name=""/>
+        <p:cNvGrpSpPr/>
+        <p:nvPr/>
+      </p:nvGrpSpPr>
+      <p:grpSpPr>
+        <a:xfrm>
+          <a:off x="0" y="0"/>
+          <a:ext cx="0" cy="0"/>
+          <a:chOff x="0" y="0"/>
+          <a:chExt cx="0" cy="0"/>
+        </a:xfrm>
+      </p:grpSpPr>
+      <p:sp>
+        <p:nvSpPr>
+          <p:cNvPr id="4" name="Title 3">
+            <a:extLst>
+              <a:ext uri="{FF2B5EF4-FFF2-40B4-BE49-F238E27FC236}">
+                <a16:creationId xmlns:a16="http://schemas.microsoft.com/office/drawing/2014/main" id="{72C925CA-BCA3-3701-E08E-95652380B32E}"/>
+              </a:ext>
+            </a:extLst>
+          </p:cNvPr>
+          <p:cNvSpPr>
+            <a:spLocks noGrp="1"/>
+          </p:cNvSpPr>
+          <p:nvPr>
+            <p:ph type="title"/>
+          </p:nvPr>
+        </p:nvSpPr>
+        <p:spPr/>
+        <p:txBody>
+          <a:bodyPr/>
+          <a:lstStyle/>
+          <a:p>
+            <a:r>
+              <a:rPr lang="nl-NL" noProof="0" dirty="0"/>
+              <a:t>Introductie</a:t>
+            </a:r>
+          </a:p>
+        </p:txBody>
+      </p:sp>
+      <p:sp>
+        <p:nvSpPr>
+          <p:cNvPr id="5" name="Text Placeholder 4">
+            <a:extLst>
+              <a:ext uri="{FF2B5EF4-FFF2-40B4-BE49-F238E27FC236}">
+                <a16:creationId xmlns:a16="http://schemas.microsoft.com/office/drawing/2014/main" id="{1AB31C95-91AF-DF13-FB58-0DA5F2D9F6F7}"/>
+              </a:ext>
+            </a:extLst>
+          </p:cNvPr>
+          <p:cNvSpPr>
+            <a:spLocks noGrp="1"/>
+          </p:cNvSpPr>
+          <p:nvPr>
+            <p:ph type="body" idx="1"/>
+          </p:nvPr>
+        </p:nvSpPr>
+        <p:spPr/>
+        <p:txBody>
+          <a:bodyPr/>
+          <a:lstStyle/>
+          <a:p>
+            <a:endParaRPr lang="en-NL"/>
+          </a:p>
+        </p:txBody>
+      </p:sp>
+    </p:spTree>
+    <p:extLst>
+      <p:ext uri="{BB962C8B-B14F-4D97-AF65-F5344CB8AC3E}">
+        <p14:creationId xmlns:p14="http://schemas.microsoft.com/office/powerpoint/2010/main" val="276640083"/>
+      </p:ext>
+    </p:extLst>
+  </p:cSld>
+  <p:clrMapOvr>
+    <a:masterClrMapping/>
+  </p:clrMapOvr>
+</p:sld>
+</file>
+
+<file path=ppt/slides/slide30.xml><?xml version="1.0" encoding="utf-8"?>
 <p:sld xmlns:a="http://schemas.openxmlformats.org/drawingml/2006/main" xmlns:r="http://schemas.openxmlformats.org/officeDocument/2006/relationships" xmlns:p="http://schemas.openxmlformats.org/presentationml/2006/main">
   <p:cSld>
     <p:spTree>
@@ -15615,7 +17615,7 @@
 </p:sld>
 </file>
 
-<file path=ppt/slides/slide28.xml><?xml version="1.0" encoding="utf-8"?>
+<file path=ppt/slides/slide31.xml><?xml version="1.0" encoding="utf-8"?>
 <p:sld xmlns:a="http://schemas.openxmlformats.org/drawingml/2006/main" xmlns:r="http://schemas.openxmlformats.org/officeDocument/2006/relationships" xmlns:p="http://schemas.openxmlformats.org/presentationml/2006/main">
   <p:cSld>
     <p:spTree>
@@ -16027,89 +18027,6 @@
     <p:extLst>
       <p:ext uri="{BB962C8B-B14F-4D97-AF65-F5344CB8AC3E}">
         <p14:creationId xmlns:p14="http://schemas.microsoft.com/office/powerpoint/2010/main" val="4287688984"/>
-      </p:ext>
-    </p:extLst>
-  </p:cSld>
-  <p:clrMapOvr>
-    <a:masterClrMapping/>
-  </p:clrMapOvr>
-</p:sld>
-</file>
-
-<file path=ppt/slides/slide3.xml><?xml version="1.0" encoding="utf-8"?>
-<p:sld xmlns:a="http://schemas.openxmlformats.org/drawingml/2006/main" xmlns:r="http://schemas.openxmlformats.org/officeDocument/2006/relationships" xmlns:p="http://schemas.openxmlformats.org/presentationml/2006/main">
-  <p:cSld>
-    <p:spTree>
-      <p:nvGrpSpPr>
-        <p:cNvPr id="1" name=""/>
-        <p:cNvGrpSpPr/>
-        <p:nvPr/>
-      </p:nvGrpSpPr>
-      <p:grpSpPr>
-        <a:xfrm>
-          <a:off x="0" y="0"/>
-          <a:ext cx="0" cy="0"/>
-          <a:chOff x="0" y="0"/>
-          <a:chExt cx="0" cy="0"/>
-        </a:xfrm>
-      </p:grpSpPr>
-      <p:sp>
-        <p:nvSpPr>
-          <p:cNvPr id="4" name="Title 3">
-            <a:extLst>
-              <a:ext uri="{FF2B5EF4-FFF2-40B4-BE49-F238E27FC236}">
-                <a16:creationId xmlns:a16="http://schemas.microsoft.com/office/drawing/2014/main" id="{72C925CA-BCA3-3701-E08E-95652380B32E}"/>
-              </a:ext>
-            </a:extLst>
-          </p:cNvPr>
-          <p:cNvSpPr>
-            <a:spLocks noGrp="1"/>
-          </p:cNvSpPr>
-          <p:nvPr>
-            <p:ph type="title"/>
-          </p:nvPr>
-        </p:nvSpPr>
-        <p:spPr/>
-        <p:txBody>
-          <a:bodyPr/>
-          <a:lstStyle/>
-          <a:p>
-            <a:r>
-              <a:rPr lang="nl-NL" noProof="0" dirty="0"/>
-              <a:t>Introductie</a:t>
-            </a:r>
-          </a:p>
-        </p:txBody>
-      </p:sp>
-      <p:sp>
-        <p:nvSpPr>
-          <p:cNvPr id="5" name="Text Placeholder 4">
-            <a:extLst>
-              <a:ext uri="{FF2B5EF4-FFF2-40B4-BE49-F238E27FC236}">
-                <a16:creationId xmlns:a16="http://schemas.microsoft.com/office/drawing/2014/main" id="{1AB31C95-91AF-DF13-FB58-0DA5F2D9F6F7}"/>
-              </a:ext>
-            </a:extLst>
-          </p:cNvPr>
-          <p:cNvSpPr>
-            <a:spLocks noGrp="1"/>
-          </p:cNvSpPr>
-          <p:nvPr>
-            <p:ph type="body" idx="1"/>
-          </p:nvPr>
-        </p:nvSpPr>
-        <p:spPr/>
-        <p:txBody>
-          <a:bodyPr/>
-          <a:lstStyle/>
-          <a:p>
-            <a:endParaRPr lang="en-NL"/>
-          </a:p>
-        </p:txBody>
-      </p:sp>
-    </p:spTree>
-    <p:extLst>
-      <p:ext uri="{BB962C8B-B14F-4D97-AF65-F5344CB8AC3E}">
-        <p14:creationId xmlns:p14="http://schemas.microsoft.com/office/powerpoint/2010/main" val="276640083"/>
       </p:ext>
     </p:extLst>
   </p:cSld>
@@ -16313,13 +18230,7 @@
               <a:rPr lang="nl-NL" sz="1800" dirty="0">
                 <a:cs typeface="Courier New" panose="02070309020205020404" pitchFamily="49" charset="0"/>
               </a:rPr>
-              <a:t>Eens in git </a:t>
-            </a:r>
-            <a:r>
-              <a:rPr lang="nl-NL" sz="1800">
-                <a:cs typeface="Courier New" panose="02070309020205020404" pitchFamily="49" charset="0"/>
-              </a:rPr>
-              <a:t>== altijd in git!</a:t>
+              <a:t>Eens in git == altijd in git!</a:t>
             </a:r>
             <a:endParaRPr lang="nl-NL" sz="1800" noProof="0" dirty="0">
               <a:cs typeface="Courier New" panose="02070309020205020404" pitchFamily="49" charset="0"/>

</xml_diff>

<commit_message>
Improve Python part 5 exercise 2
</commit_message>
<xml_diff>
--- a/git/1_basics/git_basic.pptx
+++ b/git/1_basics/git_basic.pptx
@@ -5,7 +5,7 @@
     <p:sldMasterId id="2147483648" r:id="rId1"/>
   </p:sldMasterIdLst>
   <p:notesMasterIdLst>
-    <p:notesMasterId r:id="rId33"/>
+    <p:notesMasterId r:id="rId35"/>
   </p:notesMasterIdLst>
   <p:sldIdLst>
     <p:sldId id="256" r:id="rId2"/>
@@ -23,22 +23,24 @@
     <p:sldId id="368" r:id="rId14"/>
     <p:sldId id="369" r:id="rId15"/>
     <p:sldId id="370" r:id="rId16"/>
-    <p:sldId id="377" r:id="rId17"/>
-    <p:sldId id="378" r:id="rId18"/>
-    <p:sldId id="379" r:id="rId19"/>
-    <p:sldId id="357" r:id="rId20"/>
-    <p:sldId id="359" r:id="rId21"/>
-    <p:sldId id="372" r:id="rId22"/>
-    <p:sldId id="373" r:id="rId23"/>
-    <p:sldId id="374" r:id="rId24"/>
-    <p:sldId id="375" r:id="rId25"/>
-    <p:sldId id="376" r:id="rId26"/>
-    <p:sldId id="371" r:id="rId27"/>
-    <p:sldId id="258" r:id="rId28"/>
-    <p:sldId id="292" r:id="rId29"/>
-    <p:sldId id="266" r:id="rId30"/>
-    <p:sldId id="263" r:id="rId31"/>
-    <p:sldId id="332" r:id="rId32"/>
+    <p:sldId id="380" r:id="rId17"/>
+    <p:sldId id="379" r:id="rId18"/>
+    <p:sldId id="377" r:id="rId19"/>
+    <p:sldId id="378" r:id="rId20"/>
+    <p:sldId id="381" r:id="rId21"/>
+    <p:sldId id="357" r:id="rId22"/>
+    <p:sldId id="359" r:id="rId23"/>
+    <p:sldId id="372" r:id="rId24"/>
+    <p:sldId id="373" r:id="rId25"/>
+    <p:sldId id="374" r:id="rId26"/>
+    <p:sldId id="375" r:id="rId27"/>
+    <p:sldId id="376" r:id="rId28"/>
+    <p:sldId id="371" r:id="rId29"/>
+    <p:sldId id="258" r:id="rId30"/>
+    <p:sldId id="292" r:id="rId31"/>
+    <p:sldId id="266" r:id="rId32"/>
+    <p:sldId id="263" r:id="rId33"/>
+    <p:sldId id="332" r:id="rId34"/>
   </p:sldIdLst>
   <p:sldSz cx="12192000" cy="6858000"/>
   <p:notesSz cx="6858000" cy="9144000"/>
@@ -227,7 +229,7 @@
           <a:p>
             <a:fld id="{3BADDCAA-88FC-44D4-A91A-DD0530AB88E0}" type="datetimeFigureOut">
               <a:rPr lang="en-NL" smtClean="0"/>
-              <a:t>15/10/2024</a:t>
+              <a:t>25/10/2024</a:t>
             </a:fld>
             <a:endParaRPr lang="en-NL"/>
           </a:p>
@@ -803,6 +805,114 @@
         <p:cNvPr id="1" name="">
           <a:extLst>
             <a:ext uri="{FF2B5EF4-FFF2-40B4-BE49-F238E27FC236}">
+              <a16:creationId xmlns:a16="http://schemas.microsoft.com/office/drawing/2014/main" id="{FD96686E-96C7-9213-C3F5-DB15686E6BB6}"/>
+            </a:ext>
+          </a:extLst>
+        </p:cNvPr>
+        <p:cNvGrpSpPr/>
+        <p:nvPr/>
+      </p:nvGrpSpPr>
+      <p:grpSpPr>
+        <a:xfrm>
+          <a:off x="0" y="0"/>
+          <a:ext cx="0" cy="0"/>
+          <a:chOff x="0" y="0"/>
+          <a:chExt cx="0" cy="0"/>
+        </a:xfrm>
+      </p:grpSpPr>
+      <p:sp>
+        <p:nvSpPr>
+          <p:cNvPr id="2" name="Slide Image Placeholder 1">
+            <a:extLst>
+              <a:ext uri="{FF2B5EF4-FFF2-40B4-BE49-F238E27FC236}">
+                <a16:creationId xmlns:a16="http://schemas.microsoft.com/office/drawing/2014/main" id="{68C25D0B-20C1-08BA-70FB-20E3C3523B3D}"/>
+              </a:ext>
+            </a:extLst>
+          </p:cNvPr>
+          <p:cNvSpPr>
+            <a:spLocks noGrp="1" noRot="1" noChangeAspect="1"/>
+          </p:cNvSpPr>
+          <p:nvPr>
+            <p:ph type="sldImg"/>
+          </p:nvPr>
+        </p:nvSpPr>
+        <p:spPr/>
+      </p:sp>
+      <p:sp>
+        <p:nvSpPr>
+          <p:cNvPr id="3" name="Notes Placeholder 2">
+            <a:extLst>
+              <a:ext uri="{FF2B5EF4-FFF2-40B4-BE49-F238E27FC236}">
+                <a16:creationId xmlns:a16="http://schemas.microsoft.com/office/drawing/2014/main" id="{7C8AA036-DBE5-310D-57CE-5EA5BDD38AB7}"/>
+              </a:ext>
+            </a:extLst>
+          </p:cNvPr>
+          <p:cNvSpPr>
+            <a:spLocks noGrp="1"/>
+          </p:cNvSpPr>
+          <p:nvPr>
+            <p:ph type="body" idx="1"/>
+          </p:nvPr>
+        </p:nvSpPr>
+        <p:spPr/>
+        <p:txBody>
+          <a:bodyPr/>
+          <a:lstStyle/>
+          <a:p>
+            <a:endParaRPr lang="nl-NL" dirty="0"/>
+          </a:p>
+        </p:txBody>
+      </p:sp>
+      <p:sp>
+        <p:nvSpPr>
+          <p:cNvPr id="4" name="Slide Number Placeholder 3">
+            <a:extLst>
+              <a:ext uri="{FF2B5EF4-FFF2-40B4-BE49-F238E27FC236}">
+                <a16:creationId xmlns:a16="http://schemas.microsoft.com/office/drawing/2014/main" id="{1DEC5B85-101B-2858-27A1-D721FF94E60A}"/>
+              </a:ext>
+            </a:extLst>
+          </p:cNvPr>
+          <p:cNvSpPr>
+            <a:spLocks noGrp="1"/>
+          </p:cNvSpPr>
+          <p:nvPr>
+            <p:ph type="sldNum" sz="quarter" idx="5"/>
+          </p:nvPr>
+        </p:nvSpPr>
+        <p:spPr/>
+        <p:txBody>
+          <a:bodyPr/>
+          <a:lstStyle/>
+          <a:p>
+            <a:fld id="{9583DEA5-E342-4DB2-B087-D0B9C490B19E}" type="slidenum">
+              <a:rPr lang="nl-NL" smtClean="0"/>
+              <a:t>17</a:t>
+            </a:fld>
+            <a:endParaRPr lang="nl-NL"/>
+          </a:p>
+        </p:txBody>
+      </p:sp>
+    </p:spTree>
+    <p:extLst>
+      <p:ext uri="{BB962C8B-B14F-4D97-AF65-F5344CB8AC3E}">
+        <p14:creationId xmlns:p14="http://schemas.microsoft.com/office/powerpoint/2010/main" val="2669879187"/>
+      </p:ext>
+    </p:extLst>
+  </p:cSld>
+  <p:clrMapOvr>
+    <a:masterClrMapping/>
+  </p:clrMapOvr>
+</p:notes>
+</file>
+
+<file path=ppt/notesSlides/notesSlide13.xml><?xml version="1.0" encoding="utf-8"?>
+<p:notes xmlns:a="http://schemas.openxmlformats.org/drawingml/2006/main" xmlns:r="http://schemas.openxmlformats.org/officeDocument/2006/relationships" xmlns:p="http://schemas.openxmlformats.org/presentationml/2006/main">
+  <p:cSld>
+    <p:spTree>
+      <p:nvGrpSpPr>
+        <p:cNvPr id="1" name="">
+          <a:extLst>
+            <a:ext uri="{FF2B5EF4-FFF2-40B4-BE49-F238E27FC236}">
               <a16:creationId xmlns:a16="http://schemas.microsoft.com/office/drawing/2014/main" id="{8D742114-A585-DB72-51BC-BFF0CB9CACCF}"/>
             </a:ext>
           </a:extLst>
@@ -884,7 +994,7 @@
           <a:p>
             <a:fld id="{9583DEA5-E342-4DB2-B087-D0B9C490B19E}" type="slidenum">
               <a:rPr lang="nl-NL" smtClean="0"/>
-              <a:t>16</a:t>
+              <a:t>18</a:t>
             </a:fld>
             <a:endParaRPr lang="nl-NL"/>
           </a:p>
@@ -903,7 +1013,7 @@
 </p:notes>
 </file>
 
-<file path=ppt/notesSlides/notesSlide13.xml><?xml version="1.0" encoding="utf-8"?>
+<file path=ppt/notesSlides/notesSlide14.xml><?xml version="1.0" encoding="utf-8"?>
 <p:notes xmlns:a="http://schemas.openxmlformats.org/drawingml/2006/main" xmlns:r="http://schemas.openxmlformats.org/officeDocument/2006/relationships" xmlns:p="http://schemas.openxmlformats.org/presentationml/2006/main">
   <p:cSld>
     <p:spTree>
@@ -992,7 +1102,7 @@
           <a:p>
             <a:fld id="{9583DEA5-E342-4DB2-B087-D0B9C490B19E}" type="slidenum">
               <a:rPr lang="nl-NL" smtClean="0"/>
-              <a:t>17</a:t>
+              <a:t>19</a:t>
             </a:fld>
             <a:endParaRPr lang="nl-NL"/>
           </a:p>
@@ -1002,114 +1112,6 @@
     <p:extLst>
       <p:ext uri="{BB962C8B-B14F-4D97-AF65-F5344CB8AC3E}">
         <p14:creationId xmlns:p14="http://schemas.microsoft.com/office/powerpoint/2010/main" val="3070081646"/>
-      </p:ext>
-    </p:extLst>
-  </p:cSld>
-  <p:clrMapOvr>
-    <a:masterClrMapping/>
-  </p:clrMapOvr>
-</p:notes>
-</file>
-
-<file path=ppt/notesSlides/notesSlide14.xml><?xml version="1.0" encoding="utf-8"?>
-<p:notes xmlns:a="http://schemas.openxmlformats.org/drawingml/2006/main" xmlns:r="http://schemas.openxmlformats.org/officeDocument/2006/relationships" xmlns:p="http://schemas.openxmlformats.org/presentationml/2006/main">
-  <p:cSld>
-    <p:spTree>
-      <p:nvGrpSpPr>
-        <p:cNvPr id="1" name="">
-          <a:extLst>
-            <a:ext uri="{FF2B5EF4-FFF2-40B4-BE49-F238E27FC236}">
-              <a16:creationId xmlns:a16="http://schemas.microsoft.com/office/drawing/2014/main" id="{FD96686E-96C7-9213-C3F5-DB15686E6BB6}"/>
-            </a:ext>
-          </a:extLst>
-        </p:cNvPr>
-        <p:cNvGrpSpPr/>
-        <p:nvPr/>
-      </p:nvGrpSpPr>
-      <p:grpSpPr>
-        <a:xfrm>
-          <a:off x="0" y="0"/>
-          <a:ext cx="0" cy="0"/>
-          <a:chOff x="0" y="0"/>
-          <a:chExt cx="0" cy="0"/>
-        </a:xfrm>
-      </p:grpSpPr>
-      <p:sp>
-        <p:nvSpPr>
-          <p:cNvPr id="2" name="Slide Image Placeholder 1">
-            <a:extLst>
-              <a:ext uri="{FF2B5EF4-FFF2-40B4-BE49-F238E27FC236}">
-                <a16:creationId xmlns:a16="http://schemas.microsoft.com/office/drawing/2014/main" id="{68C25D0B-20C1-08BA-70FB-20E3C3523B3D}"/>
-              </a:ext>
-            </a:extLst>
-          </p:cNvPr>
-          <p:cNvSpPr>
-            <a:spLocks noGrp="1" noRot="1" noChangeAspect="1"/>
-          </p:cNvSpPr>
-          <p:nvPr>
-            <p:ph type="sldImg"/>
-          </p:nvPr>
-        </p:nvSpPr>
-        <p:spPr/>
-      </p:sp>
-      <p:sp>
-        <p:nvSpPr>
-          <p:cNvPr id="3" name="Notes Placeholder 2">
-            <a:extLst>
-              <a:ext uri="{FF2B5EF4-FFF2-40B4-BE49-F238E27FC236}">
-                <a16:creationId xmlns:a16="http://schemas.microsoft.com/office/drawing/2014/main" id="{7C8AA036-DBE5-310D-57CE-5EA5BDD38AB7}"/>
-              </a:ext>
-            </a:extLst>
-          </p:cNvPr>
-          <p:cNvSpPr>
-            <a:spLocks noGrp="1"/>
-          </p:cNvSpPr>
-          <p:nvPr>
-            <p:ph type="body" idx="1"/>
-          </p:nvPr>
-        </p:nvSpPr>
-        <p:spPr/>
-        <p:txBody>
-          <a:bodyPr/>
-          <a:lstStyle/>
-          <a:p>
-            <a:endParaRPr lang="nl-NL" dirty="0"/>
-          </a:p>
-        </p:txBody>
-      </p:sp>
-      <p:sp>
-        <p:nvSpPr>
-          <p:cNvPr id="4" name="Slide Number Placeholder 3">
-            <a:extLst>
-              <a:ext uri="{FF2B5EF4-FFF2-40B4-BE49-F238E27FC236}">
-                <a16:creationId xmlns:a16="http://schemas.microsoft.com/office/drawing/2014/main" id="{1DEC5B85-101B-2858-27A1-D721FF94E60A}"/>
-              </a:ext>
-            </a:extLst>
-          </p:cNvPr>
-          <p:cNvSpPr>
-            <a:spLocks noGrp="1"/>
-          </p:cNvSpPr>
-          <p:nvPr>
-            <p:ph type="sldNum" sz="quarter" idx="5"/>
-          </p:nvPr>
-        </p:nvSpPr>
-        <p:spPr/>
-        <p:txBody>
-          <a:bodyPr/>
-          <a:lstStyle/>
-          <a:p>
-            <a:fld id="{9583DEA5-E342-4DB2-B087-D0B9C490B19E}" type="slidenum">
-              <a:rPr lang="nl-NL" smtClean="0"/>
-              <a:t>18</a:t>
-            </a:fld>
-            <a:endParaRPr lang="nl-NL"/>
-          </a:p>
-        </p:txBody>
-      </p:sp>
-    </p:spTree>
-    <p:extLst>
-      <p:ext uri="{BB962C8B-B14F-4D97-AF65-F5344CB8AC3E}">
-        <p14:creationId xmlns:p14="http://schemas.microsoft.com/office/powerpoint/2010/main" val="2669879187"/>
       </p:ext>
     </p:extLst>
   </p:cSld>
@@ -1208,7 +1210,7 @@
           <a:p>
             <a:fld id="{9583DEA5-E342-4DB2-B087-D0B9C490B19E}" type="slidenum">
               <a:rPr lang="nl-NL" smtClean="0"/>
-              <a:t>20</a:t>
+              <a:t>22</a:t>
             </a:fld>
             <a:endParaRPr lang="nl-NL"/>
           </a:p>
@@ -1316,7 +1318,7 @@
           <a:p>
             <a:fld id="{9583DEA5-E342-4DB2-B087-D0B9C490B19E}" type="slidenum">
               <a:rPr lang="nl-NL" smtClean="0"/>
-              <a:t>21</a:t>
+              <a:t>23</a:t>
             </a:fld>
             <a:endParaRPr lang="nl-NL"/>
           </a:p>
@@ -1435,7 +1437,7 @@
           <a:p>
             <a:fld id="{9583DEA5-E342-4DB2-B087-D0B9C490B19E}" type="slidenum">
               <a:rPr lang="nl-NL" smtClean="0"/>
-              <a:t>22</a:t>
+              <a:t>24</a:t>
             </a:fld>
             <a:endParaRPr lang="nl-NL"/>
           </a:p>
@@ -1543,7 +1545,7 @@
           <a:p>
             <a:fld id="{9583DEA5-E342-4DB2-B087-D0B9C490B19E}" type="slidenum">
               <a:rPr lang="nl-NL" smtClean="0"/>
-              <a:t>23</a:t>
+              <a:t>25</a:t>
             </a:fld>
             <a:endParaRPr lang="nl-NL"/>
           </a:p>
@@ -1651,7 +1653,7 @@
           <a:p>
             <a:fld id="{9583DEA5-E342-4DB2-B087-D0B9C490B19E}" type="slidenum">
               <a:rPr lang="nl-NL" smtClean="0"/>
-              <a:t>24</a:t>
+              <a:t>26</a:t>
             </a:fld>
             <a:endParaRPr lang="nl-NL"/>
           </a:p>
@@ -1859,7 +1861,7 @@
           <a:p>
             <a:fld id="{9583DEA5-E342-4DB2-B087-D0B9C490B19E}" type="slidenum">
               <a:rPr lang="nl-NL" smtClean="0"/>
-              <a:t>25</a:t>
+              <a:t>27</a:t>
             </a:fld>
             <a:endParaRPr lang="nl-NL"/>
           </a:p>
@@ -2803,7 +2805,7 @@
           <a:p>
             <a:fld id="{0EBB069A-003F-4FC0-8534-236B0C5C7B5F}" type="datetimeFigureOut">
               <a:rPr lang="en-NL" smtClean="0"/>
-              <a:t>15/10/2024</a:t>
+              <a:t>25/10/2024</a:t>
             </a:fld>
             <a:endParaRPr lang="en-NL"/>
           </a:p>
@@ -3003,7 +3005,7 @@
           <a:p>
             <a:fld id="{0EBB069A-003F-4FC0-8534-236B0C5C7B5F}" type="datetimeFigureOut">
               <a:rPr lang="en-NL" smtClean="0"/>
-              <a:t>15/10/2024</a:t>
+              <a:t>25/10/2024</a:t>
             </a:fld>
             <a:endParaRPr lang="en-NL"/>
           </a:p>
@@ -3213,7 +3215,7 @@
           <a:p>
             <a:fld id="{0EBB069A-003F-4FC0-8534-236B0C5C7B5F}" type="datetimeFigureOut">
               <a:rPr lang="en-NL" smtClean="0"/>
-              <a:t>15/10/2024</a:t>
+              <a:t>25/10/2024</a:t>
             </a:fld>
             <a:endParaRPr lang="en-NL"/>
           </a:p>
@@ -3413,7 +3415,7 @@
           <a:p>
             <a:fld id="{0EBB069A-003F-4FC0-8534-236B0C5C7B5F}" type="datetimeFigureOut">
               <a:rPr lang="en-NL" smtClean="0"/>
-              <a:t>15/10/2024</a:t>
+              <a:t>25/10/2024</a:t>
             </a:fld>
             <a:endParaRPr lang="en-NL"/>
           </a:p>
@@ -3689,7 +3691,7 @@
           <a:p>
             <a:fld id="{0EBB069A-003F-4FC0-8534-236B0C5C7B5F}" type="datetimeFigureOut">
               <a:rPr lang="en-NL" smtClean="0"/>
-              <a:t>15/10/2024</a:t>
+              <a:t>25/10/2024</a:t>
             </a:fld>
             <a:endParaRPr lang="en-NL"/>
           </a:p>
@@ -3957,7 +3959,7 @@
           <a:p>
             <a:fld id="{0EBB069A-003F-4FC0-8534-236B0C5C7B5F}" type="datetimeFigureOut">
               <a:rPr lang="en-NL" smtClean="0"/>
-              <a:t>15/10/2024</a:t>
+              <a:t>25/10/2024</a:t>
             </a:fld>
             <a:endParaRPr lang="en-NL"/>
           </a:p>
@@ -4372,7 +4374,7 @@
           <a:p>
             <a:fld id="{0EBB069A-003F-4FC0-8534-236B0C5C7B5F}" type="datetimeFigureOut">
               <a:rPr lang="en-NL" smtClean="0"/>
-              <a:t>15/10/2024</a:t>
+              <a:t>25/10/2024</a:t>
             </a:fld>
             <a:endParaRPr lang="en-NL"/>
           </a:p>
@@ -4514,7 +4516,7 @@
           <a:p>
             <a:fld id="{0EBB069A-003F-4FC0-8534-236B0C5C7B5F}" type="datetimeFigureOut">
               <a:rPr lang="en-NL" smtClean="0"/>
-              <a:t>15/10/2024</a:t>
+              <a:t>25/10/2024</a:t>
             </a:fld>
             <a:endParaRPr lang="en-NL"/>
           </a:p>
@@ -4627,7 +4629,7 @@
           <a:p>
             <a:fld id="{0EBB069A-003F-4FC0-8534-236B0C5C7B5F}" type="datetimeFigureOut">
               <a:rPr lang="en-NL" smtClean="0"/>
-              <a:t>15/10/2024</a:t>
+              <a:t>25/10/2024</a:t>
             </a:fld>
             <a:endParaRPr lang="en-NL"/>
           </a:p>
@@ -4940,7 +4942,7 @@
           <a:p>
             <a:fld id="{0EBB069A-003F-4FC0-8534-236B0C5C7B5F}" type="datetimeFigureOut">
               <a:rPr lang="en-NL" smtClean="0"/>
-              <a:t>15/10/2024</a:t>
+              <a:t>25/10/2024</a:t>
             </a:fld>
             <a:endParaRPr lang="en-NL"/>
           </a:p>
@@ -5229,7 +5231,7 @@
           <a:p>
             <a:fld id="{0EBB069A-003F-4FC0-8534-236B0C5C7B5F}" type="datetimeFigureOut">
               <a:rPr lang="en-NL" smtClean="0"/>
-              <a:t>15/10/2024</a:t>
+              <a:t>25/10/2024</a:t>
             </a:fld>
             <a:endParaRPr lang="en-NL"/>
           </a:p>
@@ -5472,7 +5474,7 @@
           <a:p>
             <a:fld id="{0EBB069A-003F-4FC0-8534-236B0C5C7B5F}" type="datetimeFigureOut">
               <a:rPr lang="en-NL" smtClean="0"/>
-              <a:t>15/10/2024</a:t>
+              <a:t>25/10/2024</a:t>
             </a:fld>
             <a:endParaRPr lang="en-NL"/>
           </a:p>
@@ -9952,6 +9954,507 @@
         <p:cNvPr id="1" name="">
           <a:extLst>
             <a:ext uri="{FF2B5EF4-FFF2-40B4-BE49-F238E27FC236}">
+              <a16:creationId xmlns:a16="http://schemas.microsoft.com/office/drawing/2014/main" id="{12F0E680-E13E-A73F-ECB1-CA5A486D6688}"/>
+            </a:ext>
+          </a:extLst>
+        </p:cNvPr>
+        <p:cNvGrpSpPr/>
+        <p:nvPr/>
+      </p:nvGrpSpPr>
+      <p:grpSpPr>
+        <a:xfrm>
+          <a:off x="0" y="0"/>
+          <a:ext cx="0" cy="0"/>
+          <a:chOff x="0" y="0"/>
+          <a:chExt cx="0" cy="0"/>
+        </a:xfrm>
+      </p:grpSpPr>
+      <p:sp>
+        <p:nvSpPr>
+          <p:cNvPr id="4" name="Title 3">
+            <a:extLst>
+              <a:ext uri="{FF2B5EF4-FFF2-40B4-BE49-F238E27FC236}">
+                <a16:creationId xmlns:a16="http://schemas.microsoft.com/office/drawing/2014/main" id="{DAA6AF95-03F9-C1E8-26DE-2F68D8E2B7E9}"/>
+              </a:ext>
+            </a:extLst>
+          </p:cNvPr>
+          <p:cNvSpPr>
+            <a:spLocks noGrp="1"/>
+          </p:cNvSpPr>
+          <p:nvPr>
+            <p:ph type="title"/>
+          </p:nvPr>
+        </p:nvSpPr>
+        <p:spPr/>
+        <p:txBody>
+          <a:bodyPr/>
+          <a:lstStyle/>
+          <a:p>
+            <a:r>
+              <a:rPr lang="nl-NL" dirty="0"/>
+              <a:t>Werk </a:t>
+            </a:r>
+            <a:r>
+              <a:rPr lang="nl-NL" dirty="0" err="1"/>
+              <a:t>comitten</a:t>
+            </a:r>
+            <a:endParaRPr lang="nl-NL" noProof="0" dirty="0"/>
+          </a:p>
+        </p:txBody>
+      </p:sp>
+      <p:sp>
+        <p:nvSpPr>
+          <p:cNvPr id="5" name="Text Placeholder 4">
+            <a:extLst>
+              <a:ext uri="{FF2B5EF4-FFF2-40B4-BE49-F238E27FC236}">
+                <a16:creationId xmlns:a16="http://schemas.microsoft.com/office/drawing/2014/main" id="{6A90D5A5-ADA1-54E8-47DD-D4B9926666C9}"/>
+              </a:ext>
+            </a:extLst>
+          </p:cNvPr>
+          <p:cNvSpPr>
+            <a:spLocks noGrp="1"/>
+          </p:cNvSpPr>
+          <p:nvPr>
+            <p:ph type="body" idx="1"/>
+          </p:nvPr>
+        </p:nvSpPr>
+        <p:spPr/>
+        <p:txBody>
+          <a:bodyPr/>
+          <a:lstStyle/>
+          <a:p>
+            <a:endParaRPr lang="en-NL"/>
+          </a:p>
+        </p:txBody>
+      </p:sp>
+    </p:spTree>
+    <p:extLst>
+      <p:ext uri="{BB962C8B-B14F-4D97-AF65-F5344CB8AC3E}">
+        <p14:creationId xmlns:p14="http://schemas.microsoft.com/office/powerpoint/2010/main" val="2893714662"/>
+      </p:ext>
+    </p:extLst>
+  </p:cSld>
+  <p:clrMapOvr>
+    <a:masterClrMapping/>
+  </p:clrMapOvr>
+</p:sld>
+</file>
+
+<file path=ppt/slides/slide17.xml><?xml version="1.0" encoding="utf-8"?>
+<p:sld xmlns:a="http://schemas.openxmlformats.org/drawingml/2006/main" xmlns:r="http://schemas.openxmlformats.org/officeDocument/2006/relationships" xmlns:p="http://schemas.openxmlformats.org/presentationml/2006/main">
+  <p:cSld>
+    <p:spTree>
+      <p:nvGrpSpPr>
+        <p:cNvPr id="1" name="">
+          <a:extLst>
+            <a:ext uri="{FF2B5EF4-FFF2-40B4-BE49-F238E27FC236}">
+              <a16:creationId xmlns:a16="http://schemas.microsoft.com/office/drawing/2014/main" id="{D22C4855-B453-50DD-76F3-D3207F5D21B8}"/>
+            </a:ext>
+          </a:extLst>
+        </p:cNvPr>
+        <p:cNvGrpSpPr/>
+        <p:nvPr/>
+      </p:nvGrpSpPr>
+      <p:grpSpPr>
+        <a:xfrm>
+          <a:off x="0" y="0"/>
+          <a:ext cx="0" cy="0"/>
+          <a:chOff x="0" y="0"/>
+          <a:chExt cx="0" cy="0"/>
+        </a:xfrm>
+      </p:grpSpPr>
+      <p:sp>
+        <p:nvSpPr>
+          <p:cNvPr id="2" name="Title 1">
+            <a:extLst>
+              <a:ext uri="{FF2B5EF4-FFF2-40B4-BE49-F238E27FC236}">
+                <a16:creationId xmlns:a16="http://schemas.microsoft.com/office/drawing/2014/main" id="{7BAC8F3C-59C9-0604-5FEB-E95D26D891AC}"/>
+              </a:ext>
+            </a:extLst>
+          </p:cNvPr>
+          <p:cNvSpPr>
+            <a:spLocks noGrp="1"/>
+          </p:cNvSpPr>
+          <p:nvPr>
+            <p:ph type="title"/>
+          </p:nvPr>
+        </p:nvSpPr>
+        <p:spPr>
+          <a:xfrm>
+            <a:off x="838200" y="365126"/>
+            <a:ext cx="10515600" cy="718608"/>
+          </a:xfrm>
+        </p:spPr>
+        <p:txBody>
+          <a:bodyPr>
+            <a:normAutofit/>
+          </a:bodyPr>
+          <a:lstStyle/>
+          <a:p>
+            <a:r>
+              <a:rPr lang="nl-NL" sz="3600" dirty="0"/>
+              <a:t>Een goede </a:t>
+            </a:r>
+            <a:r>
+              <a:rPr lang="nl-NL" sz="3600" dirty="0" err="1"/>
+              <a:t>commit</a:t>
+            </a:r>
+            <a:r>
+              <a:rPr lang="nl-NL" sz="3600" dirty="0"/>
+              <a:t>…</a:t>
+            </a:r>
+            <a:endParaRPr lang="nl-NL" sz="3600" noProof="0" dirty="0"/>
+          </a:p>
+        </p:txBody>
+      </p:sp>
+      <p:sp>
+        <p:nvSpPr>
+          <p:cNvPr id="3" name="Content Placeholder 2">
+            <a:extLst>
+              <a:ext uri="{FF2B5EF4-FFF2-40B4-BE49-F238E27FC236}">
+                <a16:creationId xmlns:a16="http://schemas.microsoft.com/office/drawing/2014/main" id="{27734D49-871A-6199-EA83-2BCC023BB2FC}"/>
+              </a:ext>
+            </a:extLst>
+          </p:cNvPr>
+          <p:cNvSpPr>
+            <a:spLocks noGrp="1"/>
+          </p:cNvSpPr>
+          <p:nvPr>
+            <p:ph idx="1"/>
+          </p:nvPr>
+        </p:nvSpPr>
+        <p:spPr>
+          <a:xfrm>
+            <a:off x="838200" y="1456267"/>
+            <a:ext cx="6223782" cy="4720696"/>
+          </a:xfrm>
+        </p:spPr>
+        <p:txBody>
+          <a:bodyPr>
+            <a:normAutofit/>
+          </a:bodyPr>
+          <a:lstStyle/>
+          <a:p>
+            <a:pPr marL="0" indent="0">
+              <a:buNone/>
+            </a:pPr>
+            <a:r>
+              <a:rPr lang="nl-NL" sz="1800" b="1" dirty="0">
+                <a:cs typeface="Courier New" panose="02070309020205020404" pitchFamily="49" charset="0"/>
+              </a:rPr>
+              <a:t>Je werk is pas opgeslagen als je een </a:t>
+            </a:r>
+            <a:r>
+              <a:rPr lang="nl-NL" sz="1800" b="1" dirty="0" err="1">
+                <a:cs typeface="Courier New" panose="02070309020205020404" pitchFamily="49" charset="0"/>
+              </a:rPr>
+              <a:t>commit</a:t>
+            </a:r>
+            <a:r>
+              <a:rPr lang="nl-NL" sz="1800" b="1" dirty="0">
+                <a:cs typeface="Courier New" panose="02070309020205020404" pitchFamily="49" charset="0"/>
+              </a:rPr>
+              <a:t> maakt!</a:t>
+            </a:r>
+          </a:p>
+          <a:p>
+            <a:pPr marL="0" indent="0">
+              <a:buNone/>
+            </a:pPr>
+            <a:endParaRPr lang="nl-NL" sz="1800" b="1" noProof="0" dirty="0">
+              <a:cs typeface="Courier New" panose="02070309020205020404" pitchFamily="49" charset="0"/>
+            </a:endParaRPr>
+          </a:p>
+          <a:p>
+            <a:pPr marL="0" indent="0">
+              <a:buNone/>
+            </a:pPr>
+            <a:r>
+              <a:rPr lang="nl-NL" sz="1800" b="1" noProof="0" dirty="0">
+                <a:cs typeface="Courier New" panose="02070309020205020404" pitchFamily="49" charset="0"/>
+              </a:rPr>
+              <a:t>Bevat een afgebakend stuk werk</a:t>
+            </a:r>
+          </a:p>
+          <a:p>
+            <a:pPr>
+              <a:buFontTx/>
+              <a:buChar char="-"/>
+            </a:pPr>
+            <a:r>
+              <a:rPr lang="nl-NL" sz="1800" dirty="0">
+                <a:cs typeface="Courier New" panose="02070309020205020404" pitchFamily="49" charset="0"/>
+              </a:rPr>
+              <a:t>Maak kleine </a:t>
+            </a:r>
+            <a:r>
+              <a:rPr lang="nl-NL" sz="1800" dirty="0" err="1">
+                <a:cs typeface="Courier New" panose="02070309020205020404" pitchFamily="49" charset="0"/>
+              </a:rPr>
+              <a:t>commits</a:t>
+            </a:r>
+            <a:r>
+              <a:rPr lang="nl-NL" sz="1800" dirty="0">
+                <a:cs typeface="Courier New" panose="02070309020205020404" pitchFamily="49" charset="0"/>
+              </a:rPr>
+              <a:t> met een duidelijke focus.</a:t>
+            </a:r>
+          </a:p>
+          <a:p>
+            <a:pPr>
+              <a:buFontTx/>
+              <a:buChar char="-"/>
+            </a:pPr>
+            <a:r>
+              <a:rPr lang="nl-NL" sz="1800" dirty="0" err="1">
+                <a:cs typeface="Courier New" panose="02070309020205020404" pitchFamily="49" charset="0"/>
+              </a:rPr>
+              <a:t>Refactor</a:t>
+            </a:r>
+            <a:r>
+              <a:rPr lang="nl-NL" sz="1800" dirty="0">
+                <a:cs typeface="Courier New" panose="02070309020205020404" pitchFamily="49" charset="0"/>
+              </a:rPr>
+              <a:t> van één class of enkele </a:t>
+            </a:r>
+            <a:r>
+              <a:rPr lang="nl-NL" sz="1800" dirty="0" err="1">
+                <a:cs typeface="Courier New" panose="02070309020205020404" pitchFamily="49" charset="0"/>
+              </a:rPr>
+              <a:t>bugfix</a:t>
+            </a:r>
+            <a:r>
+              <a:rPr lang="nl-NL" sz="1800" dirty="0">
+                <a:cs typeface="Courier New" panose="02070309020205020404" pitchFamily="49" charset="0"/>
+              </a:rPr>
+              <a:t>.</a:t>
+            </a:r>
+          </a:p>
+          <a:p>
+            <a:pPr>
+              <a:buFontTx/>
+              <a:buChar char="-"/>
+            </a:pPr>
+            <a:r>
+              <a:rPr lang="nl-NL" sz="1800" dirty="0">
+                <a:cs typeface="Courier New" panose="02070309020205020404" pitchFamily="49" charset="0"/>
+              </a:rPr>
+              <a:t>Kleine stappen makkelijker te overzien en terug te draaien. </a:t>
+            </a:r>
+          </a:p>
+          <a:p>
+            <a:pPr marL="0" indent="0">
+              <a:buNone/>
+            </a:pPr>
+            <a:endParaRPr lang="nl-NL" sz="1800" b="1" noProof="0" dirty="0">
+              <a:cs typeface="Courier New" panose="02070309020205020404" pitchFamily="49" charset="0"/>
+            </a:endParaRPr>
+          </a:p>
+          <a:p>
+            <a:pPr marL="0" indent="0">
+              <a:buNone/>
+            </a:pPr>
+            <a:r>
+              <a:rPr lang="nl-NL" sz="1800" b="1" dirty="0">
+                <a:cs typeface="Courier New" panose="02070309020205020404" pitchFamily="49" charset="0"/>
+              </a:rPr>
+              <a:t>Heeft een duidelijke omschrijving</a:t>
+            </a:r>
+          </a:p>
+          <a:p>
+            <a:pPr>
+              <a:buFontTx/>
+              <a:buChar char="-"/>
+            </a:pPr>
+            <a:r>
+              <a:rPr lang="nl-NL" sz="1800" noProof="0" dirty="0">
+                <a:cs typeface="Courier New" panose="02070309020205020404" pitchFamily="49" charset="0"/>
+              </a:rPr>
+              <a:t>Omschrijving moet de lading dekken (vgl. </a:t>
+            </a:r>
+            <a:r>
+              <a:rPr lang="nl-NL" sz="1800" noProof="0" dirty="0" err="1">
+                <a:cs typeface="Courier New" panose="02070309020205020404" pitchFamily="49" charset="0"/>
+              </a:rPr>
+              <a:t>docstring</a:t>
+            </a:r>
+            <a:r>
+              <a:rPr lang="nl-NL" sz="1800" noProof="0" dirty="0">
+                <a:cs typeface="Courier New" panose="02070309020205020404" pitchFamily="49" charset="0"/>
+              </a:rPr>
+              <a:t>).</a:t>
+            </a:r>
+          </a:p>
+          <a:p>
+            <a:pPr>
+              <a:buFontTx/>
+              <a:buChar char="-"/>
+            </a:pPr>
+            <a:r>
+              <a:rPr lang="nl-NL" sz="1800" noProof="0" dirty="0">
+                <a:cs typeface="Courier New" panose="02070309020205020404" pitchFamily="49" charset="0"/>
+              </a:rPr>
+              <a:t>Makkelijker als </a:t>
+            </a:r>
+            <a:r>
+              <a:rPr lang="nl-NL" sz="1800" noProof="0" dirty="0" err="1">
+                <a:cs typeface="Courier New" panose="02070309020205020404" pitchFamily="49" charset="0"/>
+              </a:rPr>
+              <a:t>commit</a:t>
+            </a:r>
+            <a:r>
+              <a:rPr lang="nl-NL" sz="1800" noProof="0" dirty="0">
+                <a:cs typeface="Courier New" panose="02070309020205020404" pitchFamily="49" charset="0"/>
+              </a:rPr>
+              <a:t> één duidelijke focus heeft.</a:t>
+            </a:r>
+          </a:p>
+          <a:p>
+            <a:pPr>
+              <a:buFontTx/>
+              <a:buChar char="-"/>
+            </a:pPr>
+            <a:r>
+              <a:rPr lang="nl-NL" sz="1800" dirty="0">
+                <a:cs typeface="Courier New" panose="02070309020205020404" pitchFamily="49" charset="0"/>
+              </a:rPr>
+              <a:t>Begin met een werkwoord; "</a:t>
+            </a:r>
+            <a:r>
+              <a:rPr lang="nl-NL" sz="1800" dirty="0" err="1">
+                <a:cs typeface="Courier New" panose="02070309020205020404" pitchFamily="49" charset="0"/>
+              </a:rPr>
+              <a:t>Add</a:t>
+            </a:r>
+            <a:r>
+              <a:rPr lang="nl-NL" sz="1800" dirty="0">
+                <a:cs typeface="Courier New" panose="02070309020205020404" pitchFamily="49" charset="0"/>
+              </a:rPr>
+              <a:t> </a:t>
+            </a:r>
+            <a:r>
+              <a:rPr lang="nl-NL" sz="1800" dirty="0" err="1">
+                <a:cs typeface="Courier New" panose="02070309020205020404" pitchFamily="49" charset="0"/>
+              </a:rPr>
+              <a:t>docstrings</a:t>
+            </a:r>
+            <a:r>
+              <a:rPr lang="nl-NL" sz="1800" dirty="0">
+                <a:cs typeface="Courier New" panose="02070309020205020404" pitchFamily="49" charset="0"/>
+              </a:rPr>
+              <a:t> </a:t>
+            </a:r>
+            <a:r>
+              <a:rPr lang="nl-NL" sz="1800" dirty="0" err="1">
+                <a:cs typeface="Courier New" panose="02070309020205020404" pitchFamily="49" charset="0"/>
+              </a:rPr>
+              <a:t>to</a:t>
+            </a:r>
+            <a:r>
+              <a:rPr lang="nl-NL" sz="1800" dirty="0">
+                <a:cs typeface="Courier New" panose="02070309020205020404" pitchFamily="49" charset="0"/>
+              </a:rPr>
+              <a:t> </a:t>
+            </a:r>
+            <a:r>
+              <a:rPr lang="nl-NL" sz="1800" dirty="0" err="1">
+                <a:cs typeface="Courier New" panose="02070309020205020404" pitchFamily="49" charset="0"/>
+              </a:rPr>
+              <a:t>MyClass</a:t>
+            </a:r>
+            <a:r>
+              <a:rPr lang="nl-NL" sz="1800" dirty="0">
+                <a:cs typeface="Courier New" panose="02070309020205020404" pitchFamily="49" charset="0"/>
+              </a:rPr>
+              <a:t>".</a:t>
+            </a:r>
+            <a:endParaRPr lang="nl-NL" sz="1800" noProof="0" dirty="0">
+              <a:cs typeface="Courier New" panose="02070309020205020404" pitchFamily="49" charset="0"/>
+            </a:endParaRPr>
+          </a:p>
+          <a:p>
+            <a:pPr marL="0" indent="0">
+              <a:buNone/>
+            </a:pPr>
+            <a:endParaRPr lang="nl-NL" sz="1800" noProof="0" dirty="0">
+              <a:cs typeface="Courier New" panose="02070309020205020404" pitchFamily="49" charset="0"/>
+            </a:endParaRPr>
+          </a:p>
+          <a:p>
+            <a:pPr marL="0" indent="0">
+              <a:buNone/>
+            </a:pPr>
+            <a:endParaRPr lang="nl-NL" sz="1800" b="1" dirty="0">
+              <a:cs typeface="Courier New" panose="02070309020205020404" pitchFamily="49" charset="0"/>
+            </a:endParaRPr>
+          </a:p>
+          <a:p>
+            <a:pPr marL="0" indent="0">
+              <a:buNone/>
+            </a:pPr>
+            <a:endParaRPr lang="nl-NL" sz="1800" b="1" noProof="0" dirty="0">
+              <a:cs typeface="Courier New" panose="02070309020205020404" pitchFamily="49" charset="0"/>
+            </a:endParaRPr>
+          </a:p>
+        </p:txBody>
+      </p:sp>
+      <p:pic>
+        <p:nvPicPr>
+          <p:cNvPr id="5" name="Picture 4" descr="A screenshot of a computer program&#10;&#10;Description automatically generated">
+            <a:extLst>
+              <a:ext uri="{FF2B5EF4-FFF2-40B4-BE49-F238E27FC236}">
+                <a16:creationId xmlns:a16="http://schemas.microsoft.com/office/drawing/2014/main" id="{C8AD7044-CD48-5888-7401-3F00C7AE0080}"/>
+              </a:ext>
+            </a:extLst>
+          </p:cNvPr>
+          <p:cNvPicPr>
+            <a:picLocks noChangeAspect="1"/>
+          </p:cNvPicPr>
+          <p:nvPr/>
+        </p:nvPicPr>
+        <p:blipFill>
+          <a:blip r:embed="rId3">
+            <a:extLst>
+              <a:ext uri="{28A0092B-C50C-407E-A947-70E740481C1C}">
+                <a14:useLocalDpi xmlns:a14="http://schemas.microsoft.com/office/drawing/2010/main" val="0"/>
+              </a:ext>
+            </a:extLst>
+          </a:blip>
+          <a:stretch>
+            <a:fillRect/>
+          </a:stretch>
+        </p:blipFill>
+        <p:spPr>
+          <a:xfrm>
+            <a:off x="7613761" y="1518054"/>
+            <a:ext cx="3740039" cy="3821892"/>
+          </a:xfrm>
+          <a:prstGeom prst="rect">
+            <a:avLst/>
+          </a:prstGeom>
+        </p:spPr>
+      </p:pic>
+    </p:spTree>
+    <p:extLst>
+      <p:ext uri="{BB962C8B-B14F-4D97-AF65-F5344CB8AC3E}">
+        <p14:creationId xmlns:p14="http://schemas.microsoft.com/office/powerpoint/2010/main" val="795842294"/>
+      </p:ext>
+    </p:extLst>
+  </p:cSld>
+  <p:clrMapOvr>
+    <a:masterClrMapping/>
+  </p:clrMapOvr>
+</p:sld>
+</file>
+
+<file path=ppt/slides/slide18.xml><?xml version="1.0" encoding="utf-8"?>
+<p:sld xmlns:a="http://schemas.openxmlformats.org/drawingml/2006/main" xmlns:r="http://schemas.openxmlformats.org/officeDocument/2006/relationships" xmlns:p="http://schemas.openxmlformats.org/presentationml/2006/main">
+  <p:cSld>
+    <p:spTree>
+      <p:nvGrpSpPr>
+        <p:cNvPr id="1" name="">
+          <a:extLst>
+            <a:ext uri="{FF2B5EF4-FFF2-40B4-BE49-F238E27FC236}">
               <a16:creationId xmlns:a16="http://schemas.microsoft.com/office/drawing/2014/main" id="{B465D9F1-1FDA-48B7-A1E6-E9503E60C88A}"/>
             </a:ext>
           </a:extLst>
@@ -10547,7 +11050,7 @@
 </p:sld>
 </file>
 
-<file path=ppt/slides/slide17.xml><?xml version="1.0" encoding="utf-8"?>
+<file path=ppt/slides/slide19.xml><?xml version="1.0" encoding="utf-8"?>
 <p:sld xmlns:a="http://schemas.openxmlformats.org/drawingml/2006/main" xmlns:r="http://schemas.openxmlformats.org/officeDocument/2006/relationships" xmlns:p="http://schemas.openxmlformats.org/presentationml/2006/main">
   <p:cSld>
     <p:spTree>
@@ -11158,471 +11661,6 @@
 </p:sld>
 </file>
 
-<file path=ppt/slides/slide18.xml><?xml version="1.0" encoding="utf-8"?>
-<p:sld xmlns:a="http://schemas.openxmlformats.org/drawingml/2006/main" xmlns:r="http://schemas.openxmlformats.org/officeDocument/2006/relationships" xmlns:p="http://schemas.openxmlformats.org/presentationml/2006/main">
-  <p:cSld>
-    <p:spTree>
-      <p:nvGrpSpPr>
-        <p:cNvPr id="1" name="">
-          <a:extLst>
-            <a:ext uri="{FF2B5EF4-FFF2-40B4-BE49-F238E27FC236}">
-              <a16:creationId xmlns:a16="http://schemas.microsoft.com/office/drawing/2014/main" id="{D22C4855-B453-50DD-76F3-D3207F5D21B8}"/>
-            </a:ext>
-          </a:extLst>
-        </p:cNvPr>
-        <p:cNvGrpSpPr/>
-        <p:nvPr/>
-      </p:nvGrpSpPr>
-      <p:grpSpPr>
-        <a:xfrm>
-          <a:off x="0" y="0"/>
-          <a:ext cx="0" cy="0"/>
-          <a:chOff x="0" y="0"/>
-          <a:chExt cx="0" cy="0"/>
-        </a:xfrm>
-      </p:grpSpPr>
-      <p:sp>
-        <p:nvSpPr>
-          <p:cNvPr id="2" name="Title 1">
-            <a:extLst>
-              <a:ext uri="{FF2B5EF4-FFF2-40B4-BE49-F238E27FC236}">
-                <a16:creationId xmlns:a16="http://schemas.microsoft.com/office/drawing/2014/main" id="{7BAC8F3C-59C9-0604-5FEB-E95D26D891AC}"/>
-              </a:ext>
-            </a:extLst>
-          </p:cNvPr>
-          <p:cNvSpPr>
-            <a:spLocks noGrp="1"/>
-          </p:cNvSpPr>
-          <p:nvPr>
-            <p:ph type="title"/>
-          </p:nvPr>
-        </p:nvSpPr>
-        <p:spPr>
-          <a:xfrm>
-            <a:off x="838200" y="365126"/>
-            <a:ext cx="10515600" cy="718608"/>
-          </a:xfrm>
-        </p:spPr>
-        <p:txBody>
-          <a:bodyPr>
-            <a:normAutofit/>
-          </a:bodyPr>
-          <a:lstStyle/>
-          <a:p>
-            <a:r>
-              <a:rPr lang="nl-NL" sz="3600" dirty="0"/>
-              <a:t>Een goede </a:t>
-            </a:r>
-            <a:r>
-              <a:rPr lang="nl-NL" sz="3600" dirty="0" err="1"/>
-              <a:t>commit</a:t>
-            </a:r>
-            <a:r>
-              <a:rPr lang="nl-NL" sz="3600" dirty="0"/>
-              <a:t>…</a:t>
-            </a:r>
-            <a:endParaRPr lang="nl-NL" sz="3600" noProof="0" dirty="0"/>
-          </a:p>
-        </p:txBody>
-      </p:sp>
-      <p:sp>
-        <p:nvSpPr>
-          <p:cNvPr id="3" name="Content Placeholder 2">
-            <a:extLst>
-              <a:ext uri="{FF2B5EF4-FFF2-40B4-BE49-F238E27FC236}">
-                <a16:creationId xmlns:a16="http://schemas.microsoft.com/office/drawing/2014/main" id="{27734D49-871A-6199-EA83-2BCC023BB2FC}"/>
-              </a:ext>
-            </a:extLst>
-          </p:cNvPr>
-          <p:cNvSpPr>
-            <a:spLocks noGrp="1"/>
-          </p:cNvSpPr>
-          <p:nvPr>
-            <p:ph idx="1"/>
-          </p:nvPr>
-        </p:nvSpPr>
-        <p:spPr>
-          <a:xfrm>
-            <a:off x="838200" y="1456267"/>
-            <a:ext cx="6223782" cy="4720696"/>
-          </a:xfrm>
-        </p:spPr>
-        <p:txBody>
-          <a:bodyPr>
-            <a:normAutofit/>
-          </a:bodyPr>
-          <a:lstStyle/>
-          <a:p>
-            <a:pPr marL="0" indent="0">
-              <a:buNone/>
-            </a:pPr>
-            <a:r>
-              <a:rPr lang="nl-NL" sz="1800" b="1" noProof="0" dirty="0">
-                <a:cs typeface="Courier New" panose="02070309020205020404" pitchFamily="49" charset="0"/>
-              </a:rPr>
-              <a:t>Bevat een afgebakend stuk werk</a:t>
-            </a:r>
-          </a:p>
-          <a:p>
-            <a:pPr>
-              <a:buFontTx/>
-              <a:buChar char="-"/>
-            </a:pPr>
-            <a:r>
-              <a:rPr lang="nl-NL" sz="1800" dirty="0">
-                <a:cs typeface="Courier New" panose="02070309020205020404" pitchFamily="49" charset="0"/>
-              </a:rPr>
-              <a:t>Maak kleine </a:t>
-            </a:r>
-            <a:r>
-              <a:rPr lang="nl-NL" sz="1800" dirty="0" err="1">
-                <a:cs typeface="Courier New" panose="02070309020205020404" pitchFamily="49" charset="0"/>
-              </a:rPr>
-              <a:t>commits</a:t>
-            </a:r>
-            <a:r>
-              <a:rPr lang="nl-NL" sz="1800" dirty="0">
-                <a:cs typeface="Courier New" panose="02070309020205020404" pitchFamily="49" charset="0"/>
-              </a:rPr>
-              <a:t> met een duidelijke focus.</a:t>
-            </a:r>
-          </a:p>
-          <a:p>
-            <a:pPr>
-              <a:buFontTx/>
-              <a:buChar char="-"/>
-            </a:pPr>
-            <a:r>
-              <a:rPr lang="nl-NL" sz="1800" dirty="0" err="1">
-                <a:cs typeface="Courier New" panose="02070309020205020404" pitchFamily="49" charset="0"/>
-              </a:rPr>
-              <a:t>Refactor</a:t>
-            </a:r>
-            <a:r>
-              <a:rPr lang="nl-NL" sz="1800" dirty="0">
-                <a:cs typeface="Courier New" panose="02070309020205020404" pitchFamily="49" charset="0"/>
-              </a:rPr>
-              <a:t> van één class of enkele </a:t>
-            </a:r>
-            <a:r>
-              <a:rPr lang="nl-NL" sz="1800" dirty="0" err="1">
-                <a:cs typeface="Courier New" panose="02070309020205020404" pitchFamily="49" charset="0"/>
-              </a:rPr>
-              <a:t>bugfix</a:t>
-            </a:r>
-            <a:r>
-              <a:rPr lang="nl-NL" sz="1800" dirty="0">
-                <a:cs typeface="Courier New" panose="02070309020205020404" pitchFamily="49" charset="0"/>
-              </a:rPr>
-              <a:t>.</a:t>
-            </a:r>
-          </a:p>
-          <a:p>
-            <a:pPr>
-              <a:buFontTx/>
-              <a:buChar char="-"/>
-            </a:pPr>
-            <a:r>
-              <a:rPr lang="nl-NL" sz="1800" dirty="0">
-                <a:cs typeface="Courier New" panose="02070309020205020404" pitchFamily="49" charset="0"/>
-              </a:rPr>
-              <a:t>Kleine stappen makkelijker te overzien en terug te draaien. </a:t>
-            </a:r>
-          </a:p>
-          <a:p>
-            <a:pPr marL="0" indent="0">
-              <a:buNone/>
-            </a:pPr>
-            <a:endParaRPr lang="nl-NL" sz="1800" b="1" noProof="0" dirty="0">
-              <a:cs typeface="Courier New" panose="02070309020205020404" pitchFamily="49" charset="0"/>
-            </a:endParaRPr>
-          </a:p>
-          <a:p>
-            <a:pPr marL="0" indent="0">
-              <a:buNone/>
-            </a:pPr>
-            <a:r>
-              <a:rPr lang="nl-NL" sz="1800" b="1" dirty="0">
-                <a:cs typeface="Courier New" panose="02070309020205020404" pitchFamily="49" charset="0"/>
-              </a:rPr>
-              <a:t>Heeft een duidelijke omschrijving</a:t>
-            </a:r>
-          </a:p>
-          <a:p>
-            <a:pPr>
-              <a:buFontTx/>
-              <a:buChar char="-"/>
-            </a:pPr>
-            <a:r>
-              <a:rPr lang="nl-NL" sz="1800" noProof="0" dirty="0">
-                <a:cs typeface="Courier New" panose="02070309020205020404" pitchFamily="49" charset="0"/>
-              </a:rPr>
-              <a:t>Omschrijving moet de lading dekken (vgl. </a:t>
-            </a:r>
-            <a:r>
-              <a:rPr lang="nl-NL" sz="1800" noProof="0" dirty="0" err="1">
-                <a:cs typeface="Courier New" panose="02070309020205020404" pitchFamily="49" charset="0"/>
-              </a:rPr>
-              <a:t>docstring</a:t>
-            </a:r>
-            <a:r>
-              <a:rPr lang="nl-NL" sz="1800" noProof="0" dirty="0">
-                <a:cs typeface="Courier New" panose="02070309020205020404" pitchFamily="49" charset="0"/>
-              </a:rPr>
-              <a:t>).</a:t>
-            </a:r>
-          </a:p>
-          <a:p>
-            <a:pPr>
-              <a:buFontTx/>
-              <a:buChar char="-"/>
-            </a:pPr>
-            <a:r>
-              <a:rPr lang="nl-NL" sz="1800" noProof="0" dirty="0">
-                <a:cs typeface="Courier New" panose="02070309020205020404" pitchFamily="49" charset="0"/>
-              </a:rPr>
-              <a:t>Makkelijker als </a:t>
-            </a:r>
-            <a:r>
-              <a:rPr lang="nl-NL" sz="1800" noProof="0" dirty="0" err="1">
-                <a:cs typeface="Courier New" panose="02070309020205020404" pitchFamily="49" charset="0"/>
-              </a:rPr>
-              <a:t>commit</a:t>
-            </a:r>
-            <a:r>
-              <a:rPr lang="nl-NL" sz="1800" noProof="0" dirty="0">
-                <a:cs typeface="Courier New" panose="02070309020205020404" pitchFamily="49" charset="0"/>
-              </a:rPr>
-              <a:t> één duidelijke focus heeft.</a:t>
-            </a:r>
-          </a:p>
-          <a:p>
-            <a:pPr>
-              <a:buFontTx/>
-              <a:buChar char="-"/>
-            </a:pPr>
-            <a:r>
-              <a:rPr lang="nl-NL" sz="1800" dirty="0">
-                <a:cs typeface="Courier New" panose="02070309020205020404" pitchFamily="49" charset="0"/>
-              </a:rPr>
-              <a:t>Begin met een werkwoord; "</a:t>
-            </a:r>
-            <a:r>
-              <a:rPr lang="nl-NL" sz="1800" dirty="0" err="1">
-                <a:cs typeface="Courier New" panose="02070309020205020404" pitchFamily="49" charset="0"/>
-              </a:rPr>
-              <a:t>Add</a:t>
-            </a:r>
-            <a:r>
-              <a:rPr lang="nl-NL" sz="1800" dirty="0">
-                <a:cs typeface="Courier New" panose="02070309020205020404" pitchFamily="49" charset="0"/>
-              </a:rPr>
-              <a:t> </a:t>
-            </a:r>
-            <a:r>
-              <a:rPr lang="nl-NL" sz="1800" dirty="0" err="1">
-                <a:cs typeface="Courier New" panose="02070309020205020404" pitchFamily="49" charset="0"/>
-              </a:rPr>
-              <a:t>docstrings</a:t>
-            </a:r>
-            <a:r>
-              <a:rPr lang="nl-NL" sz="1800" dirty="0">
-                <a:cs typeface="Courier New" panose="02070309020205020404" pitchFamily="49" charset="0"/>
-              </a:rPr>
-              <a:t> </a:t>
-            </a:r>
-            <a:r>
-              <a:rPr lang="nl-NL" sz="1800" dirty="0" err="1">
-                <a:cs typeface="Courier New" panose="02070309020205020404" pitchFamily="49" charset="0"/>
-              </a:rPr>
-              <a:t>to</a:t>
-            </a:r>
-            <a:r>
-              <a:rPr lang="nl-NL" sz="1800" dirty="0">
-                <a:cs typeface="Courier New" panose="02070309020205020404" pitchFamily="49" charset="0"/>
-              </a:rPr>
-              <a:t> </a:t>
-            </a:r>
-            <a:r>
-              <a:rPr lang="nl-NL" sz="1800" dirty="0" err="1">
-                <a:cs typeface="Courier New" panose="02070309020205020404" pitchFamily="49" charset="0"/>
-              </a:rPr>
-              <a:t>MyClass</a:t>
-            </a:r>
-            <a:r>
-              <a:rPr lang="nl-NL" sz="1800" dirty="0">
-                <a:cs typeface="Courier New" panose="02070309020205020404" pitchFamily="49" charset="0"/>
-              </a:rPr>
-              <a:t>".</a:t>
-            </a:r>
-            <a:endParaRPr lang="nl-NL" sz="1800" noProof="0" dirty="0">
-              <a:cs typeface="Courier New" panose="02070309020205020404" pitchFamily="49" charset="0"/>
-            </a:endParaRPr>
-          </a:p>
-          <a:p>
-            <a:pPr marL="0" indent="0">
-              <a:buNone/>
-            </a:pPr>
-            <a:endParaRPr lang="nl-NL" sz="1800" noProof="0" dirty="0">
-              <a:cs typeface="Courier New" panose="02070309020205020404" pitchFamily="49" charset="0"/>
-            </a:endParaRPr>
-          </a:p>
-          <a:p>
-            <a:pPr marL="0" indent="0">
-              <a:buNone/>
-            </a:pPr>
-            <a:endParaRPr lang="nl-NL" sz="1800" b="1" dirty="0">
-              <a:cs typeface="Courier New" panose="02070309020205020404" pitchFamily="49" charset="0"/>
-            </a:endParaRPr>
-          </a:p>
-          <a:p>
-            <a:pPr marL="0" indent="0">
-              <a:buNone/>
-            </a:pPr>
-            <a:endParaRPr lang="nl-NL" sz="1800" b="1" noProof="0" dirty="0">
-              <a:cs typeface="Courier New" panose="02070309020205020404" pitchFamily="49" charset="0"/>
-            </a:endParaRPr>
-          </a:p>
-        </p:txBody>
-      </p:sp>
-      <p:pic>
-        <p:nvPicPr>
-          <p:cNvPr id="5" name="Picture 4" descr="A screenshot of a computer program&#10;&#10;Description automatically generated">
-            <a:extLst>
-              <a:ext uri="{FF2B5EF4-FFF2-40B4-BE49-F238E27FC236}">
-                <a16:creationId xmlns:a16="http://schemas.microsoft.com/office/drawing/2014/main" id="{C8AD7044-CD48-5888-7401-3F00C7AE0080}"/>
-              </a:ext>
-            </a:extLst>
-          </p:cNvPr>
-          <p:cNvPicPr>
-            <a:picLocks noChangeAspect="1"/>
-          </p:cNvPicPr>
-          <p:nvPr/>
-        </p:nvPicPr>
-        <p:blipFill>
-          <a:blip r:embed="rId3">
-            <a:extLst>
-              <a:ext uri="{28A0092B-C50C-407E-A947-70E740481C1C}">
-                <a14:useLocalDpi xmlns:a14="http://schemas.microsoft.com/office/drawing/2010/main" val="0"/>
-              </a:ext>
-            </a:extLst>
-          </a:blip>
-          <a:stretch>
-            <a:fillRect/>
-          </a:stretch>
-        </p:blipFill>
-        <p:spPr>
-          <a:xfrm>
-            <a:off x="7613761" y="1518054"/>
-            <a:ext cx="3740039" cy="3821892"/>
-          </a:xfrm>
-          <a:prstGeom prst="rect">
-            <a:avLst/>
-          </a:prstGeom>
-        </p:spPr>
-      </p:pic>
-    </p:spTree>
-    <p:extLst>
-      <p:ext uri="{BB962C8B-B14F-4D97-AF65-F5344CB8AC3E}">
-        <p14:creationId xmlns:p14="http://schemas.microsoft.com/office/powerpoint/2010/main" val="795842294"/>
-      </p:ext>
-    </p:extLst>
-  </p:cSld>
-  <p:clrMapOvr>
-    <a:masterClrMapping/>
-  </p:clrMapOvr>
-</p:sld>
-</file>
-
-<file path=ppt/slides/slide19.xml><?xml version="1.0" encoding="utf-8"?>
-<p:sld xmlns:a="http://schemas.openxmlformats.org/drawingml/2006/main" xmlns:r="http://schemas.openxmlformats.org/officeDocument/2006/relationships" xmlns:p="http://schemas.openxmlformats.org/presentationml/2006/main">
-  <p:cSld>
-    <p:spTree>
-      <p:nvGrpSpPr>
-        <p:cNvPr id="1" name="">
-          <a:extLst>
-            <a:ext uri="{FF2B5EF4-FFF2-40B4-BE49-F238E27FC236}">
-              <a16:creationId xmlns:a16="http://schemas.microsoft.com/office/drawing/2014/main" id="{53350AC3-44D2-125F-C901-74E8A6F61E54}"/>
-            </a:ext>
-          </a:extLst>
-        </p:cNvPr>
-        <p:cNvGrpSpPr/>
-        <p:nvPr/>
-      </p:nvGrpSpPr>
-      <p:grpSpPr>
-        <a:xfrm>
-          <a:off x="0" y="0"/>
-          <a:ext cx="0" cy="0"/>
-          <a:chOff x="0" y="0"/>
-          <a:chExt cx="0" cy="0"/>
-        </a:xfrm>
-      </p:grpSpPr>
-      <p:sp>
-        <p:nvSpPr>
-          <p:cNvPr id="4" name="Title 3">
-            <a:extLst>
-              <a:ext uri="{FF2B5EF4-FFF2-40B4-BE49-F238E27FC236}">
-                <a16:creationId xmlns:a16="http://schemas.microsoft.com/office/drawing/2014/main" id="{09C9436C-DC36-00A0-18E7-6B9DD57D93A7}"/>
-              </a:ext>
-            </a:extLst>
-          </p:cNvPr>
-          <p:cNvSpPr>
-            <a:spLocks noGrp="1"/>
-          </p:cNvSpPr>
-          <p:nvPr>
-            <p:ph type="title"/>
-          </p:nvPr>
-        </p:nvSpPr>
-        <p:spPr/>
-        <p:txBody>
-          <a:bodyPr/>
-          <a:lstStyle/>
-          <a:p>
-            <a:r>
-              <a:rPr lang="nl-NL" noProof="0" dirty="0"/>
-              <a:t>Branches</a:t>
-            </a:r>
-          </a:p>
-        </p:txBody>
-      </p:sp>
-      <p:sp>
-        <p:nvSpPr>
-          <p:cNvPr id="5" name="Text Placeholder 4">
-            <a:extLst>
-              <a:ext uri="{FF2B5EF4-FFF2-40B4-BE49-F238E27FC236}">
-                <a16:creationId xmlns:a16="http://schemas.microsoft.com/office/drawing/2014/main" id="{DEB61E79-1961-C560-A7F0-B064C69A128C}"/>
-              </a:ext>
-            </a:extLst>
-          </p:cNvPr>
-          <p:cNvSpPr>
-            <a:spLocks noGrp="1"/>
-          </p:cNvSpPr>
-          <p:nvPr>
-            <p:ph type="body" idx="1"/>
-          </p:nvPr>
-        </p:nvSpPr>
-        <p:spPr/>
-        <p:txBody>
-          <a:bodyPr/>
-          <a:lstStyle/>
-          <a:p>
-            <a:endParaRPr lang="en-NL"/>
-          </a:p>
-        </p:txBody>
-      </p:sp>
-    </p:spTree>
-    <p:extLst>
-      <p:ext uri="{BB962C8B-B14F-4D97-AF65-F5344CB8AC3E}">
-        <p14:creationId xmlns:p14="http://schemas.microsoft.com/office/powerpoint/2010/main" val="3051769913"/>
-      </p:ext>
-    </p:extLst>
-  </p:cSld>
-  <p:clrMapOvr>
-    <a:masterClrMapping/>
-  </p:clrMapOvr>
-</p:sld>
-</file>
-
 <file path=ppt/slides/slide2.xml><?xml version="1.0" encoding="utf-8"?>
 <p:sld xmlns:a="http://schemas.openxmlformats.org/drawingml/2006/main" xmlns:r="http://schemas.openxmlformats.org/officeDocument/2006/relationships" xmlns:p="http://schemas.openxmlformats.org/presentationml/2006/main">
   <p:cSld>
@@ -11915,6 +11953,185 @@
 </file>
 
 <file path=ppt/slides/slide20.xml><?xml version="1.0" encoding="utf-8"?>
+<p:sld xmlns:a="http://schemas.openxmlformats.org/drawingml/2006/main" xmlns:r="http://schemas.openxmlformats.org/officeDocument/2006/relationships" xmlns:p="http://schemas.openxmlformats.org/presentationml/2006/main">
+  <p:cSld>
+    <p:spTree>
+      <p:nvGrpSpPr>
+        <p:cNvPr id="1" name="">
+          <a:extLst>
+            <a:ext uri="{FF2B5EF4-FFF2-40B4-BE49-F238E27FC236}">
+              <a16:creationId xmlns:a16="http://schemas.microsoft.com/office/drawing/2014/main" id="{79546922-AFF4-1D03-0903-97AE91BAE45F}"/>
+            </a:ext>
+          </a:extLst>
+        </p:cNvPr>
+        <p:cNvGrpSpPr/>
+        <p:nvPr/>
+      </p:nvGrpSpPr>
+      <p:grpSpPr>
+        <a:xfrm>
+          <a:off x="0" y="0"/>
+          <a:ext cx="0" cy="0"/>
+          <a:chOff x="0" y="0"/>
+          <a:chExt cx="0" cy="0"/>
+        </a:xfrm>
+      </p:grpSpPr>
+      <p:sp>
+        <p:nvSpPr>
+          <p:cNvPr id="4" name="Title 3">
+            <a:extLst>
+              <a:ext uri="{FF2B5EF4-FFF2-40B4-BE49-F238E27FC236}">
+                <a16:creationId xmlns:a16="http://schemas.microsoft.com/office/drawing/2014/main" id="{6049F2B3-AC21-DEB4-82B2-366DB05D338F}"/>
+              </a:ext>
+            </a:extLst>
+          </p:cNvPr>
+          <p:cNvSpPr>
+            <a:spLocks noGrp="1"/>
+          </p:cNvSpPr>
+          <p:nvPr>
+            <p:ph type="title"/>
+          </p:nvPr>
+        </p:nvSpPr>
+        <p:spPr/>
+        <p:txBody>
+          <a:bodyPr/>
+          <a:lstStyle/>
+          <a:p>
+            <a:r>
+              <a:rPr lang="nl-NL"/>
+              <a:t>Wijzigingen terugdraaien</a:t>
+            </a:r>
+            <a:endParaRPr lang="nl-NL" noProof="0" dirty="0"/>
+          </a:p>
+        </p:txBody>
+      </p:sp>
+      <p:sp>
+        <p:nvSpPr>
+          <p:cNvPr id="5" name="Text Placeholder 4">
+            <a:extLst>
+              <a:ext uri="{FF2B5EF4-FFF2-40B4-BE49-F238E27FC236}">
+                <a16:creationId xmlns:a16="http://schemas.microsoft.com/office/drawing/2014/main" id="{6E609B2E-B59A-E258-83B8-601DB579F154}"/>
+              </a:ext>
+            </a:extLst>
+          </p:cNvPr>
+          <p:cNvSpPr>
+            <a:spLocks noGrp="1"/>
+          </p:cNvSpPr>
+          <p:nvPr>
+            <p:ph type="body" idx="1"/>
+          </p:nvPr>
+        </p:nvSpPr>
+        <p:spPr/>
+        <p:txBody>
+          <a:bodyPr/>
+          <a:lstStyle/>
+          <a:p>
+            <a:endParaRPr lang="en-NL"/>
+          </a:p>
+        </p:txBody>
+      </p:sp>
+    </p:spTree>
+    <p:extLst>
+      <p:ext uri="{BB962C8B-B14F-4D97-AF65-F5344CB8AC3E}">
+        <p14:creationId xmlns:p14="http://schemas.microsoft.com/office/powerpoint/2010/main" val="1404164722"/>
+      </p:ext>
+    </p:extLst>
+  </p:cSld>
+  <p:clrMapOvr>
+    <a:masterClrMapping/>
+  </p:clrMapOvr>
+</p:sld>
+</file>
+
+<file path=ppt/slides/slide21.xml><?xml version="1.0" encoding="utf-8"?>
+<p:sld xmlns:a="http://schemas.openxmlformats.org/drawingml/2006/main" xmlns:r="http://schemas.openxmlformats.org/officeDocument/2006/relationships" xmlns:p="http://schemas.openxmlformats.org/presentationml/2006/main">
+  <p:cSld>
+    <p:spTree>
+      <p:nvGrpSpPr>
+        <p:cNvPr id="1" name="">
+          <a:extLst>
+            <a:ext uri="{FF2B5EF4-FFF2-40B4-BE49-F238E27FC236}">
+              <a16:creationId xmlns:a16="http://schemas.microsoft.com/office/drawing/2014/main" id="{53350AC3-44D2-125F-C901-74E8A6F61E54}"/>
+            </a:ext>
+          </a:extLst>
+        </p:cNvPr>
+        <p:cNvGrpSpPr/>
+        <p:nvPr/>
+      </p:nvGrpSpPr>
+      <p:grpSpPr>
+        <a:xfrm>
+          <a:off x="0" y="0"/>
+          <a:ext cx="0" cy="0"/>
+          <a:chOff x="0" y="0"/>
+          <a:chExt cx="0" cy="0"/>
+        </a:xfrm>
+      </p:grpSpPr>
+      <p:sp>
+        <p:nvSpPr>
+          <p:cNvPr id="4" name="Title 3">
+            <a:extLst>
+              <a:ext uri="{FF2B5EF4-FFF2-40B4-BE49-F238E27FC236}">
+                <a16:creationId xmlns:a16="http://schemas.microsoft.com/office/drawing/2014/main" id="{09C9436C-DC36-00A0-18E7-6B9DD57D93A7}"/>
+              </a:ext>
+            </a:extLst>
+          </p:cNvPr>
+          <p:cNvSpPr>
+            <a:spLocks noGrp="1"/>
+          </p:cNvSpPr>
+          <p:nvPr>
+            <p:ph type="title"/>
+          </p:nvPr>
+        </p:nvSpPr>
+        <p:spPr/>
+        <p:txBody>
+          <a:bodyPr/>
+          <a:lstStyle/>
+          <a:p>
+            <a:r>
+              <a:rPr lang="nl-NL" noProof="0" dirty="0"/>
+              <a:t>Branches</a:t>
+            </a:r>
+          </a:p>
+        </p:txBody>
+      </p:sp>
+      <p:sp>
+        <p:nvSpPr>
+          <p:cNvPr id="5" name="Text Placeholder 4">
+            <a:extLst>
+              <a:ext uri="{FF2B5EF4-FFF2-40B4-BE49-F238E27FC236}">
+                <a16:creationId xmlns:a16="http://schemas.microsoft.com/office/drawing/2014/main" id="{DEB61E79-1961-C560-A7F0-B064C69A128C}"/>
+              </a:ext>
+            </a:extLst>
+          </p:cNvPr>
+          <p:cNvSpPr>
+            <a:spLocks noGrp="1"/>
+          </p:cNvSpPr>
+          <p:nvPr>
+            <p:ph type="body" idx="1"/>
+          </p:nvPr>
+        </p:nvSpPr>
+        <p:spPr/>
+        <p:txBody>
+          <a:bodyPr/>
+          <a:lstStyle/>
+          <a:p>
+            <a:endParaRPr lang="en-NL"/>
+          </a:p>
+        </p:txBody>
+      </p:sp>
+    </p:spTree>
+    <p:extLst>
+      <p:ext uri="{BB962C8B-B14F-4D97-AF65-F5344CB8AC3E}">
+        <p14:creationId xmlns:p14="http://schemas.microsoft.com/office/powerpoint/2010/main" val="3051769913"/>
+      </p:ext>
+    </p:extLst>
+  </p:cSld>
+  <p:clrMapOvr>
+    <a:masterClrMapping/>
+  </p:clrMapOvr>
+</p:sld>
+</file>
+
+<file path=ppt/slides/slide22.xml><?xml version="1.0" encoding="utf-8"?>
 <p:sld xmlns:a="http://schemas.openxmlformats.org/drawingml/2006/main" xmlns:r="http://schemas.openxmlformats.org/officeDocument/2006/relationships" xmlns:p="http://schemas.openxmlformats.org/presentationml/2006/main">
   <p:cSld>
     <p:spTree>
@@ -12234,7 +12451,7 @@
 </p:sld>
 </file>
 
-<file path=ppt/slides/slide21.xml><?xml version="1.0" encoding="utf-8"?>
+<file path=ppt/slides/slide23.xml><?xml version="1.0" encoding="utf-8"?>
 <p:sld xmlns:a="http://schemas.openxmlformats.org/drawingml/2006/main" xmlns:r="http://schemas.openxmlformats.org/officeDocument/2006/relationships" xmlns:p="http://schemas.openxmlformats.org/presentationml/2006/main">
   <p:cSld>
     <p:spTree>
@@ -12749,7 +12966,7 @@
 </p:sld>
 </file>
 
-<file path=ppt/slides/slide22.xml><?xml version="1.0" encoding="utf-8"?>
+<file path=ppt/slides/slide24.xml><?xml version="1.0" encoding="utf-8"?>
 <p:sld xmlns:a="http://schemas.openxmlformats.org/drawingml/2006/main" xmlns:r="http://schemas.openxmlformats.org/officeDocument/2006/relationships" xmlns:p="http://schemas.openxmlformats.org/presentationml/2006/main">
   <p:cSld>
     <p:spTree>
@@ -13369,7 +13586,7 @@
 </p:sld>
 </file>
 
-<file path=ppt/slides/slide23.xml><?xml version="1.0" encoding="utf-8"?>
+<file path=ppt/slides/slide25.xml><?xml version="1.0" encoding="utf-8"?>
 <p:sld xmlns:a="http://schemas.openxmlformats.org/drawingml/2006/main" xmlns:r="http://schemas.openxmlformats.org/officeDocument/2006/relationships" xmlns:p="http://schemas.openxmlformats.org/presentationml/2006/main">
   <p:cSld>
     <p:spTree>
@@ -13922,7 +14139,7 @@
 </p:sld>
 </file>
 
-<file path=ppt/slides/slide24.xml><?xml version="1.0" encoding="utf-8"?>
+<file path=ppt/slides/slide26.xml><?xml version="1.0" encoding="utf-8"?>
 <p:sld xmlns:a="http://schemas.openxmlformats.org/drawingml/2006/main" xmlns:r="http://schemas.openxmlformats.org/officeDocument/2006/relationships" xmlns:p="http://schemas.openxmlformats.org/presentationml/2006/main">
   <p:cSld>
     <p:spTree>
@@ -14581,7 +14798,7 @@
 </p:sld>
 </file>
 
-<file path=ppt/slides/slide25.xml><?xml version="1.0" encoding="utf-8"?>
+<file path=ppt/slides/slide27.xml><?xml version="1.0" encoding="utf-8"?>
 <p:sld xmlns:a="http://schemas.openxmlformats.org/drawingml/2006/main" xmlns:r="http://schemas.openxmlformats.org/officeDocument/2006/relationships" xmlns:p="http://schemas.openxmlformats.org/presentationml/2006/main">
   <p:cSld>
     <p:spTree>
@@ -15217,7 +15434,7 @@
 </p:sld>
 </file>
 
-<file path=ppt/slides/slide26.xml><?xml version="1.0" encoding="utf-8"?>
+<file path=ppt/slides/slide28.xml><?xml version="1.0" encoding="utf-8"?>
 <p:sld xmlns:a="http://schemas.openxmlformats.org/drawingml/2006/main" xmlns:r="http://schemas.openxmlformats.org/officeDocument/2006/relationships" xmlns:p="http://schemas.openxmlformats.org/presentationml/2006/main">
   <p:cSld>
     <p:spTree>
@@ -15306,7 +15523,7 @@
 </p:sld>
 </file>
 
-<file path=ppt/slides/slide27.xml><?xml version="1.0" encoding="utf-8"?>
+<file path=ppt/slides/slide29.xml><?xml version="1.0" encoding="utf-8"?>
 <p:sld xmlns:a="http://schemas.openxmlformats.org/drawingml/2006/main" xmlns:r="http://schemas.openxmlformats.org/officeDocument/2006/relationships" xmlns:p="http://schemas.openxmlformats.org/presentationml/2006/main">
   <p:cSld>
     <p:spTree>
@@ -15753,7 +15970,90 @@
 </p:sld>
 </file>
 
-<file path=ppt/slides/slide28.xml><?xml version="1.0" encoding="utf-8"?>
+<file path=ppt/slides/slide3.xml><?xml version="1.0" encoding="utf-8"?>
+<p:sld xmlns:a="http://schemas.openxmlformats.org/drawingml/2006/main" xmlns:r="http://schemas.openxmlformats.org/officeDocument/2006/relationships" xmlns:p="http://schemas.openxmlformats.org/presentationml/2006/main">
+  <p:cSld>
+    <p:spTree>
+      <p:nvGrpSpPr>
+        <p:cNvPr id="1" name=""/>
+        <p:cNvGrpSpPr/>
+        <p:nvPr/>
+      </p:nvGrpSpPr>
+      <p:grpSpPr>
+        <a:xfrm>
+          <a:off x="0" y="0"/>
+          <a:ext cx="0" cy="0"/>
+          <a:chOff x="0" y="0"/>
+          <a:chExt cx="0" cy="0"/>
+        </a:xfrm>
+      </p:grpSpPr>
+      <p:sp>
+        <p:nvSpPr>
+          <p:cNvPr id="4" name="Title 3">
+            <a:extLst>
+              <a:ext uri="{FF2B5EF4-FFF2-40B4-BE49-F238E27FC236}">
+                <a16:creationId xmlns:a16="http://schemas.microsoft.com/office/drawing/2014/main" id="{72C925CA-BCA3-3701-E08E-95652380B32E}"/>
+              </a:ext>
+            </a:extLst>
+          </p:cNvPr>
+          <p:cNvSpPr>
+            <a:spLocks noGrp="1"/>
+          </p:cNvSpPr>
+          <p:nvPr>
+            <p:ph type="title"/>
+          </p:nvPr>
+        </p:nvSpPr>
+        <p:spPr/>
+        <p:txBody>
+          <a:bodyPr/>
+          <a:lstStyle/>
+          <a:p>
+            <a:r>
+              <a:rPr lang="nl-NL" noProof="0" dirty="0"/>
+              <a:t>Introductie</a:t>
+            </a:r>
+          </a:p>
+        </p:txBody>
+      </p:sp>
+      <p:sp>
+        <p:nvSpPr>
+          <p:cNvPr id="5" name="Text Placeholder 4">
+            <a:extLst>
+              <a:ext uri="{FF2B5EF4-FFF2-40B4-BE49-F238E27FC236}">
+                <a16:creationId xmlns:a16="http://schemas.microsoft.com/office/drawing/2014/main" id="{1AB31C95-91AF-DF13-FB58-0DA5F2D9F6F7}"/>
+              </a:ext>
+            </a:extLst>
+          </p:cNvPr>
+          <p:cNvSpPr>
+            <a:spLocks noGrp="1"/>
+          </p:cNvSpPr>
+          <p:nvPr>
+            <p:ph type="body" idx="1"/>
+          </p:nvPr>
+        </p:nvSpPr>
+        <p:spPr/>
+        <p:txBody>
+          <a:bodyPr/>
+          <a:lstStyle/>
+          <a:p>
+            <a:endParaRPr lang="en-NL"/>
+          </a:p>
+        </p:txBody>
+      </p:sp>
+    </p:spTree>
+    <p:extLst>
+      <p:ext uri="{BB962C8B-B14F-4D97-AF65-F5344CB8AC3E}">
+        <p14:creationId xmlns:p14="http://schemas.microsoft.com/office/powerpoint/2010/main" val="276640083"/>
+      </p:ext>
+    </p:extLst>
+  </p:cSld>
+  <p:clrMapOvr>
+    <a:masterClrMapping/>
+  </p:clrMapOvr>
+</p:sld>
+</file>
+
+<file path=ppt/slides/slide30.xml><?xml version="1.0" encoding="utf-8"?>
 <p:sld xmlns:a="http://schemas.openxmlformats.org/drawingml/2006/main" xmlns:r="http://schemas.openxmlformats.org/officeDocument/2006/relationships" xmlns:p="http://schemas.openxmlformats.org/presentationml/2006/main">
   <p:cSld>
     <p:spTree>
@@ -16517,7 +16817,7 @@
 </p:sld>
 </file>
 
-<file path=ppt/slides/slide29.xml><?xml version="1.0" encoding="utf-8"?>
+<file path=ppt/slides/slide31.xml><?xml version="1.0" encoding="utf-8"?>
 <p:sld xmlns:a="http://schemas.openxmlformats.org/drawingml/2006/main" xmlns:r="http://schemas.openxmlformats.org/officeDocument/2006/relationships" xmlns:p="http://schemas.openxmlformats.org/presentationml/2006/main">
   <p:cSld>
     <p:spTree>
@@ -17005,90 +17305,7 @@
 </p:sld>
 </file>
 
-<file path=ppt/slides/slide3.xml><?xml version="1.0" encoding="utf-8"?>
-<p:sld xmlns:a="http://schemas.openxmlformats.org/drawingml/2006/main" xmlns:r="http://schemas.openxmlformats.org/officeDocument/2006/relationships" xmlns:p="http://schemas.openxmlformats.org/presentationml/2006/main">
-  <p:cSld>
-    <p:spTree>
-      <p:nvGrpSpPr>
-        <p:cNvPr id="1" name=""/>
-        <p:cNvGrpSpPr/>
-        <p:nvPr/>
-      </p:nvGrpSpPr>
-      <p:grpSpPr>
-        <a:xfrm>
-          <a:off x="0" y="0"/>
-          <a:ext cx="0" cy="0"/>
-          <a:chOff x="0" y="0"/>
-          <a:chExt cx="0" cy="0"/>
-        </a:xfrm>
-      </p:grpSpPr>
-      <p:sp>
-        <p:nvSpPr>
-          <p:cNvPr id="4" name="Title 3">
-            <a:extLst>
-              <a:ext uri="{FF2B5EF4-FFF2-40B4-BE49-F238E27FC236}">
-                <a16:creationId xmlns:a16="http://schemas.microsoft.com/office/drawing/2014/main" id="{72C925CA-BCA3-3701-E08E-95652380B32E}"/>
-              </a:ext>
-            </a:extLst>
-          </p:cNvPr>
-          <p:cNvSpPr>
-            <a:spLocks noGrp="1"/>
-          </p:cNvSpPr>
-          <p:nvPr>
-            <p:ph type="title"/>
-          </p:nvPr>
-        </p:nvSpPr>
-        <p:spPr/>
-        <p:txBody>
-          <a:bodyPr/>
-          <a:lstStyle/>
-          <a:p>
-            <a:r>
-              <a:rPr lang="nl-NL" noProof="0" dirty="0"/>
-              <a:t>Introductie</a:t>
-            </a:r>
-          </a:p>
-        </p:txBody>
-      </p:sp>
-      <p:sp>
-        <p:nvSpPr>
-          <p:cNvPr id="5" name="Text Placeholder 4">
-            <a:extLst>
-              <a:ext uri="{FF2B5EF4-FFF2-40B4-BE49-F238E27FC236}">
-                <a16:creationId xmlns:a16="http://schemas.microsoft.com/office/drawing/2014/main" id="{1AB31C95-91AF-DF13-FB58-0DA5F2D9F6F7}"/>
-              </a:ext>
-            </a:extLst>
-          </p:cNvPr>
-          <p:cNvSpPr>
-            <a:spLocks noGrp="1"/>
-          </p:cNvSpPr>
-          <p:nvPr>
-            <p:ph type="body" idx="1"/>
-          </p:nvPr>
-        </p:nvSpPr>
-        <p:spPr/>
-        <p:txBody>
-          <a:bodyPr/>
-          <a:lstStyle/>
-          <a:p>
-            <a:endParaRPr lang="en-NL"/>
-          </a:p>
-        </p:txBody>
-      </p:sp>
-    </p:spTree>
-    <p:extLst>
-      <p:ext uri="{BB962C8B-B14F-4D97-AF65-F5344CB8AC3E}">
-        <p14:creationId xmlns:p14="http://schemas.microsoft.com/office/powerpoint/2010/main" val="276640083"/>
-      </p:ext>
-    </p:extLst>
-  </p:cSld>
-  <p:clrMapOvr>
-    <a:masterClrMapping/>
-  </p:clrMapOvr>
-</p:sld>
-</file>
-
-<file path=ppt/slides/slide30.xml><?xml version="1.0" encoding="utf-8"?>
+<file path=ppt/slides/slide32.xml><?xml version="1.0" encoding="utf-8"?>
 <p:sld xmlns:a="http://schemas.openxmlformats.org/drawingml/2006/main" xmlns:r="http://schemas.openxmlformats.org/officeDocument/2006/relationships" xmlns:p="http://schemas.openxmlformats.org/presentationml/2006/main">
   <p:cSld>
     <p:spTree>
@@ -17615,7 +17832,7 @@
 </p:sld>
 </file>
 
-<file path=ppt/slides/slide31.xml><?xml version="1.0" encoding="utf-8"?>
+<file path=ppt/slides/slide33.xml><?xml version="1.0" encoding="utf-8"?>
 <p:sld xmlns:a="http://schemas.openxmlformats.org/drawingml/2006/main" xmlns:r="http://schemas.openxmlformats.org/officeDocument/2006/relationships" xmlns:p="http://schemas.openxmlformats.org/presentationml/2006/main">
   <p:cSld>
     <p:spTree>
@@ -18342,7 +18559,9 @@
               </a:ext>
             </a:extLst>
           </p:cNvPr>
-          <p:cNvCxnSpPr/>
+          <p:cNvCxnSpPr>
+            <a:cxnSpLocks/>
+          </p:cNvCxnSpPr>
           <p:nvPr/>
         </p:nvCxnSpPr>
         <p:spPr>
@@ -18515,8 +18734,8 @@
         </p:nvSpPr>
         <p:spPr>
           <a:xfrm>
-            <a:off x="3820235" y="2540536"/>
-            <a:ext cx="4551529" cy="1614462"/>
+            <a:off x="3385551" y="2730450"/>
+            <a:ext cx="5098682" cy="1614462"/>
           </a:xfrm>
           <a:prstGeom prst="rect">
             <a:avLst/>
@@ -18568,12 +18787,22 @@
               <a:t>Maakt een repository aan in </a:t>
             </a:r>
             <a:r>
-              <a:rPr lang="nl-NL" noProof="0" dirty="0" err="1"/>
+              <a:rPr lang="nl-NL" noProof="0" dirty="0" err="1">
+                <a:latin typeface="Courier New" panose="02070309020205020404" pitchFamily="49" charset="0"/>
+                <a:cs typeface="Courier New" panose="02070309020205020404" pitchFamily="49" charset="0"/>
+              </a:rPr>
               <a:t>work_dir</a:t>
             </a:r>
             <a:r>
+              <a:rPr lang="nl-NL" noProof="0" dirty="0">
+                <a:latin typeface="Courier New" panose="02070309020205020404" pitchFamily="49" charset="0"/>
+                <a:cs typeface="Courier New" panose="02070309020205020404" pitchFamily="49" charset="0"/>
+              </a:rPr>
+              <a:t>/.git</a:t>
+            </a:r>
+            <a:r>
               <a:rPr lang="nl-NL" noProof="0" dirty="0"/>
-              <a:t>/.git.</a:t>
+              <a:t>.</a:t>
             </a:r>
           </a:p>
           <a:p>
@@ -18583,7 +18812,18 @@
             </a:pPr>
             <a:r>
               <a:rPr lang="nl-NL" dirty="0"/>
-              <a:t>Monitor wijzigingen in de werk directory.</a:t>
+              <a:t>Monitor wijzigingen in </a:t>
+            </a:r>
+            <a:r>
+              <a:rPr lang="nl-NL" dirty="0" err="1">
+                <a:latin typeface="Courier New" panose="02070309020205020404" pitchFamily="49" charset="0"/>
+                <a:cs typeface="Courier New" panose="02070309020205020404" pitchFamily="49" charset="0"/>
+              </a:rPr>
+              <a:t>work_dir</a:t>
+            </a:r>
+            <a:r>
+              <a:rPr lang="nl-NL" dirty="0"/>
+              <a:t>.</a:t>
             </a:r>
             <a:endParaRPr lang="nl-NL" noProof="0" dirty="0"/>
           </a:p>
@@ -18599,14 +18839,15 @@
             </a:extLst>
           </p:cNvPr>
           <p:cNvCxnSpPr>
+            <a:cxnSpLocks/>
             <a:stCxn id="22" idx="0"/>
           </p:cNvCxnSpPr>
           <p:nvPr/>
         </p:nvCxnSpPr>
         <p:spPr>
           <a:xfrm flipV="1">
-            <a:off x="6096000" y="2133602"/>
-            <a:ext cx="0" cy="406934"/>
+            <a:off x="5934892" y="2133602"/>
+            <a:ext cx="0" cy="596848"/>
           </a:xfrm>
           <a:prstGeom prst="straightConnector1">
             <a:avLst/>
@@ -19077,7 +19318,18 @@
             </a:pPr>
             <a:r>
               <a:rPr lang="nl-NL" noProof="0" dirty="0"/>
-              <a:t>Met git status zie je wijzigingen.</a:t>
+              <a:t>Geeft wijzigingen weer in </a:t>
+            </a:r>
+            <a:r>
+              <a:rPr lang="nl-NL" noProof="0" dirty="0" err="1">
+                <a:latin typeface="Courier New" panose="02070309020205020404" pitchFamily="49" charset="0"/>
+                <a:cs typeface="Courier New" panose="02070309020205020404" pitchFamily="49" charset="0"/>
+              </a:rPr>
+              <a:t>work_dir</a:t>
+            </a:r>
+            <a:r>
+              <a:rPr lang="nl-NL" noProof="0" dirty="0"/>
+              <a:t>.</a:t>
             </a:r>
           </a:p>
           <a:p>
@@ -19693,7 +19945,7 @@
         <p:spPr>
           <a:xfrm>
             <a:off x="4230954" y="2415979"/>
-            <a:ext cx="4077024" cy="1322515"/>
+            <a:ext cx="4434744" cy="1322515"/>
           </a:xfrm>
           <a:prstGeom prst="rect">
             <a:avLst/>
@@ -19739,10 +19991,20 @@
             </a:pPr>
             <a:r>
               <a:rPr lang="nl-NL" dirty="0"/>
-              <a:t>Met git </a:t>
-            </a:r>
-            <a:r>
-              <a:rPr lang="nl-NL" dirty="0" err="1"/>
+              <a:t>Met </a:t>
+            </a:r>
+            <a:r>
+              <a:rPr lang="nl-NL" dirty="0">
+                <a:latin typeface="Courier New" panose="02070309020205020404" pitchFamily="49" charset="0"/>
+                <a:cs typeface="Courier New" panose="02070309020205020404" pitchFamily="49" charset="0"/>
+              </a:rPr>
+              <a:t>git </a:t>
+            </a:r>
+            <a:r>
+              <a:rPr lang="nl-NL" dirty="0" err="1">
+                <a:latin typeface="Courier New" panose="02070309020205020404" pitchFamily="49" charset="0"/>
+                <a:cs typeface="Courier New" panose="02070309020205020404" pitchFamily="49" charset="0"/>
+              </a:rPr>
               <a:t>add</a:t>
             </a:r>
             <a:r>
@@ -19761,10 +20023,20 @@
             </a:pPr>
             <a:r>
               <a:rPr lang="nl-NL" dirty="0"/>
-              <a:t>Met git </a:t>
-            </a:r>
-            <a:r>
-              <a:rPr lang="nl-NL" dirty="0" err="1"/>
+              <a:t>Met </a:t>
+            </a:r>
+            <a:r>
+              <a:rPr lang="nl-NL" dirty="0">
+                <a:latin typeface="Courier New" panose="02070309020205020404" pitchFamily="49" charset="0"/>
+                <a:cs typeface="Courier New" panose="02070309020205020404" pitchFamily="49" charset="0"/>
+              </a:rPr>
+              <a:t>git </a:t>
+            </a:r>
+            <a:r>
+              <a:rPr lang="nl-NL" dirty="0" err="1">
+                <a:latin typeface="Courier New" panose="02070309020205020404" pitchFamily="49" charset="0"/>
+                <a:cs typeface="Courier New" panose="02070309020205020404" pitchFamily="49" charset="0"/>
+              </a:rPr>
               <a:t>commit</a:t>
             </a:r>
             <a:r>
@@ -20854,8 +21126,8 @@
         </p:nvSpPr>
         <p:spPr>
           <a:xfrm>
-            <a:off x="7561520" y="3859769"/>
-            <a:ext cx="4024762" cy="1343124"/>
+            <a:off x="7561519" y="3859769"/>
+            <a:ext cx="4093563" cy="1343124"/>
           </a:xfrm>
           <a:prstGeom prst="rect">
             <a:avLst/>
@@ -20910,8 +21182,15 @@
               <a:buChar char="-"/>
             </a:pPr>
             <a:r>
+              <a:rPr lang="nl-NL" dirty="0">
+                <a:latin typeface="Courier New" panose="02070309020205020404" pitchFamily="49" charset="0"/>
+                <a:cs typeface="Courier New" panose="02070309020205020404" pitchFamily="49" charset="0"/>
+              </a:rPr>
+              <a:t>main.py</a:t>
+            </a:r>
+            <a:r>
               <a:rPr lang="nl-NL" dirty="0"/>
-              <a:t>main.py wordt niet opgeslagen.</a:t>
+              <a:t> wordt niet opgeslagen.</a:t>
             </a:r>
           </a:p>
         </p:txBody>
@@ -20934,8 +21213,8 @@
         </p:nvCxnSpPr>
         <p:spPr>
           <a:xfrm rot="16200000" flipV="1">
-            <a:off x="8057134" y="2343002"/>
-            <a:ext cx="788259" cy="2245276"/>
+            <a:off x="8074334" y="2325802"/>
+            <a:ext cx="788259" cy="2279676"/>
           </a:xfrm>
           <a:prstGeom prst="bentConnector2">
             <a:avLst/>
@@ -22452,7 +22731,7 @@
         <p:spPr>
           <a:xfrm>
             <a:off x="10113602" y="2809900"/>
-            <a:ext cx="1265090" cy="523220"/>
+            <a:ext cx="1321196" cy="523220"/>
           </a:xfrm>
           <a:prstGeom prst="rect">
             <a:avLst/>
@@ -22478,7 +22757,7 @@
           <a:p>
             <a:r>
               <a:rPr lang="en-US" sz="1400" dirty="0"/>
-              <a:t>modify utils.py</a:t>
+              <a:t>modify main.py</a:t>
             </a:r>
             <a:endParaRPr lang="en-NL" sz="1400" dirty="0"/>
           </a:p>

</xml_diff>